<commit_message>
Added slides on current work
</commit_message>
<xml_diff>
--- a/3YCM/3YCM_pres.pptx
+++ b/3YCM/3YCM_pres.pptx
@@ -4,8 +4,24 @@
   <p:sldMasterIdLst>
     <p:sldMasterId id="2147483648" r:id="rId1"/>
   </p:sldMasterIdLst>
+  <p:notesMasterIdLst>
+    <p:notesMasterId r:id="rId16"/>
+  </p:notesMasterIdLst>
   <p:sldIdLst>
     <p:sldId id="256" r:id="rId2"/>
+    <p:sldId id="265" r:id="rId3"/>
+    <p:sldId id="257" r:id="rId4"/>
+    <p:sldId id="258" r:id="rId5"/>
+    <p:sldId id="259" r:id="rId6"/>
+    <p:sldId id="260" r:id="rId7"/>
+    <p:sldId id="261" r:id="rId8"/>
+    <p:sldId id="262" r:id="rId9"/>
+    <p:sldId id="264" r:id="rId10"/>
+    <p:sldId id="263" r:id="rId11"/>
+    <p:sldId id="266" r:id="rId12"/>
+    <p:sldId id="267" r:id="rId13"/>
+    <p:sldId id="269" r:id="rId14"/>
+    <p:sldId id="270" r:id="rId15"/>
   </p:sldIdLst>
   <p:sldSz cx="9144000" cy="6858000" type="screen4x3"/>
   <p:notesSz cx="6858000" cy="9144000"/>
@@ -105,6 +121,655 @@
     </a:lvl9pPr>
   </p:defaultTextStyle>
 </p:presentation>
+</file>
+
+<file path=ppt/notesMasters/notesMaster1.xml><?xml version="1.0" encoding="utf-8"?>
+<p:notesMaster xmlns:a="http://schemas.openxmlformats.org/drawingml/2006/main" xmlns:r="http://schemas.openxmlformats.org/officeDocument/2006/relationships" xmlns:p="http://schemas.openxmlformats.org/presentationml/2006/main">
+  <p:cSld>
+    <p:bg>
+      <p:bgRef idx="1001">
+        <a:schemeClr val="bg1"/>
+      </p:bgRef>
+    </p:bg>
+    <p:spTree>
+      <p:nvGrpSpPr>
+        <p:cNvPr id="1" name=""/>
+        <p:cNvGrpSpPr/>
+        <p:nvPr/>
+      </p:nvGrpSpPr>
+      <p:grpSpPr>
+        <a:xfrm>
+          <a:off x="0" y="0"/>
+          <a:ext cx="0" cy="0"/>
+          <a:chOff x="0" y="0"/>
+          <a:chExt cx="0" cy="0"/>
+        </a:xfrm>
+      </p:grpSpPr>
+      <p:sp>
+        <p:nvSpPr>
+          <p:cNvPr id="2" name="Header Placeholder 1"/>
+          <p:cNvSpPr>
+            <a:spLocks noGrp="1"/>
+          </p:cNvSpPr>
+          <p:nvPr>
+            <p:ph type="hdr" sz="quarter"/>
+          </p:nvPr>
+        </p:nvSpPr>
+        <p:spPr>
+          <a:xfrm>
+            <a:off x="0" y="0"/>
+            <a:ext cx="2971800" cy="457200"/>
+          </a:xfrm>
+          <a:prstGeom prst="rect">
+            <a:avLst/>
+          </a:prstGeom>
+        </p:spPr>
+        <p:txBody>
+          <a:bodyPr vert="horz" lIns="91440" tIns="45720" rIns="91440" bIns="45720" rtlCol="0"/>
+          <a:lstStyle>
+            <a:lvl1pPr algn="l">
+              <a:defRPr sz="1200"/>
+            </a:lvl1pPr>
+          </a:lstStyle>
+          <a:p>
+            <a:endParaRPr lang="en-US"/>
+          </a:p>
+        </p:txBody>
+      </p:sp>
+      <p:sp>
+        <p:nvSpPr>
+          <p:cNvPr id="3" name="Date Placeholder 2"/>
+          <p:cNvSpPr>
+            <a:spLocks noGrp="1"/>
+          </p:cNvSpPr>
+          <p:nvPr>
+            <p:ph type="dt" idx="1"/>
+          </p:nvPr>
+        </p:nvSpPr>
+        <p:spPr>
+          <a:xfrm>
+            <a:off x="3884613" y="0"/>
+            <a:ext cx="2971800" cy="457200"/>
+          </a:xfrm>
+          <a:prstGeom prst="rect">
+            <a:avLst/>
+          </a:prstGeom>
+        </p:spPr>
+        <p:txBody>
+          <a:bodyPr vert="horz" lIns="91440" tIns="45720" rIns="91440" bIns="45720" rtlCol="0"/>
+          <a:lstStyle>
+            <a:lvl1pPr algn="r">
+              <a:defRPr sz="1200"/>
+            </a:lvl1pPr>
+          </a:lstStyle>
+          <a:p>
+            <a:fld id="{A1933ABD-3265-8C49-9A95-1CE2E6B3AE92}" type="datetimeFigureOut">
+              <a:rPr lang="en-US" smtClean="0"/>
+              <a:t>7/6/15</a:t>
+            </a:fld>
+            <a:endParaRPr lang="en-US"/>
+          </a:p>
+        </p:txBody>
+      </p:sp>
+      <p:sp>
+        <p:nvSpPr>
+          <p:cNvPr id="4" name="Slide Image Placeholder 3"/>
+          <p:cNvSpPr>
+            <a:spLocks noGrp="1" noRot="1" noChangeAspect="1"/>
+          </p:cNvSpPr>
+          <p:nvPr>
+            <p:ph type="sldImg" idx="2"/>
+          </p:nvPr>
+        </p:nvSpPr>
+        <p:spPr>
+          <a:xfrm>
+            <a:off x="1143000" y="685800"/>
+            <a:ext cx="4572000" cy="3429000"/>
+          </a:xfrm>
+          <a:prstGeom prst="rect">
+            <a:avLst/>
+          </a:prstGeom>
+          <a:noFill/>
+          <a:ln w="12700">
+            <a:solidFill>
+              <a:prstClr val="black"/>
+            </a:solidFill>
+          </a:ln>
+        </p:spPr>
+        <p:txBody>
+          <a:bodyPr vert="horz" lIns="91440" tIns="45720" rIns="91440" bIns="45720" rtlCol="0" anchor="ctr"/>
+          <a:lstStyle/>
+          <a:p>
+            <a:endParaRPr lang="en-US"/>
+          </a:p>
+        </p:txBody>
+      </p:sp>
+      <p:sp>
+        <p:nvSpPr>
+          <p:cNvPr id="5" name="Notes Placeholder 4"/>
+          <p:cNvSpPr>
+            <a:spLocks noGrp="1"/>
+          </p:cNvSpPr>
+          <p:nvPr>
+            <p:ph type="body" sz="quarter" idx="3"/>
+          </p:nvPr>
+        </p:nvSpPr>
+        <p:spPr>
+          <a:xfrm>
+            <a:off x="685800" y="4343400"/>
+            <a:ext cx="5486400" cy="4114800"/>
+          </a:xfrm>
+          <a:prstGeom prst="rect">
+            <a:avLst/>
+          </a:prstGeom>
+        </p:spPr>
+        <p:txBody>
+          <a:bodyPr vert="horz" lIns="91440" tIns="45720" rIns="91440" bIns="45720" rtlCol="0"/>
+          <a:lstStyle/>
+          <a:p>
+            <a:pPr lvl="0"/>
+            <a:r>
+              <a:rPr lang="en-US" smtClean="0"/>
+              <a:t>Click to edit Master text styles</a:t>
+            </a:r>
+          </a:p>
+          <a:p>
+            <a:pPr lvl="1"/>
+            <a:r>
+              <a:rPr lang="en-US" smtClean="0"/>
+              <a:t>Second level</a:t>
+            </a:r>
+          </a:p>
+          <a:p>
+            <a:pPr lvl="2"/>
+            <a:r>
+              <a:rPr lang="en-US" smtClean="0"/>
+              <a:t>Third level</a:t>
+            </a:r>
+          </a:p>
+          <a:p>
+            <a:pPr lvl="3"/>
+            <a:r>
+              <a:rPr lang="en-US" smtClean="0"/>
+              <a:t>Fourth level</a:t>
+            </a:r>
+          </a:p>
+          <a:p>
+            <a:pPr lvl="4"/>
+            <a:r>
+              <a:rPr lang="en-US" smtClean="0"/>
+              <a:t>Fifth level</a:t>
+            </a:r>
+            <a:endParaRPr lang="en-US"/>
+          </a:p>
+        </p:txBody>
+      </p:sp>
+      <p:sp>
+        <p:nvSpPr>
+          <p:cNvPr id="6" name="Footer Placeholder 5"/>
+          <p:cNvSpPr>
+            <a:spLocks noGrp="1"/>
+          </p:cNvSpPr>
+          <p:nvPr>
+            <p:ph type="ftr" sz="quarter" idx="4"/>
+          </p:nvPr>
+        </p:nvSpPr>
+        <p:spPr>
+          <a:xfrm>
+            <a:off x="0" y="8685213"/>
+            <a:ext cx="2971800" cy="457200"/>
+          </a:xfrm>
+          <a:prstGeom prst="rect">
+            <a:avLst/>
+          </a:prstGeom>
+        </p:spPr>
+        <p:txBody>
+          <a:bodyPr vert="horz" lIns="91440" tIns="45720" rIns="91440" bIns="45720" rtlCol="0" anchor="b"/>
+          <a:lstStyle>
+            <a:lvl1pPr algn="l">
+              <a:defRPr sz="1200"/>
+            </a:lvl1pPr>
+          </a:lstStyle>
+          <a:p>
+            <a:endParaRPr lang="en-US"/>
+          </a:p>
+        </p:txBody>
+      </p:sp>
+      <p:sp>
+        <p:nvSpPr>
+          <p:cNvPr id="7" name="Slide Number Placeholder 6"/>
+          <p:cNvSpPr>
+            <a:spLocks noGrp="1"/>
+          </p:cNvSpPr>
+          <p:nvPr>
+            <p:ph type="sldNum" sz="quarter" idx="5"/>
+          </p:nvPr>
+        </p:nvSpPr>
+        <p:spPr>
+          <a:xfrm>
+            <a:off x="3884613" y="8685213"/>
+            <a:ext cx="2971800" cy="457200"/>
+          </a:xfrm>
+          <a:prstGeom prst="rect">
+            <a:avLst/>
+          </a:prstGeom>
+        </p:spPr>
+        <p:txBody>
+          <a:bodyPr vert="horz" lIns="91440" tIns="45720" rIns="91440" bIns="45720" rtlCol="0" anchor="b"/>
+          <a:lstStyle>
+            <a:lvl1pPr algn="r">
+              <a:defRPr sz="1200"/>
+            </a:lvl1pPr>
+          </a:lstStyle>
+          <a:p>
+            <a:fld id="{E24C21EA-28B2-0442-AFB4-706342F125BD}" type="slidenum">
+              <a:rPr lang="en-US" smtClean="0"/>
+              <a:t>‹#›</a:t>
+            </a:fld>
+            <a:endParaRPr lang="en-US"/>
+          </a:p>
+        </p:txBody>
+      </p:sp>
+    </p:spTree>
+    <p:extLst>
+      <p:ext uri="{BB962C8B-B14F-4D97-AF65-F5344CB8AC3E}">
+        <p14:creationId xmlns:p14="http://schemas.microsoft.com/office/powerpoint/2010/main" val="1662425684"/>
+      </p:ext>
+    </p:extLst>
+  </p:cSld>
+  <p:clrMap bg1="lt1" tx1="dk1" bg2="lt2" tx2="dk2" accent1="accent1" accent2="accent2" accent3="accent3" accent4="accent4" accent5="accent5" accent6="accent6" hlink="hlink" folHlink="folHlink"/>
+  <p:notesStyle>
+    <a:lvl1pPr marL="0" algn="l" defTabSz="457200" rtl="0" eaLnBrk="1" latinLnBrk="0" hangingPunct="1">
+      <a:defRPr sz="1200" kern="1200">
+        <a:solidFill>
+          <a:schemeClr val="tx1"/>
+        </a:solidFill>
+        <a:latin typeface="+mn-lt"/>
+        <a:ea typeface="+mn-ea"/>
+        <a:cs typeface="+mn-cs"/>
+      </a:defRPr>
+    </a:lvl1pPr>
+    <a:lvl2pPr marL="457200" algn="l" defTabSz="457200" rtl="0" eaLnBrk="1" latinLnBrk="0" hangingPunct="1">
+      <a:defRPr sz="1200" kern="1200">
+        <a:solidFill>
+          <a:schemeClr val="tx1"/>
+        </a:solidFill>
+        <a:latin typeface="+mn-lt"/>
+        <a:ea typeface="+mn-ea"/>
+        <a:cs typeface="+mn-cs"/>
+      </a:defRPr>
+    </a:lvl2pPr>
+    <a:lvl3pPr marL="914400" algn="l" defTabSz="457200" rtl="0" eaLnBrk="1" latinLnBrk="0" hangingPunct="1">
+      <a:defRPr sz="1200" kern="1200">
+        <a:solidFill>
+          <a:schemeClr val="tx1"/>
+        </a:solidFill>
+        <a:latin typeface="+mn-lt"/>
+        <a:ea typeface="+mn-ea"/>
+        <a:cs typeface="+mn-cs"/>
+      </a:defRPr>
+    </a:lvl3pPr>
+    <a:lvl4pPr marL="1371600" algn="l" defTabSz="457200" rtl="0" eaLnBrk="1" latinLnBrk="0" hangingPunct="1">
+      <a:defRPr sz="1200" kern="1200">
+        <a:solidFill>
+          <a:schemeClr val="tx1"/>
+        </a:solidFill>
+        <a:latin typeface="+mn-lt"/>
+        <a:ea typeface="+mn-ea"/>
+        <a:cs typeface="+mn-cs"/>
+      </a:defRPr>
+    </a:lvl4pPr>
+    <a:lvl5pPr marL="1828800" algn="l" defTabSz="457200" rtl="0" eaLnBrk="1" latinLnBrk="0" hangingPunct="1">
+      <a:defRPr sz="1200" kern="1200">
+        <a:solidFill>
+          <a:schemeClr val="tx1"/>
+        </a:solidFill>
+        <a:latin typeface="+mn-lt"/>
+        <a:ea typeface="+mn-ea"/>
+        <a:cs typeface="+mn-cs"/>
+      </a:defRPr>
+    </a:lvl5pPr>
+    <a:lvl6pPr marL="2286000" algn="l" defTabSz="457200" rtl="0" eaLnBrk="1" latinLnBrk="0" hangingPunct="1">
+      <a:defRPr sz="1200" kern="1200">
+        <a:solidFill>
+          <a:schemeClr val="tx1"/>
+        </a:solidFill>
+        <a:latin typeface="+mn-lt"/>
+        <a:ea typeface="+mn-ea"/>
+        <a:cs typeface="+mn-cs"/>
+      </a:defRPr>
+    </a:lvl6pPr>
+    <a:lvl7pPr marL="2743200" algn="l" defTabSz="457200" rtl="0" eaLnBrk="1" latinLnBrk="0" hangingPunct="1">
+      <a:defRPr sz="1200" kern="1200">
+        <a:solidFill>
+          <a:schemeClr val="tx1"/>
+        </a:solidFill>
+        <a:latin typeface="+mn-lt"/>
+        <a:ea typeface="+mn-ea"/>
+        <a:cs typeface="+mn-cs"/>
+      </a:defRPr>
+    </a:lvl7pPr>
+    <a:lvl8pPr marL="3200400" algn="l" defTabSz="457200" rtl="0" eaLnBrk="1" latinLnBrk="0" hangingPunct="1">
+      <a:defRPr sz="1200" kern="1200">
+        <a:solidFill>
+          <a:schemeClr val="tx1"/>
+        </a:solidFill>
+        <a:latin typeface="+mn-lt"/>
+        <a:ea typeface="+mn-ea"/>
+        <a:cs typeface="+mn-cs"/>
+      </a:defRPr>
+    </a:lvl8pPr>
+    <a:lvl9pPr marL="3657600" algn="l" defTabSz="457200" rtl="0" eaLnBrk="1" latinLnBrk="0" hangingPunct="1">
+      <a:defRPr sz="1200" kern="1200">
+        <a:solidFill>
+          <a:schemeClr val="tx1"/>
+        </a:solidFill>
+        <a:latin typeface="+mn-lt"/>
+        <a:ea typeface="+mn-ea"/>
+        <a:cs typeface="+mn-cs"/>
+      </a:defRPr>
+    </a:lvl9pPr>
+  </p:notesStyle>
+</p:notesMaster>
+</file>
+
+<file path=ppt/notesSlides/notesSlide1.xml><?xml version="1.0" encoding="utf-8"?>
+<p:notes xmlns:a="http://schemas.openxmlformats.org/drawingml/2006/main" xmlns:r="http://schemas.openxmlformats.org/officeDocument/2006/relationships" xmlns:p="http://schemas.openxmlformats.org/presentationml/2006/main">
+  <p:cSld>
+    <p:spTree>
+      <p:nvGrpSpPr>
+        <p:cNvPr id="1" name=""/>
+        <p:cNvGrpSpPr/>
+        <p:nvPr/>
+      </p:nvGrpSpPr>
+      <p:grpSpPr>
+        <a:xfrm>
+          <a:off x="0" y="0"/>
+          <a:ext cx="0" cy="0"/>
+          <a:chOff x="0" y="0"/>
+          <a:chExt cx="0" cy="0"/>
+        </a:xfrm>
+      </p:grpSpPr>
+      <p:sp>
+        <p:nvSpPr>
+          <p:cNvPr id="2" name="Slide Image Placeholder 1"/>
+          <p:cNvSpPr>
+            <a:spLocks noGrp="1" noRot="1" noChangeAspect="1"/>
+          </p:cNvSpPr>
+          <p:nvPr>
+            <p:ph type="sldImg"/>
+          </p:nvPr>
+        </p:nvSpPr>
+        <p:spPr/>
+      </p:sp>
+      <p:sp>
+        <p:nvSpPr>
+          <p:cNvPr id="3" name="Notes Placeholder 2"/>
+          <p:cNvSpPr>
+            <a:spLocks noGrp="1"/>
+          </p:cNvSpPr>
+          <p:nvPr>
+            <p:ph type="body" idx="1"/>
+          </p:nvPr>
+        </p:nvSpPr>
+        <p:spPr/>
+        <p:txBody>
+          <a:bodyPr/>
+          <a:lstStyle/>
+          <a:p>
+            <a:r>
+              <a:rPr lang="en-US" dirty="0" smtClean="0"/>
+              <a:t>[s, the average fitness difference experienced by a niche-specifying (adaptive) allele in different niches] and recombination (r, the recombination rate per locus per generation) is expressed as the r/s ratio</a:t>
+            </a:r>
+          </a:p>
+          <a:p>
+            <a:endParaRPr lang="en-US" dirty="0" smtClean="0"/>
+          </a:p>
+          <a:p>
+            <a:r>
+              <a:rPr lang="en-US" dirty="0" smtClean="0"/>
+              <a:t>In</a:t>
+            </a:r>
+            <a:r>
+              <a:rPr lang="en-US" baseline="0" dirty="0" smtClean="0"/>
+              <a:t> application to speciation event, for recombination model, the </a:t>
+            </a:r>
+            <a:r>
+              <a:rPr lang="en-US" baseline="0" dirty="0" err="1" smtClean="0"/>
+              <a:t>recombina</a:t>
+            </a:r>
+            <a:endParaRPr lang="en-US" dirty="0"/>
+          </a:p>
+        </p:txBody>
+      </p:sp>
+      <p:sp>
+        <p:nvSpPr>
+          <p:cNvPr id="4" name="Slide Number Placeholder 3"/>
+          <p:cNvSpPr>
+            <a:spLocks noGrp="1"/>
+          </p:cNvSpPr>
+          <p:nvPr>
+            <p:ph type="sldNum" sz="quarter" idx="10"/>
+          </p:nvPr>
+        </p:nvSpPr>
+        <p:spPr/>
+        <p:txBody>
+          <a:bodyPr/>
+          <a:lstStyle/>
+          <a:p>
+            <a:fld id="{C935E3E0-512B-774F-90A8-EB29BF88DABA}" type="slidenum">
+              <a:rPr lang="en-US" smtClean="0"/>
+              <a:t>5</a:t>
+            </a:fld>
+            <a:endParaRPr lang="en-US"/>
+          </a:p>
+        </p:txBody>
+      </p:sp>
+    </p:spTree>
+    <p:extLst>
+      <p:ext uri="{BB962C8B-B14F-4D97-AF65-F5344CB8AC3E}">
+        <p14:creationId xmlns:p14="http://schemas.microsoft.com/office/powerpoint/2010/main" val="653173312"/>
+      </p:ext>
+    </p:extLst>
+  </p:cSld>
+  <p:clrMapOvr>
+    <a:masterClrMapping/>
+  </p:clrMapOvr>
+</p:notes>
+</file>
+
+<file path=ppt/notesSlides/notesSlide2.xml><?xml version="1.0" encoding="utf-8"?>
+<p:notes xmlns:a="http://schemas.openxmlformats.org/drawingml/2006/main" xmlns:r="http://schemas.openxmlformats.org/officeDocument/2006/relationships" xmlns:p="http://schemas.openxmlformats.org/presentationml/2006/main">
+  <p:cSld>
+    <p:spTree>
+      <p:nvGrpSpPr>
+        <p:cNvPr id="1" name=""/>
+        <p:cNvGrpSpPr/>
+        <p:nvPr/>
+      </p:nvGrpSpPr>
+      <p:grpSpPr>
+        <a:xfrm>
+          <a:off x="0" y="0"/>
+          <a:ext cx="0" cy="0"/>
+          <a:chOff x="0" y="0"/>
+          <a:chExt cx="0" cy="0"/>
+        </a:xfrm>
+      </p:grpSpPr>
+      <p:sp>
+        <p:nvSpPr>
+          <p:cNvPr id="2" name="Slide Image Placeholder 1"/>
+          <p:cNvSpPr>
+            <a:spLocks noGrp="1" noRot="1" noChangeAspect="1"/>
+          </p:cNvSpPr>
+          <p:nvPr>
+            <p:ph type="sldImg"/>
+          </p:nvPr>
+        </p:nvSpPr>
+        <p:spPr/>
+      </p:sp>
+      <p:sp>
+        <p:nvSpPr>
+          <p:cNvPr id="3" name="Notes Placeholder 2"/>
+          <p:cNvSpPr>
+            <a:spLocks noGrp="1"/>
+          </p:cNvSpPr>
+          <p:nvPr>
+            <p:ph type="body" idx="1"/>
+          </p:nvPr>
+        </p:nvSpPr>
+        <p:spPr/>
+        <p:txBody>
+          <a:bodyPr/>
+          <a:lstStyle/>
+          <a:p>
+            <a:r>
+              <a:rPr lang="en-US" dirty="0" smtClean="0"/>
+              <a:t>Based</a:t>
+            </a:r>
+            <a:r>
+              <a:rPr lang="en-US" baseline="0" dirty="0" smtClean="0"/>
+              <a:t> on the subset of 400 genes which were present using </a:t>
+            </a:r>
+            <a:r>
+              <a:rPr lang="en-US" baseline="0" dirty="0" err="1" smtClean="0"/>
+              <a:t>PhyloPhlan</a:t>
+            </a:r>
+            <a:endParaRPr lang="en-US" dirty="0"/>
+          </a:p>
+        </p:txBody>
+      </p:sp>
+      <p:sp>
+        <p:nvSpPr>
+          <p:cNvPr id="4" name="Slide Number Placeholder 3"/>
+          <p:cNvSpPr>
+            <a:spLocks noGrp="1"/>
+          </p:cNvSpPr>
+          <p:nvPr>
+            <p:ph type="sldNum" sz="quarter" idx="10"/>
+          </p:nvPr>
+        </p:nvSpPr>
+        <p:spPr/>
+        <p:txBody>
+          <a:bodyPr/>
+          <a:lstStyle/>
+          <a:p>
+            <a:fld id="{E24C21EA-28B2-0442-AFB4-706342F125BD}" type="slidenum">
+              <a:rPr lang="en-US" smtClean="0"/>
+              <a:t>10</a:t>
+            </a:fld>
+            <a:endParaRPr lang="en-US"/>
+          </a:p>
+        </p:txBody>
+      </p:sp>
+    </p:spTree>
+    <p:extLst>
+      <p:ext uri="{BB962C8B-B14F-4D97-AF65-F5344CB8AC3E}">
+        <p14:creationId xmlns:p14="http://schemas.microsoft.com/office/powerpoint/2010/main" val="2374553425"/>
+      </p:ext>
+    </p:extLst>
+  </p:cSld>
+  <p:clrMapOvr>
+    <a:masterClrMapping/>
+  </p:clrMapOvr>
+</p:notes>
+</file>
+
+<file path=ppt/notesSlides/notesSlide3.xml><?xml version="1.0" encoding="utf-8"?>
+<p:notes xmlns:a="http://schemas.openxmlformats.org/drawingml/2006/main" xmlns:r="http://schemas.openxmlformats.org/officeDocument/2006/relationships" xmlns:p="http://schemas.openxmlformats.org/presentationml/2006/main">
+  <p:cSld>
+    <p:spTree>
+      <p:nvGrpSpPr>
+        <p:cNvPr id="1" name=""/>
+        <p:cNvGrpSpPr/>
+        <p:nvPr/>
+      </p:nvGrpSpPr>
+      <p:grpSpPr>
+        <a:xfrm>
+          <a:off x="0" y="0"/>
+          <a:ext cx="0" cy="0"/>
+          <a:chOff x="0" y="0"/>
+          <a:chExt cx="0" cy="0"/>
+        </a:xfrm>
+      </p:grpSpPr>
+      <p:sp>
+        <p:nvSpPr>
+          <p:cNvPr id="2" name="Slide Image Placeholder 1"/>
+          <p:cNvSpPr>
+            <a:spLocks noGrp="1" noRot="1" noChangeAspect="1"/>
+          </p:cNvSpPr>
+          <p:nvPr>
+            <p:ph type="sldImg"/>
+          </p:nvPr>
+        </p:nvSpPr>
+        <p:spPr/>
+      </p:sp>
+      <p:sp>
+        <p:nvSpPr>
+          <p:cNvPr id="3" name="Notes Placeholder 2"/>
+          <p:cNvSpPr>
+            <a:spLocks noGrp="1"/>
+          </p:cNvSpPr>
+          <p:nvPr>
+            <p:ph type="body" idx="1"/>
+          </p:nvPr>
+        </p:nvSpPr>
+        <p:spPr/>
+        <p:txBody>
+          <a:bodyPr/>
+          <a:lstStyle/>
+          <a:p>
+            <a:r>
+              <a:rPr lang="en-US" dirty="0" smtClean="0"/>
+              <a:t>L06 show the same pattern, since they are tracking</a:t>
+            </a:r>
+            <a:r>
+              <a:rPr lang="en-US" baseline="0" dirty="0" smtClean="0"/>
+              <a:t> the same population, which is reassuring</a:t>
+            </a:r>
+          </a:p>
+          <a:p>
+            <a:r>
+              <a:rPr lang="en-US" baseline="0" dirty="0" smtClean="0"/>
+              <a:t>I14 and M14 are lower abundance (of our set)</a:t>
+            </a:r>
+            <a:endParaRPr lang="en-US" dirty="0"/>
+          </a:p>
+        </p:txBody>
+      </p:sp>
+      <p:sp>
+        <p:nvSpPr>
+          <p:cNvPr id="4" name="Slide Number Placeholder 3"/>
+          <p:cNvSpPr>
+            <a:spLocks noGrp="1"/>
+          </p:cNvSpPr>
+          <p:nvPr>
+            <p:ph type="sldNum" sz="quarter" idx="10"/>
+          </p:nvPr>
+        </p:nvSpPr>
+        <p:spPr/>
+        <p:txBody>
+          <a:bodyPr/>
+          <a:lstStyle/>
+          <a:p>
+            <a:fld id="{E24C21EA-28B2-0442-AFB4-706342F125BD}" type="slidenum">
+              <a:rPr lang="en-US" smtClean="0"/>
+              <a:t>13</a:t>
+            </a:fld>
+            <a:endParaRPr lang="en-US"/>
+          </a:p>
+        </p:txBody>
+      </p:sp>
+    </p:spTree>
+    <p:extLst>
+      <p:ext uri="{BB962C8B-B14F-4D97-AF65-F5344CB8AC3E}">
+        <p14:creationId xmlns:p14="http://schemas.microsoft.com/office/powerpoint/2010/main" val="985152144"/>
+      </p:ext>
+    </p:extLst>
+  </p:cSld>
+  <p:clrMapOvr>
+    <a:masterClrMapping/>
+  </p:clrMapOvr>
+</p:notes>
 </file>
 
 <file path=ppt/slideLayouts/slideLayout1.xml><?xml version="1.0" encoding="utf-8"?>
@@ -3095,6 +3760,36 @@
           <a:chExt cx="0" cy="0"/>
         </a:xfrm>
       </p:grpSpPr>
+      <p:pic>
+        <p:nvPicPr>
+          <p:cNvPr id="4" name="Picture 3" descr="TLpic.jpg"/>
+          <p:cNvPicPr>
+            <a:picLocks noChangeAspect="1"/>
+          </p:cNvPicPr>
+          <p:nvPr/>
+        </p:nvPicPr>
+        <p:blipFill>
+          <a:blip r:embed="rId2">
+            <a:extLst>
+              <a:ext uri="{28A0092B-C50C-407E-A947-70E740481C1C}">
+                <a14:useLocalDpi xmlns:a14="http://schemas.microsoft.com/office/drawing/2010/main" val="0"/>
+              </a:ext>
+            </a:extLst>
+          </a:blip>
+          <a:stretch>
+            <a:fillRect/>
+          </a:stretch>
+        </p:blipFill>
+        <p:spPr>
+          <a:xfrm>
+            <a:off x="0" y="796324"/>
+            <a:ext cx="9144000" cy="5174865"/>
+          </a:xfrm>
+          <a:prstGeom prst="rect">
+            <a:avLst/>
+          </a:prstGeom>
+        </p:spPr>
+      </p:pic>
       <p:sp>
         <p:nvSpPr>
           <p:cNvPr id="2" name="Title 1"/>
@@ -3105,12 +3800,45 @@
             <p:ph type="ctrTitle"/>
           </p:nvPr>
         </p:nvSpPr>
-        <p:spPr/>
+        <p:spPr>
+          <a:xfrm>
+            <a:off x="685800" y="853557"/>
+            <a:ext cx="7772400" cy="1470025"/>
+          </a:xfrm>
+        </p:spPr>
         <p:txBody>
           <a:bodyPr/>
           <a:lstStyle/>
           <a:p>
-            <a:endParaRPr lang="en-US"/>
+            <a:r>
+              <a:rPr lang="en-US" dirty="0" smtClean="0">
+                <a:solidFill>
+                  <a:schemeClr val="bg1"/>
+                </a:solidFill>
+              </a:rPr>
+              <a:t>3</a:t>
+            </a:r>
+            <a:r>
+              <a:rPr lang="en-US" baseline="30000" dirty="0" smtClean="0">
+                <a:solidFill>
+                  <a:schemeClr val="bg1"/>
+                </a:solidFill>
+              </a:rPr>
+              <a:t>rd</a:t>
+            </a:r>
+            <a:r>
+              <a:rPr lang="en-US" dirty="0" smtClean="0">
+                <a:solidFill>
+                  <a:schemeClr val="bg1"/>
+                </a:solidFill>
+              </a:rPr>
+              <a:t> Year Committee Meeting</a:t>
+            </a:r>
+            <a:endParaRPr lang="en-US" dirty="0">
+              <a:solidFill>
+                <a:schemeClr val="bg1"/>
+              </a:solidFill>
+            </a:endParaRPr>
           </a:p>
         </p:txBody>
       </p:sp>
@@ -3124,12 +3852,39 @@
             <p:ph type="subTitle" idx="1"/>
           </p:nvPr>
         </p:nvSpPr>
-        <p:spPr/>
+        <p:spPr>
+          <a:xfrm>
+            <a:off x="12358" y="2774434"/>
+            <a:ext cx="3406346" cy="1248719"/>
+          </a:xfrm>
+        </p:spPr>
         <p:txBody>
           <a:bodyPr/>
           <a:lstStyle/>
           <a:p>
-            <a:endParaRPr lang="en-US"/>
+            <a:r>
+              <a:rPr lang="en-US" dirty="0" smtClean="0">
+                <a:solidFill>
+                  <a:srgbClr val="FFFFFF"/>
+                </a:solidFill>
+              </a:rPr>
+              <a:t>Sarah Stevens</a:t>
+            </a:r>
+          </a:p>
+          <a:p>
+            <a:r>
+              <a:rPr lang="en-US" dirty="0" smtClean="0">
+                <a:solidFill>
+                  <a:srgbClr val="FFFFFF"/>
+                </a:solidFill>
+              </a:rPr>
+              <a:t>MDTP</a:t>
+            </a:r>
+            <a:endParaRPr lang="en-US" dirty="0">
+              <a:solidFill>
+                <a:srgbClr val="FFFFFF"/>
+              </a:solidFill>
+            </a:endParaRPr>
           </a:p>
         </p:txBody>
       </p:sp>
@@ -3143,6 +3898,3372 @@
   <p:clrMapOvr>
     <a:masterClrMapping/>
   </p:clrMapOvr>
+  <p:timing>
+    <p:tnLst>
+      <p:par>
+        <p:cTn xmlns:p14="http://schemas.microsoft.com/office/powerpoint/2010/main" id="1" dur="indefinite" restart="never" nodeType="tmRoot"/>
+      </p:par>
+    </p:tnLst>
+  </p:timing>
+</p:sld>
+</file>
+
+<file path=ppt/slides/slide10.xml><?xml version="1.0" encoding="utf-8"?>
+<p:sld xmlns:a="http://schemas.openxmlformats.org/drawingml/2006/main" xmlns:r="http://schemas.openxmlformats.org/officeDocument/2006/relationships" xmlns:p="http://schemas.openxmlformats.org/presentationml/2006/main">
+  <p:cSld>
+    <p:spTree>
+      <p:nvGrpSpPr>
+        <p:cNvPr id="1" name=""/>
+        <p:cNvGrpSpPr/>
+        <p:nvPr/>
+      </p:nvGrpSpPr>
+      <p:grpSpPr>
+        <a:xfrm>
+          <a:off x="0" y="0"/>
+          <a:ext cx="0" cy="0"/>
+          <a:chOff x="0" y="0"/>
+          <a:chExt cx="0" cy="0"/>
+        </a:xfrm>
+      </p:grpSpPr>
+      <p:sp>
+        <p:nvSpPr>
+          <p:cNvPr id="2" name="Title 1"/>
+          <p:cNvSpPr>
+            <a:spLocks noGrp="1"/>
+          </p:cNvSpPr>
+          <p:nvPr>
+            <p:ph type="title"/>
+          </p:nvPr>
+        </p:nvSpPr>
+        <p:spPr/>
+        <p:txBody>
+          <a:bodyPr>
+            <a:noAutofit/>
+          </a:bodyPr>
+          <a:lstStyle/>
+          <a:p>
+            <a:r>
+              <a:rPr lang="en-US" sz="3200" dirty="0" smtClean="0"/>
+              <a:t>16S </a:t>
+            </a:r>
+            <a:r>
+              <a:rPr lang="en-US" sz="3200" dirty="0" err="1" smtClean="0"/>
+              <a:t>rRNA</a:t>
+            </a:r>
+            <a:r>
+              <a:rPr lang="en-US" sz="3200" dirty="0" smtClean="0"/>
+              <a:t> Gene Relationships Reflected in Gene Phylogeny</a:t>
+            </a:r>
+            <a:endParaRPr lang="en-US" sz="3200" dirty="0"/>
+          </a:p>
+        </p:txBody>
+      </p:sp>
+      <p:pic>
+        <p:nvPicPr>
+          <p:cNvPr id="5" name="Picture 4" descr="Figure 1A acI - tree.pdf"/>
+          <p:cNvPicPr>
+            <a:picLocks noChangeAspect="1"/>
+          </p:cNvPicPr>
+          <p:nvPr/>
+        </p:nvPicPr>
+        <p:blipFill>
+          <a:blip r:embed="rId3">
+            <a:extLst>
+              <a:ext uri="{28A0092B-C50C-407E-A947-70E740481C1C}">
+                <a14:useLocalDpi xmlns:a14="http://schemas.microsoft.com/office/drawing/2010/main" val="0"/>
+              </a:ext>
+            </a:extLst>
+          </a:blip>
+          <a:stretch>
+            <a:fillRect/>
+          </a:stretch>
+        </p:blipFill>
+        <p:spPr>
+          <a:xfrm>
+            <a:off x="958336" y="1222632"/>
+            <a:ext cx="6311900" cy="5257800"/>
+          </a:xfrm>
+          <a:prstGeom prst="rect">
+            <a:avLst/>
+          </a:prstGeom>
+        </p:spPr>
+      </p:pic>
+    </p:spTree>
+    <p:extLst>
+      <p:ext uri="{BB962C8B-B14F-4D97-AF65-F5344CB8AC3E}">
+        <p14:creationId xmlns:p14="http://schemas.microsoft.com/office/powerpoint/2010/main" val="4137511107"/>
+      </p:ext>
+    </p:extLst>
+  </p:cSld>
+  <p:clrMapOvr>
+    <a:masterClrMapping/>
+  </p:clrMapOvr>
+  <p:timing>
+    <p:tnLst>
+      <p:par>
+        <p:cTn xmlns:p14="http://schemas.microsoft.com/office/powerpoint/2010/main" id="1" dur="indefinite" restart="never" nodeType="tmRoot"/>
+      </p:par>
+    </p:tnLst>
+  </p:timing>
+</p:sld>
+</file>
+
+<file path=ppt/slides/slide11.xml><?xml version="1.0" encoding="utf-8"?>
+<p:sld xmlns:a="http://schemas.openxmlformats.org/drawingml/2006/main" xmlns:r="http://schemas.openxmlformats.org/officeDocument/2006/relationships" xmlns:p="http://schemas.openxmlformats.org/presentationml/2006/main">
+  <p:cSld>
+    <p:spTree>
+      <p:nvGrpSpPr>
+        <p:cNvPr id="1" name=""/>
+        <p:cNvGrpSpPr/>
+        <p:nvPr/>
+      </p:nvGrpSpPr>
+      <p:grpSpPr>
+        <a:xfrm>
+          <a:off x="0" y="0"/>
+          <a:ext cx="0" cy="0"/>
+          <a:chOff x="0" y="0"/>
+          <a:chExt cx="0" cy="0"/>
+        </a:xfrm>
+      </p:grpSpPr>
+      <p:sp>
+        <p:nvSpPr>
+          <p:cNvPr id="2" name="Title 1"/>
+          <p:cNvSpPr>
+            <a:spLocks noGrp="1"/>
+          </p:cNvSpPr>
+          <p:nvPr>
+            <p:ph type="title"/>
+          </p:nvPr>
+        </p:nvSpPr>
+        <p:spPr/>
+        <p:txBody>
+          <a:bodyPr>
+            <a:normAutofit fontScale="90000"/>
+          </a:bodyPr>
+          <a:lstStyle/>
+          <a:p>
+            <a:r>
+              <a:rPr lang="en-US" dirty="0" smtClean="0"/>
+              <a:t>SEQ-DISC PLOTS FOR ACI SEP BY MENDOTA VS. OTHER</a:t>
+            </a:r>
+            <a:endParaRPr lang="en-US" dirty="0"/>
+          </a:p>
+        </p:txBody>
+      </p:sp>
+      <p:sp>
+        <p:nvSpPr>
+          <p:cNvPr id="3" name="Content Placeholder 2"/>
+          <p:cNvSpPr>
+            <a:spLocks noGrp="1"/>
+          </p:cNvSpPr>
+          <p:nvPr>
+            <p:ph sz="half" idx="1"/>
+          </p:nvPr>
+        </p:nvSpPr>
+        <p:spPr/>
+        <p:txBody>
+          <a:bodyPr/>
+          <a:lstStyle/>
+          <a:p>
+            <a:endParaRPr lang="en-US"/>
+          </a:p>
+        </p:txBody>
+      </p:sp>
+      <p:sp>
+        <p:nvSpPr>
+          <p:cNvPr id="4" name="Content Placeholder 3"/>
+          <p:cNvSpPr>
+            <a:spLocks noGrp="1"/>
+          </p:cNvSpPr>
+          <p:nvPr>
+            <p:ph sz="half" idx="2"/>
+          </p:nvPr>
+        </p:nvSpPr>
+        <p:spPr/>
+        <p:txBody>
+          <a:bodyPr/>
+          <a:lstStyle/>
+          <a:p>
+            <a:endParaRPr lang="en-US"/>
+          </a:p>
+        </p:txBody>
+      </p:sp>
+    </p:spTree>
+    <p:extLst>
+      <p:ext uri="{BB962C8B-B14F-4D97-AF65-F5344CB8AC3E}">
+        <p14:creationId xmlns:p14="http://schemas.microsoft.com/office/powerpoint/2010/main" val="1881036576"/>
+      </p:ext>
+    </p:extLst>
+  </p:cSld>
+  <p:clrMapOvr>
+    <a:masterClrMapping/>
+  </p:clrMapOvr>
+</p:sld>
+</file>
+
+<file path=ppt/slides/slide12.xml><?xml version="1.0" encoding="utf-8"?>
+<p:sld xmlns:a="http://schemas.openxmlformats.org/drawingml/2006/main" xmlns:r="http://schemas.openxmlformats.org/officeDocument/2006/relationships" xmlns:p="http://schemas.openxmlformats.org/presentationml/2006/main">
+  <p:cSld>
+    <p:spTree>
+      <p:nvGrpSpPr>
+        <p:cNvPr id="1" name=""/>
+        <p:cNvGrpSpPr/>
+        <p:nvPr/>
+      </p:nvGrpSpPr>
+      <p:grpSpPr>
+        <a:xfrm>
+          <a:off x="0" y="0"/>
+          <a:ext cx="0" cy="0"/>
+          <a:chOff x="0" y="0"/>
+          <a:chExt cx="0" cy="0"/>
+        </a:xfrm>
+      </p:grpSpPr>
+      <p:sp>
+        <p:nvSpPr>
+          <p:cNvPr id="2" name="Title 1"/>
+          <p:cNvSpPr>
+            <a:spLocks noGrp="1"/>
+          </p:cNvSpPr>
+          <p:nvPr>
+            <p:ph type="title"/>
+          </p:nvPr>
+        </p:nvSpPr>
+        <p:spPr>
+          <a:xfrm>
+            <a:off x="457200" y="212853"/>
+            <a:ext cx="8229600" cy="1143000"/>
+          </a:xfrm>
+        </p:spPr>
+        <p:txBody>
+          <a:bodyPr>
+            <a:normAutofit fontScale="90000"/>
+          </a:bodyPr>
+          <a:lstStyle/>
+          <a:p>
+            <a:r>
+              <a:rPr lang="en-US" dirty="0" smtClean="0"/>
+              <a:t>SAGs Only Recruit Reads from the Same Sequence-discrete population</a:t>
+            </a:r>
+            <a:endParaRPr lang="en-US" dirty="0"/>
+          </a:p>
+        </p:txBody>
+      </p:sp>
+      <p:sp>
+        <p:nvSpPr>
+          <p:cNvPr id="3" name="Content Placeholder 2"/>
+          <p:cNvSpPr>
+            <a:spLocks noGrp="1"/>
+          </p:cNvSpPr>
+          <p:nvPr>
+            <p:ph sz="half" idx="1"/>
+          </p:nvPr>
+        </p:nvSpPr>
+        <p:spPr/>
+        <p:txBody>
+          <a:bodyPr/>
+          <a:lstStyle/>
+          <a:p>
+            <a:endParaRPr lang="en-US"/>
+          </a:p>
+        </p:txBody>
+      </p:sp>
+      <p:sp>
+        <p:nvSpPr>
+          <p:cNvPr id="4" name="Content Placeholder 3"/>
+          <p:cNvSpPr>
+            <a:spLocks noGrp="1"/>
+          </p:cNvSpPr>
+          <p:nvPr>
+            <p:ph sz="half" idx="2"/>
+          </p:nvPr>
+        </p:nvSpPr>
+        <p:spPr/>
+        <p:txBody>
+          <a:bodyPr/>
+          <a:lstStyle/>
+          <a:p>
+            <a:endParaRPr lang="en-US" dirty="0"/>
+          </a:p>
+        </p:txBody>
+      </p:sp>
+      <p:pic>
+        <p:nvPicPr>
+          <p:cNvPr id="5" name="Picture 4" descr="Figure 3 Density and recruitment.eps"/>
+          <p:cNvPicPr>
+            <a:picLocks noChangeAspect="1"/>
+          </p:cNvPicPr>
+          <p:nvPr/>
+        </p:nvPicPr>
+        <p:blipFill>
+          <a:blip r:embed="rId2">
+            <a:extLst>
+              <a:ext uri="{28A0092B-C50C-407E-A947-70E740481C1C}">
+                <a14:useLocalDpi xmlns:a14="http://schemas.microsoft.com/office/drawing/2010/main" val="0"/>
+              </a:ext>
+            </a:extLst>
+          </a:blip>
+          <a:stretch>
+            <a:fillRect/>
+          </a:stretch>
+        </p:blipFill>
+        <p:spPr>
+          <a:xfrm>
+            <a:off x="1384127" y="1431368"/>
+            <a:ext cx="5858991" cy="5363562"/>
+          </a:xfrm>
+          <a:prstGeom prst="rect">
+            <a:avLst/>
+          </a:prstGeom>
+        </p:spPr>
+      </p:pic>
+    </p:spTree>
+    <p:extLst>
+      <p:ext uri="{BB962C8B-B14F-4D97-AF65-F5344CB8AC3E}">
+        <p14:creationId xmlns:p14="http://schemas.microsoft.com/office/powerpoint/2010/main" val="2359118481"/>
+      </p:ext>
+    </p:extLst>
+  </p:cSld>
+  <p:clrMapOvr>
+    <a:masterClrMapping/>
+  </p:clrMapOvr>
+</p:sld>
+</file>
+
+<file path=ppt/slides/slide13.xml><?xml version="1.0" encoding="utf-8"?>
+<p:sld xmlns:a="http://schemas.openxmlformats.org/drawingml/2006/main" xmlns:r="http://schemas.openxmlformats.org/officeDocument/2006/relationships" xmlns:p="http://schemas.openxmlformats.org/presentationml/2006/main">
+  <p:cSld>
+    <p:spTree>
+      <p:nvGrpSpPr>
+        <p:cNvPr id="1" name=""/>
+        <p:cNvGrpSpPr/>
+        <p:nvPr/>
+      </p:nvGrpSpPr>
+      <p:grpSpPr>
+        <a:xfrm>
+          <a:off x="0" y="0"/>
+          <a:ext cx="0" cy="0"/>
+          <a:chOff x="0" y="0"/>
+          <a:chExt cx="0" cy="0"/>
+        </a:xfrm>
+      </p:grpSpPr>
+      <p:sp>
+        <p:nvSpPr>
+          <p:cNvPr id="2" name="Title 1"/>
+          <p:cNvSpPr>
+            <a:spLocks noGrp="1"/>
+          </p:cNvSpPr>
+          <p:nvPr>
+            <p:ph type="title"/>
+          </p:nvPr>
+        </p:nvSpPr>
+        <p:spPr/>
+        <p:txBody>
+          <a:bodyPr>
+            <a:noAutofit/>
+          </a:bodyPr>
+          <a:lstStyle/>
+          <a:p>
+            <a:r>
+              <a:rPr lang="en-US" sz="3600" dirty="0" smtClean="0"/>
+              <a:t>J17 Represents the Most Abundant Sequence-discrete Population</a:t>
+            </a:r>
+            <a:endParaRPr lang="en-US" sz="3600" dirty="0"/>
+          </a:p>
+        </p:txBody>
+      </p:sp>
+      <p:pic>
+        <p:nvPicPr>
+          <p:cNvPr id="4" name="Picture 3" descr="Figure 4 heatmap_MendotaSAGs_13Nov14.eps"/>
+          <p:cNvPicPr>
+            <a:picLocks noChangeAspect="1"/>
+          </p:cNvPicPr>
+          <p:nvPr/>
+        </p:nvPicPr>
+        <p:blipFill>
+          <a:blip r:embed="rId3">
+            <a:extLst>
+              <a:ext uri="{28A0092B-C50C-407E-A947-70E740481C1C}">
+                <a14:useLocalDpi xmlns:a14="http://schemas.microsoft.com/office/drawing/2010/main" val="0"/>
+              </a:ext>
+            </a:extLst>
+          </a:blip>
+          <a:stretch>
+            <a:fillRect/>
+          </a:stretch>
+        </p:blipFill>
+        <p:spPr>
+          <a:xfrm>
+            <a:off x="307888" y="1517136"/>
+            <a:ext cx="8562641" cy="4578864"/>
+          </a:xfrm>
+          <a:prstGeom prst="rect">
+            <a:avLst/>
+          </a:prstGeom>
+        </p:spPr>
+      </p:pic>
+    </p:spTree>
+    <p:extLst>
+      <p:ext uri="{BB962C8B-B14F-4D97-AF65-F5344CB8AC3E}">
+        <p14:creationId xmlns:p14="http://schemas.microsoft.com/office/powerpoint/2010/main" val="3019834593"/>
+      </p:ext>
+    </p:extLst>
+  </p:cSld>
+  <p:clrMapOvr>
+    <a:masterClrMapping/>
+  </p:clrMapOvr>
+</p:sld>
+</file>
+
+<file path=ppt/slides/slide14.xml><?xml version="1.0" encoding="utf-8"?>
+<p:sld xmlns:a="http://schemas.openxmlformats.org/drawingml/2006/main" xmlns:r="http://schemas.openxmlformats.org/officeDocument/2006/relationships" xmlns:p="http://schemas.openxmlformats.org/presentationml/2006/main">
+  <p:cSld>
+    <p:spTree>
+      <p:nvGrpSpPr>
+        <p:cNvPr id="1" name=""/>
+        <p:cNvGrpSpPr/>
+        <p:nvPr/>
+      </p:nvGrpSpPr>
+      <p:grpSpPr>
+        <a:xfrm>
+          <a:off x="0" y="0"/>
+          <a:ext cx="0" cy="0"/>
+          <a:chOff x="0" y="0"/>
+          <a:chExt cx="0" cy="0"/>
+        </a:xfrm>
+      </p:grpSpPr>
+      <p:sp>
+        <p:nvSpPr>
+          <p:cNvPr id="2" name="Title 1"/>
+          <p:cNvSpPr>
+            <a:spLocks noGrp="1"/>
+          </p:cNvSpPr>
+          <p:nvPr>
+            <p:ph type="title"/>
+          </p:nvPr>
+        </p:nvSpPr>
+        <p:spPr/>
+        <p:txBody>
+          <a:bodyPr/>
+          <a:lstStyle/>
+          <a:p>
+            <a:endParaRPr lang="en-US"/>
+          </a:p>
+        </p:txBody>
+      </p:sp>
+      <p:sp>
+        <p:nvSpPr>
+          <p:cNvPr id="3" name="Content Placeholder 2"/>
+          <p:cNvSpPr>
+            <a:spLocks noGrp="1"/>
+          </p:cNvSpPr>
+          <p:nvPr>
+            <p:ph idx="1"/>
+          </p:nvPr>
+        </p:nvSpPr>
+        <p:spPr/>
+        <p:txBody>
+          <a:bodyPr/>
+          <a:lstStyle/>
+          <a:p>
+            <a:endParaRPr lang="en-US" dirty="0"/>
+          </a:p>
+        </p:txBody>
+      </p:sp>
+      <p:sp>
+        <p:nvSpPr>
+          <p:cNvPr id="4" name="Rectangle 3"/>
+          <p:cNvSpPr/>
+          <p:nvPr/>
+        </p:nvSpPr>
+        <p:spPr>
+          <a:xfrm>
+            <a:off x="2286000" y="3105835"/>
+            <a:ext cx="4572000" cy="646331"/>
+          </a:xfrm>
+          <a:prstGeom prst="rect">
+            <a:avLst/>
+          </a:prstGeom>
+        </p:spPr>
+        <p:txBody>
+          <a:bodyPr>
+            <a:spAutoFit/>
+          </a:bodyPr>
+          <a:lstStyle/>
+          <a:p>
+            <a:endParaRPr lang="en-US" dirty="0"/>
+          </a:p>
+          <a:p>
+            <a:endParaRPr lang="en-US" dirty="0"/>
+          </a:p>
+        </p:txBody>
+      </p:sp>
+      <p:pic>
+        <p:nvPicPr>
+          <p:cNvPr id="7" name="Picture 6" descr="CorderoPolz_genefreq.png"/>
+          <p:cNvPicPr>
+            <a:picLocks noChangeAspect="1"/>
+          </p:cNvPicPr>
+          <p:nvPr/>
+        </p:nvPicPr>
+        <p:blipFill>
+          <a:blip r:embed="rId2">
+            <a:extLst>
+              <a:ext uri="{28A0092B-C50C-407E-A947-70E740481C1C}">
+                <a14:useLocalDpi xmlns:a14="http://schemas.microsoft.com/office/drawing/2010/main" val="0"/>
+              </a:ext>
+            </a:extLst>
+          </a:blip>
+          <a:stretch>
+            <a:fillRect/>
+          </a:stretch>
+        </p:blipFill>
+        <p:spPr>
+          <a:xfrm>
+            <a:off x="403652" y="417037"/>
+            <a:ext cx="4491362" cy="5979298"/>
+          </a:xfrm>
+          <a:prstGeom prst="rect">
+            <a:avLst/>
+          </a:prstGeom>
+        </p:spPr>
+      </p:pic>
+      <p:sp>
+        <p:nvSpPr>
+          <p:cNvPr id="8" name="Rectangle 7"/>
+          <p:cNvSpPr/>
+          <p:nvPr/>
+        </p:nvSpPr>
+        <p:spPr>
+          <a:xfrm>
+            <a:off x="457200" y="6396335"/>
+            <a:ext cx="8229600" cy="461665"/>
+          </a:xfrm>
+          <a:prstGeom prst="rect">
+            <a:avLst/>
+          </a:prstGeom>
+        </p:spPr>
+        <p:txBody>
+          <a:bodyPr wrap="square">
+            <a:spAutoFit/>
+          </a:bodyPr>
+          <a:lstStyle/>
+          <a:p>
+            <a:r>
+              <a:rPr lang="en-US" sz="1200" dirty="0" smtClean="0"/>
+              <a:t>Cordero, O. X., &amp; </a:t>
+            </a:r>
+            <a:r>
+              <a:rPr lang="en-US" sz="1200" dirty="0" err="1" smtClean="0"/>
+              <a:t>Polz</a:t>
+            </a:r>
+            <a:r>
+              <a:rPr lang="en-US" sz="1200" dirty="0" smtClean="0"/>
+              <a:t>, M. F. (2014). Explaining microbial genomic diversity in light of evolutionary ecology. Nature Reviews. Microbiology, 12(4), 263–73. doi:10.1038/nrmicro3218</a:t>
+            </a:r>
+            <a:endParaRPr lang="en-US" sz="1200" dirty="0"/>
+          </a:p>
+        </p:txBody>
+      </p:sp>
+      <p:sp>
+        <p:nvSpPr>
+          <p:cNvPr id="9" name="TextBox 8"/>
+          <p:cNvSpPr txBox="1"/>
+          <p:nvPr/>
+        </p:nvSpPr>
+        <p:spPr>
+          <a:xfrm>
+            <a:off x="4977027" y="1201350"/>
+            <a:ext cx="3851189" cy="3970318"/>
+          </a:xfrm>
+          <a:prstGeom prst="rect">
+            <a:avLst/>
+          </a:prstGeom>
+          <a:noFill/>
+        </p:spPr>
+        <p:txBody>
+          <a:bodyPr wrap="square" rtlCol="0">
+            <a:spAutoFit/>
+          </a:bodyPr>
+          <a:lstStyle/>
+          <a:p>
+            <a:pPr marL="285750" indent="-285750">
+              <a:buFont typeface="Arial"/>
+              <a:buChar char="•"/>
+            </a:pPr>
+            <a:r>
+              <a:rPr lang="en-US" dirty="0" smtClean="0"/>
+              <a:t>High frequency </a:t>
+            </a:r>
+            <a:r>
+              <a:rPr lang="en-US" dirty="0"/>
+              <a:t>g</a:t>
+            </a:r>
+            <a:r>
+              <a:rPr lang="en-US" dirty="0" smtClean="0"/>
+              <a:t>enes</a:t>
+            </a:r>
+          </a:p>
+          <a:p>
+            <a:pPr marL="742950" lvl="1" indent="-285750">
+              <a:buFont typeface="Arial"/>
+              <a:buChar char="•"/>
+            </a:pPr>
+            <a:r>
+              <a:rPr lang="en-US" dirty="0" smtClean="0"/>
+              <a:t>evolve </a:t>
+            </a:r>
+            <a:r>
+              <a:rPr lang="en-US" dirty="0"/>
+              <a:t>by vertical inheritance </a:t>
+            </a:r>
+            <a:r>
+              <a:rPr lang="en-US" dirty="0" smtClean="0"/>
+              <a:t>and </a:t>
+            </a:r>
+            <a:r>
+              <a:rPr lang="en-US" dirty="0"/>
+              <a:t>homologous </a:t>
+            </a:r>
+            <a:r>
+              <a:rPr lang="en-US" dirty="0" smtClean="0"/>
+              <a:t>recombination</a:t>
+            </a:r>
+            <a:endParaRPr lang="en-US" dirty="0"/>
+          </a:p>
+          <a:p>
+            <a:pPr marL="742950" lvl="1" indent="-285750">
+              <a:buFont typeface="Arial"/>
+              <a:buChar char="•"/>
+            </a:pPr>
+            <a:r>
+              <a:rPr lang="en-US" dirty="0" smtClean="0"/>
+              <a:t>probably </a:t>
+            </a:r>
+            <a:r>
+              <a:rPr lang="en-US" dirty="0"/>
+              <a:t>encode essential metabolic and housekeeping functions that are under purifying </a:t>
+            </a:r>
+            <a:r>
+              <a:rPr lang="en-US" dirty="0" smtClean="0"/>
+              <a:t>selection</a:t>
+            </a:r>
+          </a:p>
+          <a:p>
+            <a:pPr marL="285750" indent="-285750">
+              <a:buFont typeface="Arial"/>
+              <a:buChar char="•"/>
+            </a:pPr>
+            <a:r>
+              <a:rPr lang="en-US" dirty="0" smtClean="0"/>
+              <a:t>Low frequency genes</a:t>
+            </a:r>
+          </a:p>
+          <a:p>
+            <a:pPr marL="742950" lvl="1" indent="-285750">
+              <a:buFont typeface="Arial"/>
+              <a:buChar char="•"/>
+            </a:pPr>
+            <a:r>
+              <a:rPr lang="en-US" dirty="0"/>
+              <a:t>gained and lost at </a:t>
+            </a:r>
+            <a:r>
+              <a:rPr lang="en-US" dirty="0" smtClean="0"/>
+              <a:t>high rates</a:t>
+            </a:r>
+          </a:p>
+          <a:p>
+            <a:pPr marL="742950" lvl="1" indent="-285750">
+              <a:buFont typeface="Arial"/>
+              <a:buChar char="•"/>
+            </a:pPr>
+            <a:r>
+              <a:rPr lang="en-US" dirty="0"/>
+              <a:t>selectively neutral </a:t>
+            </a:r>
+            <a:r>
+              <a:rPr lang="en-US" dirty="0" smtClean="0"/>
+              <a:t>or under strong negative frequency-dependent selection</a:t>
+            </a:r>
+          </a:p>
+          <a:p>
+            <a:pPr marL="742950" lvl="1" indent="-285750">
+              <a:buFont typeface="Arial"/>
+              <a:buChar char="•"/>
+            </a:pPr>
+            <a:endParaRPr lang="en-US" dirty="0" smtClean="0"/>
+          </a:p>
+        </p:txBody>
+      </p:sp>
+    </p:spTree>
+    <p:extLst>
+      <p:ext uri="{BB962C8B-B14F-4D97-AF65-F5344CB8AC3E}">
+        <p14:creationId xmlns:p14="http://schemas.microsoft.com/office/powerpoint/2010/main" val="239733968"/>
+      </p:ext>
+    </p:extLst>
+  </p:cSld>
+  <p:clrMapOvr>
+    <a:masterClrMapping/>
+  </p:clrMapOvr>
+</p:sld>
+</file>
+
+<file path=ppt/slides/slide2.xml><?xml version="1.0" encoding="utf-8"?>
+<p:sld xmlns:a="http://schemas.openxmlformats.org/drawingml/2006/main" xmlns:r="http://schemas.openxmlformats.org/officeDocument/2006/relationships" xmlns:p="http://schemas.openxmlformats.org/presentationml/2006/main">
+  <p:cSld>
+    <p:spTree>
+      <p:nvGrpSpPr>
+        <p:cNvPr id="1" name=""/>
+        <p:cNvGrpSpPr/>
+        <p:nvPr/>
+      </p:nvGrpSpPr>
+      <p:grpSpPr>
+        <a:xfrm>
+          <a:off x="0" y="0"/>
+          <a:ext cx="0" cy="0"/>
+          <a:chOff x="0" y="0"/>
+          <a:chExt cx="0" cy="0"/>
+        </a:xfrm>
+      </p:grpSpPr>
+      <p:sp>
+        <p:nvSpPr>
+          <p:cNvPr id="2" name="Title 1"/>
+          <p:cNvSpPr>
+            <a:spLocks noGrp="1"/>
+          </p:cNvSpPr>
+          <p:nvPr>
+            <p:ph type="title"/>
+          </p:nvPr>
+        </p:nvSpPr>
+        <p:spPr/>
+        <p:txBody>
+          <a:bodyPr/>
+          <a:lstStyle/>
+          <a:p>
+            <a:r>
+              <a:rPr lang="en-US" dirty="0" smtClean="0"/>
+              <a:t>Agenda</a:t>
+            </a:r>
+            <a:endParaRPr lang="en-US" dirty="0"/>
+          </a:p>
+        </p:txBody>
+      </p:sp>
+      <p:sp>
+        <p:nvSpPr>
+          <p:cNvPr id="3" name="Content Placeholder 2"/>
+          <p:cNvSpPr>
+            <a:spLocks noGrp="1"/>
+          </p:cNvSpPr>
+          <p:nvPr>
+            <p:ph idx="1"/>
+          </p:nvPr>
+        </p:nvSpPr>
+        <p:spPr/>
+        <p:txBody>
+          <a:bodyPr/>
+          <a:lstStyle/>
+          <a:p>
+            <a:endParaRPr lang="en-US"/>
+          </a:p>
+        </p:txBody>
+      </p:sp>
+    </p:spTree>
+    <p:extLst>
+      <p:ext uri="{BB962C8B-B14F-4D97-AF65-F5344CB8AC3E}">
+        <p14:creationId xmlns:p14="http://schemas.microsoft.com/office/powerpoint/2010/main" val="1535975497"/>
+      </p:ext>
+    </p:extLst>
+  </p:cSld>
+  <p:clrMapOvr>
+    <a:masterClrMapping/>
+  </p:clrMapOvr>
+</p:sld>
+</file>
+
+<file path=ppt/slides/slide3.xml><?xml version="1.0" encoding="utf-8"?>
+<p:sld xmlns:a="http://schemas.openxmlformats.org/drawingml/2006/main" xmlns:r="http://schemas.openxmlformats.org/officeDocument/2006/relationships" xmlns:p="http://schemas.openxmlformats.org/presentationml/2006/main">
+  <p:cSld>
+    <p:spTree>
+      <p:nvGrpSpPr>
+        <p:cNvPr id="1" name=""/>
+        <p:cNvGrpSpPr/>
+        <p:nvPr/>
+      </p:nvGrpSpPr>
+      <p:grpSpPr>
+        <a:xfrm>
+          <a:off x="0" y="0"/>
+          <a:ext cx="0" cy="0"/>
+          <a:chOff x="0" y="0"/>
+          <a:chExt cx="0" cy="0"/>
+        </a:xfrm>
+      </p:grpSpPr>
+      <p:sp>
+        <p:nvSpPr>
+          <p:cNvPr id="2" name="Title 1"/>
+          <p:cNvSpPr>
+            <a:spLocks noGrp="1"/>
+          </p:cNvSpPr>
+          <p:nvPr>
+            <p:ph type="title"/>
+          </p:nvPr>
+        </p:nvSpPr>
+        <p:spPr/>
+        <p:txBody>
+          <a:bodyPr/>
+          <a:lstStyle/>
+          <a:p>
+            <a:endParaRPr lang="en-US"/>
+          </a:p>
+        </p:txBody>
+      </p:sp>
+      <p:pic>
+        <p:nvPicPr>
+          <p:cNvPr id="6" name="Picture 5"/>
+          <p:cNvPicPr>
+            <a:picLocks noChangeAspect="1"/>
+          </p:cNvPicPr>
+          <p:nvPr/>
+        </p:nvPicPr>
+        <p:blipFill>
+          <a:blip r:embed="rId2"/>
+          <a:stretch>
+            <a:fillRect/>
+          </a:stretch>
+        </p:blipFill>
+        <p:spPr>
+          <a:xfrm>
+            <a:off x="1795849" y="96106"/>
+            <a:ext cx="5546612" cy="6322541"/>
+          </a:xfrm>
+          <a:prstGeom prst="rect">
+            <a:avLst/>
+          </a:prstGeom>
+        </p:spPr>
+      </p:pic>
+      <p:sp>
+        <p:nvSpPr>
+          <p:cNvPr id="7" name="Content Placeholder 6"/>
+          <p:cNvSpPr>
+            <a:spLocks noGrp="1"/>
+          </p:cNvSpPr>
+          <p:nvPr>
+            <p:ph idx="1"/>
+          </p:nvPr>
+        </p:nvSpPr>
+        <p:spPr/>
+        <p:txBody>
+          <a:bodyPr/>
+          <a:lstStyle/>
+          <a:p>
+            <a:endParaRPr lang="en-US" dirty="0"/>
+          </a:p>
+        </p:txBody>
+      </p:sp>
+      <p:sp>
+        <p:nvSpPr>
+          <p:cNvPr id="8" name="Rectangle 7"/>
+          <p:cNvSpPr/>
+          <p:nvPr/>
+        </p:nvSpPr>
+        <p:spPr>
+          <a:xfrm>
+            <a:off x="851243" y="6402982"/>
+            <a:ext cx="7935784" cy="430887"/>
+          </a:xfrm>
+          <a:prstGeom prst="rect">
+            <a:avLst/>
+          </a:prstGeom>
+        </p:spPr>
+        <p:txBody>
+          <a:bodyPr wrap="square">
+            <a:spAutoFit/>
+          </a:bodyPr>
+          <a:lstStyle/>
+          <a:p>
+            <a:r>
+              <a:rPr lang="en-US" sz="1100" dirty="0" err="1" smtClean="0"/>
+              <a:t>Konstantinidis</a:t>
+            </a:r>
+            <a:r>
+              <a:rPr lang="en-US" sz="1100" dirty="0" smtClean="0"/>
+              <a:t>, K. T., &amp; </a:t>
+            </a:r>
+            <a:r>
+              <a:rPr lang="en-US" sz="1100" dirty="0" err="1" smtClean="0"/>
+              <a:t>Rosselló-Móra</a:t>
+            </a:r>
+            <a:r>
+              <a:rPr lang="en-US" sz="1100" dirty="0" smtClean="0"/>
+              <a:t>, R. (2015). Classifying the uncultivated microbial majority: A place for metagenomic data in the </a:t>
+            </a:r>
+            <a:r>
+              <a:rPr lang="en-US" sz="1100" dirty="0" err="1" smtClean="0"/>
+              <a:t>Candidatus</a:t>
+            </a:r>
+            <a:r>
+              <a:rPr lang="en-US" sz="1100" dirty="0" smtClean="0"/>
+              <a:t> proposal. Systematic and Applied Microbiology, 38(4), 223–230.</a:t>
+            </a:r>
+            <a:endParaRPr lang="en-US" sz="1100" dirty="0"/>
+          </a:p>
+        </p:txBody>
+      </p:sp>
+    </p:spTree>
+    <p:extLst>
+      <p:ext uri="{BB962C8B-B14F-4D97-AF65-F5344CB8AC3E}">
+        <p14:creationId xmlns:p14="http://schemas.microsoft.com/office/powerpoint/2010/main" val="2936954225"/>
+      </p:ext>
+    </p:extLst>
+  </p:cSld>
+  <p:clrMapOvr>
+    <a:masterClrMapping/>
+  </p:clrMapOvr>
+  <p:timing>
+    <p:tnLst>
+      <p:par>
+        <p:cTn xmlns:p14="http://schemas.microsoft.com/office/powerpoint/2010/main" id="1" dur="indefinite" restart="never" nodeType="tmRoot"/>
+      </p:par>
+    </p:tnLst>
+  </p:timing>
+</p:sld>
+</file>
+
+<file path=ppt/slides/slide4.xml><?xml version="1.0" encoding="utf-8"?>
+<p:sld xmlns:a="http://schemas.openxmlformats.org/drawingml/2006/main" xmlns:r="http://schemas.openxmlformats.org/officeDocument/2006/relationships" xmlns:p="http://schemas.openxmlformats.org/presentationml/2006/main">
+  <p:cSld>
+    <p:spTree>
+      <p:nvGrpSpPr>
+        <p:cNvPr id="1" name=""/>
+        <p:cNvGrpSpPr/>
+        <p:nvPr/>
+      </p:nvGrpSpPr>
+      <p:grpSpPr>
+        <a:xfrm>
+          <a:off x="0" y="0"/>
+          <a:ext cx="0" cy="0"/>
+          <a:chOff x="0" y="0"/>
+          <a:chExt cx="0" cy="0"/>
+        </a:xfrm>
+      </p:grpSpPr>
+      <p:sp>
+        <p:nvSpPr>
+          <p:cNvPr id="2" name="Title 1"/>
+          <p:cNvSpPr>
+            <a:spLocks noGrp="1"/>
+          </p:cNvSpPr>
+          <p:nvPr>
+            <p:ph type="title"/>
+          </p:nvPr>
+        </p:nvSpPr>
+        <p:spPr/>
+        <p:txBody>
+          <a:bodyPr>
+            <a:noAutofit/>
+          </a:bodyPr>
+          <a:lstStyle/>
+          <a:p>
+            <a:r>
+              <a:rPr lang="en-US" sz="3200" dirty="0" smtClean="0"/>
+              <a:t>All Genomes Assembled from Metagenomes Show Sequence-discrete Pattern</a:t>
+            </a:r>
+            <a:endParaRPr lang="en-US" sz="3200" dirty="0"/>
+          </a:p>
+        </p:txBody>
+      </p:sp>
+      <p:sp>
+        <p:nvSpPr>
+          <p:cNvPr id="3" name="Content Placeholder 2"/>
+          <p:cNvSpPr>
+            <a:spLocks noGrp="1"/>
+          </p:cNvSpPr>
+          <p:nvPr>
+            <p:ph idx="1"/>
+          </p:nvPr>
+        </p:nvSpPr>
+        <p:spPr/>
+        <p:txBody>
+          <a:bodyPr/>
+          <a:lstStyle/>
+          <a:p>
+            <a:endParaRPr lang="en-US" dirty="0"/>
+          </a:p>
+        </p:txBody>
+      </p:sp>
+      <p:pic>
+        <p:nvPicPr>
+          <p:cNvPr id="4" name="Picture 3"/>
+          <p:cNvPicPr>
+            <a:picLocks/>
+          </p:cNvPicPr>
+          <p:nvPr/>
+        </p:nvPicPr>
+        <p:blipFill>
+          <a:blip r:embed="rId2"/>
+          <a:stretch>
+            <a:fillRect/>
+          </a:stretch>
+        </p:blipFill>
+        <p:spPr>
+          <a:xfrm>
+            <a:off x="2257066" y="2134972"/>
+            <a:ext cx="4408965" cy="3650735"/>
+          </a:xfrm>
+          <a:prstGeom prst="rect">
+            <a:avLst/>
+          </a:prstGeom>
+        </p:spPr>
+      </p:pic>
+    </p:spTree>
+    <p:extLst>
+      <p:ext uri="{BB962C8B-B14F-4D97-AF65-F5344CB8AC3E}">
+        <p14:creationId xmlns:p14="http://schemas.microsoft.com/office/powerpoint/2010/main" val="2602213926"/>
+      </p:ext>
+    </p:extLst>
+  </p:cSld>
+  <p:clrMapOvr>
+    <a:masterClrMapping/>
+  </p:clrMapOvr>
+  <p:timing>
+    <p:tnLst>
+      <p:par>
+        <p:cTn xmlns:p14="http://schemas.microsoft.com/office/powerpoint/2010/main" id="1" dur="indefinite" restart="never" nodeType="tmRoot"/>
+      </p:par>
+    </p:tnLst>
+  </p:timing>
+</p:sld>
+</file>
+
+<file path=ppt/slides/slide5.xml><?xml version="1.0" encoding="utf-8"?>
+<p:sld xmlns:a="http://schemas.openxmlformats.org/drawingml/2006/main" xmlns:r="http://schemas.openxmlformats.org/officeDocument/2006/relationships" xmlns:p="http://schemas.openxmlformats.org/presentationml/2006/main">
+  <p:cSld>
+    <p:spTree>
+      <p:nvGrpSpPr>
+        <p:cNvPr id="1" name=""/>
+        <p:cNvGrpSpPr/>
+        <p:nvPr/>
+      </p:nvGrpSpPr>
+      <p:grpSpPr>
+        <a:xfrm>
+          <a:off x="0" y="0"/>
+          <a:ext cx="0" cy="0"/>
+          <a:chOff x="0" y="0"/>
+          <a:chExt cx="0" cy="0"/>
+        </a:xfrm>
+      </p:grpSpPr>
+      <p:pic>
+        <p:nvPicPr>
+          <p:cNvPr id="4" name="Content Placeholder 3" descr="Speciation_Models.pdf"/>
+          <p:cNvPicPr>
+            <a:picLocks noGrp="1" noChangeAspect="1"/>
+          </p:cNvPicPr>
+          <p:nvPr>
+            <p:ph sz="half" idx="2"/>
+          </p:nvPr>
+        </p:nvPicPr>
+        <p:blipFill>
+          <a:blip r:embed="rId3">
+            <a:extLst>
+              <a:ext uri="{28A0092B-C50C-407E-A947-70E740481C1C}">
+                <a14:useLocalDpi xmlns:a14="http://schemas.microsoft.com/office/drawing/2010/main" val="0"/>
+              </a:ext>
+            </a:extLst>
+          </a:blip>
+          <a:srcRect t="-46058" b="-46058"/>
+          <a:stretch>
+            <a:fillRect/>
+          </a:stretch>
+        </p:blipFill>
+        <p:spPr>
+          <a:xfrm>
+            <a:off x="773406" y="-717975"/>
+            <a:ext cx="7744060" cy="8678584"/>
+          </a:xfrm>
+        </p:spPr>
+      </p:pic>
+      <p:sp>
+        <p:nvSpPr>
+          <p:cNvPr id="2" name="Title 1"/>
+          <p:cNvSpPr>
+            <a:spLocks noGrp="1"/>
+          </p:cNvSpPr>
+          <p:nvPr>
+            <p:ph type="title"/>
+          </p:nvPr>
+        </p:nvSpPr>
+        <p:spPr>
+          <a:xfrm>
+            <a:off x="457200" y="171663"/>
+            <a:ext cx="8229600" cy="1143000"/>
+          </a:xfrm>
+        </p:spPr>
+        <p:txBody>
+          <a:bodyPr>
+            <a:normAutofit/>
+          </a:bodyPr>
+          <a:lstStyle/>
+          <a:p>
+            <a:r>
+              <a:rPr lang="en-US" dirty="0" smtClean="0"/>
+              <a:t>Speciation Models</a:t>
+            </a:r>
+            <a:endParaRPr lang="en-US" dirty="0"/>
+          </a:p>
+        </p:txBody>
+      </p:sp>
+      <p:sp>
+        <p:nvSpPr>
+          <p:cNvPr id="10" name="TextBox 9"/>
+          <p:cNvSpPr txBox="1"/>
+          <p:nvPr/>
+        </p:nvSpPr>
+        <p:spPr>
+          <a:xfrm>
+            <a:off x="1082440" y="6031886"/>
+            <a:ext cx="7261441" cy="430887"/>
+          </a:xfrm>
+          <a:prstGeom prst="rect">
+            <a:avLst/>
+          </a:prstGeom>
+          <a:noFill/>
+        </p:spPr>
+        <p:txBody>
+          <a:bodyPr wrap="square" rtlCol="0">
+            <a:spAutoFit/>
+          </a:bodyPr>
+          <a:lstStyle/>
+          <a:p>
+            <a:r>
+              <a:rPr lang="en-US" sz="1100" dirty="0" smtClean="0"/>
+              <a:t>Shapiro</a:t>
+            </a:r>
+            <a:r>
+              <a:rPr lang="en-US" sz="1100" dirty="0"/>
+              <a:t>, B. J., &amp; </a:t>
+            </a:r>
+            <a:r>
+              <a:rPr lang="en-US" sz="1100" dirty="0" err="1"/>
+              <a:t>Polz</a:t>
+            </a:r>
+            <a:r>
+              <a:rPr lang="en-US" sz="1100" dirty="0"/>
+              <a:t>, M. F. (2014). Ordering microbial diversity into ecologically and genetically cohesive units. Trends in Microbiology, 22(5), 235–</a:t>
+            </a:r>
+            <a:r>
+              <a:rPr lang="en-US" sz="1100" dirty="0" smtClean="0"/>
+              <a:t>247</a:t>
+            </a:r>
+            <a:r>
+              <a:rPr lang="en-US" sz="1100" dirty="0"/>
+              <a:t>.</a:t>
+            </a:r>
+            <a:endParaRPr lang="en-US" sz="1100" dirty="0" smtClean="0"/>
+          </a:p>
+        </p:txBody>
+      </p:sp>
+    </p:spTree>
+    <p:extLst>
+      <p:ext uri="{BB962C8B-B14F-4D97-AF65-F5344CB8AC3E}">
+        <p14:creationId xmlns:p14="http://schemas.microsoft.com/office/powerpoint/2010/main" val="2066464245"/>
+      </p:ext>
+    </p:extLst>
+  </p:cSld>
+  <p:clrMapOvr>
+    <a:masterClrMapping/>
+  </p:clrMapOvr>
+  <p:timing>
+    <p:tnLst>
+      <p:par>
+        <p:cTn xmlns:p14="http://schemas.microsoft.com/office/powerpoint/2010/main" id="1" dur="indefinite" restart="never" nodeType="tmRoot"/>
+      </p:par>
+    </p:tnLst>
+  </p:timing>
+</p:sld>
+</file>
+
+<file path=ppt/slides/slide6.xml><?xml version="1.0" encoding="utf-8"?>
+<p:sld xmlns:a="http://schemas.openxmlformats.org/drawingml/2006/main" xmlns:r="http://schemas.openxmlformats.org/officeDocument/2006/relationships" xmlns:p="http://schemas.openxmlformats.org/presentationml/2006/main">
+  <p:cSld>
+    <p:spTree>
+      <p:nvGrpSpPr>
+        <p:cNvPr id="1" name=""/>
+        <p:cNvGrpSpPr/>
+        <p:nvPr/>
+      </p:nvGrpSpPr>
+      <p:grpSpPr>
+        <a:xfrm>
+          <a:off x="0" y="0"/>
+          <a:ext cx="0" cy="0"/>
+          <a:chOff x="0" y="0"/>
+          <a:chExt cx="0" cy="0"/>
+        </a:xfrm>
+      </p:grpSpPr>
+      <p:sp>
+        <p:nvSpPr>
+          <p:cNvPr id="2" name="Title 1"/>
+          <p:cNvSpPr>
+            <a:spLocks noGrp="1"/>
+          </p:cNvSpPr>
+          <p:nvPr>
+            <p:ph type="title"/>
+          </p:nvPr>
+        </p:nvSpPr>
+        <p:spPr>
+          <a:xfrm>
+            <a:off x="457200" y="116743"/>
+            <a:ext cx="8229600" cy="1143000"/>
+          </a:xfrm>
+        </p:spPr>
+        <p:txBody>
+          <a:bodyPr>
+            <a:noAutofit/>
+          </a:bodyPr>
+          <a:lstStyle/>
+          <a:p>
+            <a:r>
+              <a:rPr lang="en-US" sz="3600" dirty="0" smtClean="0"/>
+              <a:t>The SNPs for Most Sequence-discrete Populations Show No Trend</a:t>
+            </a:r>
+            <a:endParaRPr lang="en-US" sz="3600" dirty="0"/>
+          </a:p>
+        </p:txBody>
+      </p:sp>
+      <p:sp>
+        <p:nvSpPr>
+          <p:cNvPr id="3" name="Content Placeholder 2"/>
+          <p:cNvSpPr>
+            <a:spLocks noGrp="1"/>
+          </p:cNvSpPr>
+          <p:nvPr>
+            <p:ph sz="half" idx="1"/>
+          </p:nvPr>
+        </p:nvSpPr>
+        <p:spPr/>
+        <p:txBody>
+          <a:bodyPr/>
+          <a:lstStyle/>
+          <a:p>
+            <a:endParaRPr lang="en-US" dirty="0"/>
+          </a:p>
+        </p:txBody>
+      </p:sp>
+      <p:grpSp>
+        <p:nvGrpSpPr>
+          <p:cNvPr id="5" name="Group 4"/>
+          <p:cNvGrpSpPr/>
+          <p:nvPr/>
+        </p:nvGrpSpPr>
+        <p:grpSpPr>
+          <a:xfrm>
+            <a:off x="342356" y="2315984"/>
+            <a:ext cx="945846" cy="3030198"/>
+            <a:chOff x="449451" y="2852854"/>
+            <a:chExt cx="945846" cy="3030198"/>
+          </a:xfrm>
+        </p:grpSpPr>
+        <p:sp>
+          <p:nvSpPr>
+            <p:cNvPr id="6" name="TextBox 5"/>
+            <p:cNvSpPr txBox="1"/>
+            <p:nvPr/>
+          </p:nvSpPr>
+          <p:spPr>
+            <a:xfrm rot="16200000">
+              <a:off x="-953232" y="4255537"/>
+              <a:ext cx="3030198" cy="224831"/>
+            </a:xfrm>
+            <a:prstGeom prst="rect">
+              <a:avLst/>
+            </a:prstGeom>
+            <a:noFill/>
+          </p:spPr>
+          <p:txBody>
+            <a:bodyPr wrap="square" rtlCol="0">
+              <a:spAutoFit/>
+            </a:bodyPr>
+            <a:lstStyle/>
+            <a:p>
+              <a:pPr algn="ctr"/>
+              <a:r>
+                <a:rPr lang="en-US" sz="1000" dirty="0" smtClean="0">
+                  <a:latin typeface="Calibri"/>
+                  <a:cs typeface="Calibri"/>
+                </a:rPr>
+                <a:t>% reads supporting reference base at each SNP locus</a:t>
+              </a:r>
+              <a:endParaRPr lang="en-US" sz="1000" dirty="0">
+                <a:latin typeface="Calibri"/>
+                <a:cs typeface="Calibri"/>
+              </a:endParaRPr>
+            </a:p>
+          </p:txBody>
+        </p:sp>
+        <p:sp>
+          <p:nvSpPr>
+            <p:cNvPr id="7" name="TextBox 6"/>
+            <p:cNvSpPr txBox="1"/>
+            <p:nvPr/>
+          </p:nvSpPr>
+          <p:spPr>
+            <a:xfrm>
+              <a:off x="917956" y="5449157"/>
+              <a:ext cx="253957" cy="246221"/>
+            </a:xfrm>
+            <a:prstGeom prst="rect">
+              <a:avLst/>
+            </a:prstGeom>
+            <a:noFill/>
+          </p:spPr>
+          <p:txBody>
+            <a:bodyPr wrap="square" rtlCol="0">
+              <a:spAutoFit/>
+            </a:bodyPr>
+            <a:lstStyle/>
+            <a:p>
+              <a:r>
+                <a:rPr lang="en-US" sz="1000" dirty="0" smtClean="0">
+                  <a:latin typeface="Calibri"/>
+                  <a:cs typeface="Calibri"/>
+                </a:rPr>
+                <a:t>0</a:t>
+              </a:r>
+              <a:endParaRPr lang="en-US" sz="1000" dirty="0">
+                <a:latin typeface="Calibri"/>
+                <a:cs typeface="Calibri"/>
+              </a:endParaRPr>
+            </a:p>
+          </p:txBody>
+        </p:sp>
+        <p:sp>
+          <p:nvSpPr>
+            <p:cNvPr id="8" name="TextBox 7"/>
+            <p:cNvSpPr txBox="1"/>
+            <p:nvPr/>
+          </p:nvSpPr>
+          <p:spPr>
+            <a:xfrm>
+              <a:off x="908760" y="2989862"/>
+              <a:ext cx="486537" cy="246221"/>
+            </a:xfrm>
+            <a:prstGeom prst="rect">
+              <a:avLst/>
+            </a:prstGeom>
+            <a:noFill/>
+          </p:spPr>
+          <p:txBody>
+            <a:bodyPr wrap="square" rtlCol="0">
+              <a:spAutoFit/>
+            </a:bodyPr>
+            <a:lstStyle/>
+            <a:p>
+              <a:r>
+                <a:rPr lang="en-US" sz="1000" dirty="0" smtClean="0">
+                  <a:latin typeface="Calibri"/>
+                  <a:cs typeface="Calibri"/>
+                </a:rPr>
+                <a:t>100</a:t>
+              </a:r>
+              <a:endParaRPr lang="en-US" sz="1000" dirty="0">
+                <a:latin typeface="Calibri"/>
+                <a:cs typeface="Calibri"/>
+              </a:endParaRPr>
+            </a:p>
+          </p:txBody>
+        </p:sp>
+        <p:sp>
+          <p:nvSpPr>
+            <p:cNvPr id="9" name="TextBox 8"/>
+            <p:cNvSpPr txBox="1"/>
+            <p:nvPr/>
+          </p:nvSpPr>
+          <p:spPr>
+            <a:xfrm>
+              <a:off x="917956" y="4146587"/>
+              <a:ext cx="370246" cy="246221"/>
+            </a:xfrm>
+            <a:prstGeom prst="rect">
+              <a:avLst/>
+            </a:prstGeom>
+            <a:noFill/>
+          </p:spPr>
+          <p:txBody>
+            <a:bodyPr wrap="square" rtlCol="0">
+              <a:spAutoFit/>
+            </a:bodyPr>
+            <a:lstStyle/>
+            <a:p>
+              <a:r>
+                <a:rPr lang="en-US" sz="1000" dirty="0" smtClean="0">
+                  <a:latin typeface="Calibri"/>
+                  <a:cs typeface="Calibri"/>
+                </a:rPr>
+                <a:t>50</a:t>
+              </a:r>
+              <a:endParaRPr lang="en-US" sz="1000" dirty="0">
+                <a:latin typeface="Calibri"/>
+                <a:cs typeface="Calibri"/>
+              </a:endParaRPr>
+            </a:p>
+          </p:txBody>
+        </p:sp>
+        <p:sp>
+          <p:nvSpPr>
+            <p:cNvPr id="10" name="TextBox 9"/>
+            <p:cNvSpPr txBox="1"/>
+            <p:nvPr/>
+          </p:nvSpPr>
+          <p:spPr>
+            <a:xfrm>
+              <a:off x="917956" y="4732987"/>
+              <a:ext cx="370246" cy="246221"/>
+            </a:xfrm>
+            <a:prstGeom prst="rect">
+              <a:avLst/>
+            </a:prstGeom>
+            <a:noFill/>
+          </p:spPr>
+          <p:txBody>
+            <a:bodyPr wrap="square" rtlCol="0">
+              <a:spAutoFit/>
+            </a:bodyPr>
+            <a:lstStyle/>
+            <a:p>
+              <a:r>
+                <a:rPr lang="en-US" sz="1000" dirty="0" smtClean="0">
+                  <a:latin typeface="Calibri"/>
+                  <a:cs typeface="Calibri"/>
+                </a:rPr>
+                <a:t>25</a:t>
+              </a:r>
+              <a:endParaRPr lang="en-US" sz="1000" dirty="0">
+                <a:latin typeface="Calibri"/>
+                <a:cs typeface="Calibri"/>
+              </a:endParaRPr>
+            </a:p>
+          </p:txBody>
+        </p:sp>
+        <p:sp>
+          <p:nvSpPr>
+            <p:cNvPr id="11" name="TextBox 10"/>
+            <p:cNvSpPr txBox="1"/>
+            <p:nvPr/>
+          </p:nvSpPr>
+          <p:spPr>
+            <a:xfrm>
+              <a:off x="917956" y="3564852"/>
+              <a:ext cx="370246" cy="246221"/>
+            </a:xfrm>
+            <a:prstGeom prst="rect">
+              <a:avLst/>
+            </a:prstGeom>
+            <a:noFill/>
+          </p:spPr>
+          <p:txBody>
+            <a:bodyPr wrap="square" rtlCol="0">
+              <a:spAutoFit/>
+            </a:bodyPr>
+            <a:lstStyle/>
+            <a:p>
+              <a:r>
+                <a:rPr lang="en-US" sz="1000" dirty="0" smtClean="0">
+                  <a:latin typeface="Calibri"/>
+                  <a:cs typeface="Calibri"/>
+                </a:rPr>
+                <a:t>75</a:t>
+              </a:r>
+              <a:endParaRPr lang="en-US" sz="1000" dirty="0">
+                <a:latin typeface="Calibri"/>
+                <a:cs typeface="Calibri"/>
+              </a:endParaRPr>
+            </a:p>
+          </p:txBody>
+        </p:sp>
+        <p:pic>
+          <p:nvPicPr>
+            <p:cNvPr id="12" name="Picture 11" descr="crop.heatscale.tiff"/>
+            <p:cNvPicPr>
+              <a:picLocks noChangeAspect="1"/>
+            </p:cNvPicPr>
+            <p:nvPr/>
+          </p:nvPicPr>
+          <p:blipFill>
+            <a:blip r:embed="rId2">
+              <a:extLst>
+                <a:ext uri="{28A0092B-C50C-407E-A947-70E740481C1C}">
+                  <a14:useLocalDpi xmlns:a14="http://schemas.microsoft.com/office/drawing/2010/main" val="0"/>
+                </a:ext>
+              </a:extLst>
+            </a:blip>
+            <a:stretch>
+              <a:fillRect/>
+            </a:stretch>
+          </p:blipFill>
+          <p:spPr>
+            <a:xfrm rot="16200000">
+              <a:off x="-419396" y="4293343"/>
+              <a:ext cx="2519239" cy="155465"/>
+            </a:xfrm>
+            <a:prstGeom prst="rect">
+              <a:avLst/>
+            </a:prstGeom>
+          </p:spPr>
+        </p:pic>
+        <p:cxnSp>
+          <p:nvCxnSpPr>
+            <p:cNvPr id="13" name="Straight Connector 12"/>
+            <p:cNvCxnSpPr/>
+            <p:nvPr/>
+          </p:nvCxnSpPr>
+          <p:spPr>
+            <a:xfrm>
+              <a:off x="762490" y="3722717"/>
+              <a:ext cx="155465" cy="0"/>
+            </a:xfrm>
+            <a:prstGeom prst="line">
+              <a:avLst/>
+            </a:prstGeom>
+            <a:ln w="3175" cmpd="sng">
+              <a:solidFill>
+                <a:srgbClr val="000000"/>
+              </a:solidFill>
+            </a:ln>
+            <a:effectLst/>
+          </p:spPr>
+          <p:style>
+            <a:lnRef idx="2">
+              <a:schemeClr val="accent1"/>
+            </a:lnRef>
+            <a:fillRef idx="0">
+              <a:schemeClr val="accent1"/>
+            </a:fillRef>
+            <a:effectRef idx="1">
+              <a:schemeClr val="accent1"/>
+            </a:effectRef>
+            <a:fontRef idx="minor">
+              <a:schemeClr val="tx1"/>
+            </a:fontRef>
+          </p:style>
+        </p:cxnSp>
+        <p:cxnSp>
+          <p:nvCxnSpPr>
+            <p:cNvPr id="14" name="Straight Connector 13"/>
+            <p:cNvCxnSpPr/>
+            <p:nvPr/>
+          </p:nvCxnSpPr>
+          <p:spPr>
+            <a:xfrm>
+              <a:off x="762490" y="4304452"/>
+              <a:ext cx="155465" cy="0"/>
+            </a:xfrm>
+            <a:prstGeom prst="line">
+              <a:avLst/>
+            </a:prstGeom>
+            <a:ln w="3175" cmpd="sng">
+              <a:solidFill>
+                <a:srgbClr val="000000"/>
+              </a:solidFill>
+            </a:ln>
+            <a:effectLst/>
+          </p:spPr>
+          <p:style>
+            <a:lnRef idx="2">
+              <a:schemeClr val="accent1"/>
+            </a:lnRef>
+            <a:fillRef idx="0">
+              <a:schemeClr val="accent1"/>
+            </a:fillRef>
+            <a:effectRef idx="1">
+              <a:schemeClr val="accent1"/>
+            </a:effectRef>
+            <a:fontRef idx="minor">
+              <a:schemeClr val="tx1"/>
+            </a:fontRef>
+          </p:style>
+        </p:cxnSp>
+        <p:cxnSp>
+          <p:nvCxnSpPr>
+            <p:cNvPr id="15" name="Straight Connector 14"/>
+            <p:cNvCxnSpPr/>
+            <p:nvPr/>
+          </p:nvCxnSpPr>
+          <p:spPr>
+            <a:xfrm>
+              <a:off x="762490" y="4890851"/>
+              <a:ext cx="155465" cy="0"/>
+            </a:xfrm>
+            <a:prstGeom prst="line">
+              <a:avLst/>
+            </a:prstGeom>
+            <a:ln w="3175" cmpd="sng">
+              <a:solidFill>
+                <a:srgbClr val="000000"/>
+              </a:solidFill>
+            </a:ln>
+            <a:effectLst/>
+          </p:spPr>
+          <p:style>
+            <a:lnRef idx="2">
+              <a:schemeClr val="accent1"/>
+            </a:lnRef>
+            <a:fillRef idx="0">
+              <a:schemeClr val="accent1"/>
+            </a:fillRef>
+            <a:effectRef idx="1">
+              <a:schemeClr val="accent1"/>
+            </a:effectRef>
+            <a:fontRef idx="minor">
+              <a:schemeClr val="tx1"/>
+            </a:fontRef>
+          </p:style>
+        </p:cxnSp>
+        <p:cxnSp>
+          <p:nvCxnSpPr>
+            <p:cNvPr id="16" name="Straight Connector 15"/>
+            <p:cNvCxnSpPr/>
+            <p:nvPr/>
+          </p:nvCxnSpPr>
+          <p:spPr>
+            <a:xfrm>
+              <a:off x="762490" y="3114396"/>
+              <a:ext cx="155465" cy="0"/>
+            </a:xfrm>
+            <a:prstGeom prst="line">
+              <a:avLst/>
+            </a:prstGeom>
+            <a:ln w="3175" cmpd="sng">
+              <a:solidFill>
+                <a:srgbClr val="000000"/>
+              </a:solidFill>
+            </a:ln>
+            <a:effectLst/>
+          </p:spPr>
+          <p:style>
+            <a:lnRef idx="2">
+              <a:schemeClr val="accent1"/>
+            </a:lnRef>
+            <a:fillRef idx="0">
+              <a:schemeClr val="accent1"/>
+            </a:fillRef>
+            <a:effectRef idx="1">
+              <a:schemeClr val="accent1"/>
+            </a:effectRef>
+            <a:fontRef idx="minor">
+              <a:schemeClr val="tx1"/>
+            </a:fontRef>
+          </p:style>
+        </p:cxnSp>
+        <p:cxnSp>
+          <p:nvCxnSpPr>
+            <p:cNvPr id="17" name="Straight Connector 16"/>
+            <p:cNvCxnSpPr/>
+            <p:nvPr/>
+          </p:nvCxnSpPr>
+          <p:spPr>
+            <a:xfrm>
+              <a:off x="763562" y="5630695"/>
+              <a:ext cx="155465" cy="0"/>
+            </a:xfrm>
+            <a:prstGeom prst="line">
+              <a:avLst/>
+            </a:prstGeom>
+            <a:ln w="3175" cmpd="sng">
+              <a:solidFill>
+                <a:srgbClr val="000000"/>
+              </a:solidFill>
+            </a:ln>
+            <a:effectLst/>
+          </p:spPr>
+          <p:style>
+            <a:lnRef idx="2">
+              <a:schemeClr val="accent1"/>
+            </a:lnRef>
+            <a:fillRef idx="0">
+              <a:schemeClr val="accent1"/>
+            </a:fillRef>
+            <a:effectRef idx="1">
+              <a:schemeClr val="accent1"/>
+            </a:effectRef>
+            <a:fontRef idx="minor">
+              <a:schemeClr val="tx1"/>
+            </a:fontRef>
+          </p:style>
+        </p:cxnSp>
+      </p:grpSp>
+      <p:grpSp>
+        <p:nvGrpSpPr>
+          <p:cNvPr id="18" name="Group 17"/>
+          <p:cNvGrpSpPr/>
+          <p:nvPr/>
+        </p:nvGrpSpPr>
+        <p:grpSpPr>
+          <a:xfrm>
+            <a:off x="1326973" y="1210947"/>
+            <a:ext cx="7040668" cy="2708821"/>
+            <a:chOff x="1326973" y="2325526"/>
+            <a:chExt cx="4995166" cy="1921836"/>
+          </a:xfrm>
+        </p:grpSpPr>
+        <p:pic>
+          <p:nvPicPr>
+            <p:cNvPr id="19" name="Picture 18"/>
+            <p:cNvPicPr>
+              <a:picLocks/>
+            </p:cNvPicPr>
+            <p:nvPr/>
+          </p:nvPicPr>
+          <p:blipFill>
+            <a:blip r:embed="rId3"/>
+            <a:stretch>
+              <a:fillRect/>
+            </a:stretch>
+          </p:blipFill>
+          <p:spPr>
+            <a:xfrm>
+              <a:off x="3944699" y="2555722"/>
+              <a:ext cx="2377440" cy="1691640"/>
+            </a:xfrm>
+            <a:prstGeom prst="rect">
+              <a:avLst/>
+            </a:prstGeom>
+          </p:spPr>
+        </p:pic>
+        <p:pic>
+          <p:nvPicPr>
+            <p:cNvPr id="20" name="Picture 19"/>
+            <p:cNvPicPr>
+              <a:picLocks/>
+            </p:cNvPicPr>
+            <p:nvPr/>
+          </p:nvPicPr>
+          <p:blipFill>
+            <a:blip r:embed="rId4"/>
+            <a:stretch>
+              <a:fillRect/>
+            </a:stretch>
+          </p:blipFill>
+          <p:spPr>
+            <a:xfrm>
+              <a:off x="1625216" y="2571747"/>
+              <a:ext cx="2011680" cy="1463040"/>
+            </a:xfrm>
+            <a:prstGeom prst="rect">
+              <a:avLst/>
+            </a:prstGeom>
+          </p:spPr>
+        </p:pic>
+        <p:sp>
+          <p:nvSpPr>
+            <p:cNvPr id="21" name="TextBox 20"/>
+            <p:cNvSpPr txBox="1"/>
+            <p:nvPr/>
+          </p:nvSpPr>
+          <p:spPr>
+            <a:xfrm>
+              <a:off x="1591049" y="4001420"/>
+              <a:ext cx="2051468" cy="196523"/>
+            </a:xfrm>
+            <a:prstGeom prst="rect">
+              <a:avLst/>
+            </a:prstGeom>
+            <a:noFill/>
+          </p:spPr>
+          <p:txBody>
+            <a:bodyPr wrap="none" rtlCol="0">
+              <a:spAutoFit/>
+            </a:bodyPr>
+            <a:lstStyle/>
+            <a:p>
+              <a:r>
+                <a:rPr lang="en-US" sz="1200" dirty="0" smtClean="0"/>
+                <a:t>2005     2007     </a:t>
+              </a:r>
+              <a:r>
+                <a:rPr lang="en-US" sz="1200" dirty="0" smtClean="0"/>
+                <a:t>2008  </a:t>
+              </a:r>
+              <a:r>
+                <a:rPr lang="en-US" sz="1200" dirty="0" smtClean="0"/>
+                <a:t>   </a:t>
+              </a:r>
+              <a:r>
+                <a:rPr lang="en-US" sz="1200" dirty="0" smtClean="0"/>
+                <a:t>2009   </a:t>
+              </a:r>
+              <a:r>
+                <a:rPr lang="en-US" sz="1200" dirty="0" smtClean="0"/>
+                <a:t>  </a:t>
+              </a:r>
+              <a:r>
+                <a:rPr lang="en-US" sz="1200" dirty="0" smtClean="0"/>
+                <a:t>2012    </a:t>
+              </a:r>
+              <a:r>
+                <a:rPr lang="en-US" sz="1200" dirty="0" smtClean="0"/>
+                <a:t>2013</a:t>
+              </a:r>
+              <a:endParaRPr lang="en-US" sz="1200" dirty="0"/>
+            </a:p>
+          </p:txBody>
+        </p:sp>
+        <p:sp>
+          <p:nvSpPr>
+            <p:cNvPr id="22" name="TextBox 21"/>
+            <p:cNvSpPr txBox="1"/>
+            <p:nvPr/>
+          </p:nvSpPr>
+          <p:spPr>
+            <a:xfrm>
+              <a:off x="1546599" y="2325526"/>
+              <a:ext cx="1124865" cy="246221"/>
+            </a:xfrm>
+            <a:prstGeom prst="rect">
+              <a:avLst/>
+            </a:prstGeom>
+            <a:noFill/>
+          </p:spPr>
+          <p:txBody>
+            <a:bodyPr wrap="none" rtlCol="0">
+              <a:spAutoFit/>
+            </a:bodyPr>
+            <a:lstStyle/>
+            <a:p>
+              <a:r>
+                <a:rPr lang="en-US" sz="1000" dirty="0" smtClean="0"/>
+                <a:t>Holophagales-254</a:t>
+              </a:r>
+              <a:endParaRPr lang="en-US" sz="1000" dirty="0"/>
+            </a:p>
+          </p:txBody>
+        </p:sp>
+        <p:sp>
+          <p:nvSpPr>
+            <p:cNvPr id="23" name="TextBox 22"/>
+            <p:cNvSpPr txBox="1"/>
+            <p:nvPr/>
+          </p:nvSpPr>
+          <p:spPr>
+            <a:xfrm>
+              <a:off x="4156449" y="2325526"/>
+              <a:ext cx="1124865" cy="246221"/>
+            </a:xfrm>
+            <a:prstGeom prst="rect">
+              <a:avLst/>
+            </a:prstGeom>
+            <a:noFill/>
+          </p:spPr>
+          <p:txBody>
+            <a:bodyPr wrap="none" rtlCol="0">
+              <a:spAutoFit/>
+            </a:bodyPr>
+            <a:lstStyle/>
+            <a:p>
+              <a:r>
+                <a:rPr lang="en-US" sz="1000" dirty="0" smtClean="0"/>
+                <a:t>Holophagales-254</a:t>
+              </a:r>
+              <a:endParaRPr lang="en-US" sz="1000" dirty="0"/>
+            </a:p>
+          </p:txBody>
+        </p:sp>
+        <p:cxnSp>
+          <p:nvCxnSpPr>
+            <p:cNvPr id="24" name="Straight Arrow Connector 23"/>
+            <p:cNvCxnSpPr/>
+            <p:nvPr/>
+          </p:nvCxnSpPr>
+          <p:spPr>
+            <a:xfrm>
+              <a:off x="1455573" y="2566878"/>
+              <a:ext cx="0" cy="1467909"/>
+            </a:xfrm>
+            <a:prstGeom prst="straightConnector1">
+              <a:avLst/>
+            </a:prstGeom>
+            <a:ln w="19050" cmpd="sng">
+              <a:solidFill>
+                <a:schemeClr val="tx1"/>
+              </a:solidFill>
+              <a:headEnd type="arrow"/>
+              <a:tailEnd type="arrow"/>
+            </a:ln>
+            <a:effectLst/>
+          </p:spPr>
+          <p:style>
+            <a:lnRef idx="2">
+              <a:schemeClr val="accent1"/>
+            </a:lnRef>
+            <a:fillRef idx="0">
+              <a:schemeClr val="accent1"/>
+            </a:fillRef>
+            <a:effectRef idx="1">
+              <a:schemeClr val="accent1"/>
+            </a:effectRef>
+            <a:fontRef idx="minor">
+              <a:schemeClr val="tx1"/>
+            </a:fontRef>
+          </p:style>
+        </p:cxnSp>
+        <p:sp>
+          <p:nvSpPr>
+            <p:cNvPr id="25" name="TextBox 24"/>
+            <p:cNvSpPr txBox="1"/>
+            <p:nvPr/>
+          </p:nvSpPr>
+          <p:spPr>
+            <a:xfrm rot="16200000">
+              <a:off x="1057539" y="3176320"/>
+              <a:ext cx="785090" cy="246221"/>
+            </a:xfrm>
+            <a:prstGeom prst="rect">
+              <a:avLst/>
+            </a:prstGeom>
+            <a:solidFill>
+              <a:srgbClr val="FFFFFF"/>
+            </a:solidFill>
+          </p:spPr>
+          <p:txBody>
+            <a:bodyPr wrap="square" rtlCol="0">
+              <a:spAutoFit/>
+            </a:bodyPr>
+            <a:lstStyle/>
+            <a:p>
+              <a:r>
+                <a:rPr lang="en-US" sz="1000" dirty="0" smtClean="0"/>
+                <a:t>8,501 SNPs</a:t>
+              </a:r>
+              <a:endParaRPr lang="en-US" sz="1000" dirty="0"/>
+            </a:p>
+          </p:txBody>
+        </p:sp>
+      </p:grpSp>
+      <p:grpSp>
+        <p:nvGrpSpPr>
+          <p:cNvPr id="34" name="Group 33"/>
+          <p:cNvGrpSpPr/>
+          <p:nvPr/>
+        </p:nvGrpSpPr>
+        <p:grpSpPr>
+          <a:xfrm>
+            <a:off x="1324692" y="3926707"/>
+            <a:ext cx="7085571" cy="2776240"/>
+            <a:chOff x="1349398" y="365815"/>
+            <a:chExt cx="4901506" cy="1920490"/>
+          </a:xfrm>
+        </p:grpSpPr>
+        <p:pic>
+          <p:nvPicPr>
+            <p:cNvPr id="35" name="Picture 34"/>
+            <p:cNvPicPr>
+              <a:picLocks/>
+            </p:cNvPicPr>
+            <p:nvPr/>
+          </p:nvPicPr>
+          <p:blipFill>
+            <a:blip r:embed="rId5"/>
+            <a:stretch>
+              <a:fillRect/>
+            </a:stretch>
+          </p:blipFill>
+          <p:spPr>
+            <a:xfrm>
+              <a:off x="1634178" y="624875"/>
+              <a:ext cx="1974527" cy="1436019"/>
+            </a:xfrm>
+            <a:prstGeom prst="rect">
+              <a:avLst/>
+            </a:prstGeom>
+          </p:spPr>
+        </p:pic>
+        <p:sp>
+          <p:nvSpPr>
+            <p:cNvPr id="36" name="TextBox 35"/>
+            <p:cNvSpPr txBox="1"/>
+            <p:nvPr/>
+          </p:nvSpPr>
+          <p:spPr>
+            <a:xfrm>
+              <a:off x="1615128" y="2035657"/>
+              <a:ext cx="2097135" cy="191617"/>
+            </a:xfrm>
+            <a:prstGeom prst="rect">
+              <a:avLst/>
+            </a:prstGeom>
+            <a:noFill/>
+          </p:spPr>
+          <p:txBody>
+            <a:bodyPr wrap="none" rtlCol="0">
+              <a:spAutoFit/>
+            </a:bodyPr>
+            <a:lstStyle/>
+            <a:p>
+              <a:r>
+                <a:rPr lang="en-US" sz="1200" dirty="0" smtClean="0"/>
+                <a:t>2005    </a:t>
+              </a:r>
+              <a:r>
+                <a:rPr lang="en-US" sz="1200" dirty="0" smtClean="0"/>
+                <a:t> </a:t>
+              </a:r>
+              <a:r>
+                <a:rPr lang="en-US" sz="1200" dirty="0" smtClean="0"/>
+                <a:t>2007     2008 </a:t>
+              </a:r>
+              <a:r>
+                <a:rPr lang="en-US" sz="1200" dirty="0" smtClean="0"/>
+                <a:t>    </a:t>
+              </a:r>
+              <a:r>
+                <a:rPr lang="en-US" sz="1200" dirty="0" smtClean="0"/>
+                <a:t>2009  </a:t>
+              </a:r>
+              <a:r>
+                <a:rPr lang="en-US" sz="1200" dirty="0" smtClean="0"/>
+                <a:t>   </a:t>
+              </a:r>
+              <a:r>
+                <a:rPr lang="en-US" sz="1200" dirty="0" smtClean="0"/>
+                <a:t>2012      2013</a:t>
+              </a:r>
+              <a:endParaRPr lang="en-US" sz="1200" dirty="0"/>
+            </a:p>
+          </p:txBody>
+        </p:sp>
+        <p:cxnSp>
+          <p:nvCxnSpPr>
+            <p:cNvPr id="37" name="Straight Arrow Connector 36"/>
+            <p:cNvCxnSpPr/>
+            <p:nvPr/>
+          </p:nvCxnSpPr>
+          <p:spPr>
+            <a:xfrm>
+              <a:off x="1477999" y="592986"/>
+              <a:ext cx="0" cy="1467909"/>
+            </a:xfrm>
+            <a:prstGeom prst="straightConnector1">
+              <a:avLst/>
+            </a:prstGeom>
+            <a:ln w="19050" cmpd="sng">
+              <a:solidFill>
+                <a:schemeClr val="tx1"/>
+              </a:solidFill>
+              <a:headEnd type="arrow"/>
+              <a:tailEnd type="arrow"/>
+            </a:ln>
+            <a:effectLst/>
+          </p:spPr>
+          <p:style>
+            <a:lnRef idx="2">
+              <a:schemeClr val="accent1"/>
+            </a:lnRef>
+            <a:fillRef idx="0">
+              <a:schemeClr val="accent1"/>
+            </a:fillRef>
+            <a:effectRef idx="1">
+              <a:schemeClr val="accent1"/>
+            </a:effectRef>
+            <a:fontRef idx="minor">
+              <a:schemeClr val="tx1"/>
+            </a:fontRef>
+          </p:style>
+        </p:cxnSp>
+        <p:sp>
+          <p:nvSpPr>
+            <p:cNvPr id="38" name="TextBox 37"/>
+            <p:cNvSpPr txBox="1"/>
+            <p:nvPr/>
+          </p:nvSpPr>
+          <p:spPr>
+            <a:xfrm rot="16200000">
+              <a:off x="1069372" y="1188184"/>
+              <a:ext cx="806273" cy="246221"/>
+            </a:xfrm>
+            <a:prstGeom prst="rect">
+              <a:avLst/>
+            </a:prstGeom>
+            <a:solidFill>
+              <a:srgbClr val="FFFFFF"/>
+            </a:solidFill>
+          </p:spPr>
+          <p:txBody>
+            <a:bodyPr wrap="square" rtlCol="0">
+              <a:spAutoFit/>
+            </a:bodyPr>
+            <a:lstStyle/>
+            <a:p>
+              <a:r>
+                <a:rPr lang="en-US" sz="1000" dirty="0" smtClean="0"/>
+                <a:t>4,209 SNPs</a:t>
+              </a:r>
+              <a:endParaRPr lang="en-US" sz="1000" dirty="0"/>
+            </a:p>
+          </p:txBody>
+        </p:sp>
+        <p:sp>
+          <p:nvSpPr>
+            <p:cNvPr id="39" name="TextBox 38"/>
+            <p:cNvSpPr txBox="1"/>
+            <p:nvPr/>
+          </p:nvSpPr>
+          <p:spPr>
+            <a:xfrm>
+              <a:off x="1535781" y="365815"/>
+              <a:ext cx="1352541" cy="246221"/>
+            </a:xfrm>
+            <a:prstGeom prst="rect">
+              <a:avLst/>
+            </a:prstGeom>
+            <a:noFill/>
+          </p:spPr>
+          <p:txBody>
+            <a:bodyPr wrap="none" rtlCol="0">
+              <a:spAutoFit/>
+            </a:bodyPr>
+            <a:lstStyle/>
+            <a:p>
+              <a:r>
+                <a:rPr lang="en-US" sz="1000" dirty="0" smtClean="0"/>
+                <a:t>Actinobacterium-2152</a:t>
+              </a:r>
+              <a:endParaRPr lang="en-US" sz="1000" dirty="0"/>
+            </a:p>
+          </p:txBody>
+        </p:sp>
+        <p:pic>
+          <p:nvPicPr>
+            <p:cNvPr id="40" name="Picture 39"/>
+            <p:cNvPicPr>
+              <a:picLocks/>
+            </p:cNvPicPr>
+            <p:nvPr/>
+          </p:nvPicPr>
+          <p:blipFill>
+            <a:blip r:embed="rId6"/>
+            <a:stretch>
+              <a:fillRect/>
+            </a:stretch>
+          </p:blipFill>
+          <p:spPr>
+            <a:xfrm>
+              <a:off x="3873464" y="594665"/>
+              <a:ext cx="2377440" cy="1691640"/>
+            </a:xfrm>
+            <a:prstGeom prst="rect">
+              <a:avLst/>
+            </a:prstGeom>
+          </p:spPr>
+        </p:pic>
+        <p:sp>
+          <p:nvSpPr>
+            <p:cNvPr id="41" name="TextBox 40"/>
+            <p:cNvSpPr txBox="1"/>
+            <p:nvPr/>
+          </p:nvSpPr>
+          <p:spPr>
+            <a:xfrm>
+              <a:off x="4145631" y="375313"/>
+              <a:ext cx="1352541" cy="246221"/>
+            </a:xfrm>
+            <a:prstGeom prst="rect">
+              <a:avLst/>
+            </a:prstGeom>
+            <a:noFill/>
+          </p:spPr>
+          <p:txBody>
+            <a:bodyPr wrap="none" rtlCol="0">
+              <a:spAutoFit/>
+            </a:bodyPr>
+            <a:lstStyle/>
+            <a:p>
+              <a:r>
+                <a:rPr lang="en-US" sz="1000" dirty="0" smtClean="0"/>
+                <a:t>Actinobacterium-2152</a:t>
+              </a:r>
+              <a:endParaRPr lang="en-US" sz="1000" dirty="0"/>
+            </a:p>
+          </p:txBody>
+        </p:sp>
+      </p:grpSp>
+    </p:spTree>
+    <p:extLst>
+      <p:ext uri="{BB962C8B-B14F-4D97-AF65-F5344CB8AC3E}">
+        <p14:creationId xmlns:p14="http://schemas.microsoft.com/office/powerpoint/2010/main" val="877200106"/>
+      </p:ext>
+    </p:extLst>
+  </p:cSld>
+  <p:clrMapOvr>
+    <a:masterClrMapping/>
+  </p:clrMapOvr>
+  <p:timing>
+    <p:tnLst>
+      <p:par>
+        <p:cTn xmlns:p14="http://schemas.microsoft.com/office/powerpoint/2010/main" id="1" dur="indefinite" restart="never" nodeType="tmRoot"/>
+      </p:par>
+    </p:tnLst>
+  </p:timing>
+</p:sld>
+</file>
+
+<file path=ppt/slides/slide7.xml><?xml version="1.0" encoding="utf-8"?>
+<p:sld xmlns:a="http://schemas.openxmlformats.org/drawingml/2006/main" xmlns:r="http://schemas.openxmlformats.org/officeDocument/2006/relationships" xmlns:p="http://schemas.openxmlformats.org/presentationml/2006/main">
+  <p:cSld>
+    <p:spTree>
+      <p:nvGrpSpPr>
+        <p:cNvPr id="1" name=""/>
+        <p:cNvGrpSpPr/>
+        <p:nvPr/>
+      </p:nvGrpSpPr>
+      <p:grpSpPr>
+        <a:xfrm>
+          <a:off x="0" y="0"/>
+          <a:ext cx="0" cy="0"/>
+          <a:chOff x="0" y="0"/>
+          <a:chExt cx="0" cy="0"/>
+        </a:xfrm>
+      </p:grpSpPr>
+      <p:sp>
+        <p:nvSpPr>
+          <p:cNvPr id="2" name="Title 1"/>
+          <p:cNvSpPr>
+            <a:spLocks noGrp="1"/>
+          </p:cNvSpPr>
+          <p:nvPr>
+            <p:ph type="title"/>
+          </p:nvPr>
+        </p:nvSpPr>
+        <p:spPr>
+          <a:xfrm>
+            <a:off x="390421" y="274638"/>
+            <a:ext cx="8350422" cy="1143000"/>
+          </a:xfrm>
+        </p:spPr>
+        <p:txBody>
+          <a:bodyPr>
+            <a:noAutofit/>
+          </a:bodyPr>
+          <a:lstStyle/>
+          <a:p>
+            <a:r>
+              <a:rPr lang="en-US" sz="3200" dirty="0" smtClean="0"/>
+              <a:t>One Population Experiences a Major Loss of Diversity, Consistent with a Genome-wide Sweep</a:t>
+            </a:r>
+            <a:endParaRPr lang="en-US" sz="3200" dirty="0"/>
+          </a:p>
+        </p:txBody>
+      </p:sp>
+      <p:sp>
+        <p:nvSpPr>
+          <p:cNvPr id="3" name="Content Placeholder 2"/>
+          <p:cNvSpPr>
+            <a:spLocks noGrp="1"/>
+          </p:cNvSpPr>
+          <p:nvPr>
+            <p:ph sz="half" idx="1"/>
+          </p:nvPr>
+        </p:nvSpPr>
+        <p:spPr/>
+        <p:txBody>
+          <a:bodyPr/>
+          <a:lstStyle/>
+          <a:p>
+            <a:endParaRPr lang="en-US"/>
+          </a:p>
+        </p:txBody>
+      </p:sp>
+      <p:sp>
+        <p:nvSpPr>
+          <p:cNvPr id="4" name="Content Placeholder 3"/>
+          <p:cNvSpPr>
+            <a:spLocks noGrp="1"/>
+          </p:cNvSpPr>
+          <p:nvPr>
+            <p:ph sz="half" idx="2"/>
+          </p:nvPr>
+        </p:nvSpPr>
+        <p:spPr/>
+        <p:txBody>
+          <a:bodyPr/>
+          <a:lstStyle/>
+          <a:p>
+            <a:endParaRPr lang="en-US"/>
+          </a:p>
+        </p:txBody>
+      </p:sp>
+      <p:grpSp>
+        <p:nvGrpSpPr>
+          <p:cNvPr id="12" name="Group 11"/>
+          <p:cNvGrpSpPr/>
+          <p:nvPr/>
+        </p:nvGrpSpPr>
+        <p:grpSpPr>
+          <a:xfrm>
+            <a:off x="1181107" y="2362176"/>
+            <a:ext cx="7322239" cy="2810611"/>
+            <a:chOff x="1327893" y="340535"/>
+            <a:chExt cx="4994246" cy="1917021"/>
+          </a:xfrm>
+        </p:grpSpPr>
+        <p:pic>
+          <p:nvPicPr>
+            <p:cNvPr id="5" name="Picture 4"/>
+            <p:cNvPicPr>
+              <a:picLocks/>
+            </p:cNvPicPr>
+            <p:nvPr/>
+          </p:nvPicPr>
+          <p:blipFill>
+            <a:blip r:embed="rId2"/>
+            <a:stretch>
+              <a:fillRect/>
+            </a:stretch>
+          </p:blipFill>
+          <p:spPr>
+            <a:xfrm>
+              <a:off x="3944699" y="565916"/>
+              <a:ext cx="2377440" cy="1691640"/>
+            </a:xfrm>
+            <a:prstGeom prst="rect">
+              <a:avLst/>
+            </a:prstGeom>
+          </p:spPr>
+        </p:pic>
+        <p:pic>
+          <p:nvPicPr>
+            <p:cNvPr id="6" name="Picture 5"/>
+            <p:cNvPicPr>
+              <a:picLocks/>
+            </p:cNvPicPr>
+            <p:nvPr/>
+          </p:nvPicPr>
+          <p:blipFill>
+            <a:blip r:embed="rId3"/>
+            <a:stretch>
+              <a:fillRect/>
+            </a:stretch>
+          </p:blipFill>
+          <p:spPr>
+            <a:xfrm>
+              <a:off x="1624680" y="593120"/>
+              <a:ext cx="2011680" cy="1463040"/>
+            </a:xfrm>
+            <a:prstGeom prst="rect">
+              <a:avLst/>
+            </a:prstGeom>
+          </p:spPr>
+        </p:pic>
+        <p:sp>
+          <p:nvSpPr>
+            <p:cNvPr id="7" name="TextBox 6"/>
+            <p:cNvSpPr txBox="1"/>
+            <p:nvPr/>
+          </p:nvSpPr>
+          <p:spPr>
+            <a:xfrm>
+              <a:off x="1535781" y="340535"/>
+              <a:ext cx="1030688" cy="246221"/>
+            </a:xfrm>
+            <a:prstGeom prst="rect">
+              <a:avLst/>
+            </a:prstGeom>
+            <a:noFill/>
+          </p:spPr>
+          <p:txBody>
+            <a:bodyPr wrap="none" rtlCol="0">
+              <a:spAutoFit/>
+            </a:bodyPr>
+            <a:lstStyle/>
+            <a:p>
+              <a:r>
+                <a:rPr lang="en-US" sz="1000" dirty="0" smtClean="0"/>
+                <a:t>Chlorobium-111</a:t>
+              </a:r>
+              <a:endParaRPr lang="en-US" sz="1000" dirty="0"/>
+            </a:p>
+          </p:txBody>
+        </p:sp>
+        <p:sp>
+          <p:nvSpPr>
+            <p:cNvPr id="8" name="TextBox 7"/>
+            <p:cNvSpPr txBox="1"/>
+            <p:nvPr/>
+          </p:nvSpPr>
+          <p:spPr>
+            <a:xfrm>
+              <a:off x="4145631" y="340535"/>
+              <a:ext cx="1030688" cy="246221"/>
+            </a:xfrm>
+            <a:prstGeom prst="rect">
+              <a:avLst/>
+            </a:prstGeom>
+            <a:noFill/>
+          </p:spPr>
+          <p:txBody>
+            <a:bodyPr wrap="none" rtlCol="0">
+              <a:spAutoFit/>
+            </a:bodyPr>
+            <a:lstStyle/>
+            <a:p>
+              <a:r>
+                <a:rPr lang="en-US" sz="1000" dirty="0" smtClean="0"/>
+                <a:t>Chlorobium-111</a:t>
+              </a:r>
+              <a:endParaRPr lang="en-US" sz="1000" dirty="0"/>
+            </a:p>
+          </p:txBody>
+        </p:sp>
+        <p:sp>
+          <p:nvSpPr>
+            <p:cNvPr id="9" name="TextBox 8"/>
+            <p:cNvSpPr txBox="1"/>
+            <p:nvPr/>
+          </p:nvSpPr>
+          <p:spPr>
+            <a:xfrm>
+              <a:off x="1584124" y="2042112"/>
+              <a:ext cx="2082621" cy="215444"/>
+            </a:xfrm>
+            <a:prstGeom prst="rect">
+              <a:avLst/>
+            </a:prstGeom>
+            <a:noFill/>
+          </p:spPr>
+          <p:txBody>
+            <a:bodyPr wrap="none" rtlCol="0">
+              <a:spAutoFit/>
+            </a:bodyPr>
+            <a:lstStyle/>
+            <a:p>
+              <a:r>
+                <a:rPr lang="en-US" sz="800" dirty="0" smtClean="0"/>
+                <a:t>2005      2007     2008      2009     2012      2013</a:t>
+              </a:r>
+              <a:endParaRPr lang="en-US" sz="800" dirty="0"/>
+            </a:p>
+          </p:txBody>
+        </p:sp>
+        <p:cxnSp>
+          <p:nvCxnSpPr>
+            <p:cNvPr id="10" name="Straight Arrow Connector 9"/>
+            <p:cNvCxnSpPr/>
+            <p:nvPr/>
+          </p:nvCxnSpPr>
+          <p:spPr>
+            <a:xfrm>
+              <a:off x="1456493" y="586756"/>
+              <a:ext cx="0" cy="1467909"/>
+            </a:xfrm>
+            <a:prstGeom prst="straightConnector1">
+              <a:avLst/>
+            </a:prstGeom>
+            <a:ln w="19050" cmpd="sng">
+              <a:solidFill>
+                <a:schemeClr val="tx1"/>
+              </a:solidFill>
+              <a:headEnd type="arrow"/>
+              <a:tailEnd type="arrow"/>
+            </a:ln>
+            <a:effectLst/>
+          </p:spPr>
+          <p:style>
+            <a:lnRef idx="2">
+              <a:schemeClr val="accent1"/>
+            </a:lnRef>
+            <a:fillRef idx="0">
+              <a:schemeClr val="accent1"/>
+            </a:fillRef>
+            <a:effectRef idx="1">
+              <a:schemeClr val="accent1"/>
+            </a:effectRef>
+            <a:fontRef idx="minor">
+              <a:schemeClr val="tx1"/>
+            </a:fontRef>
+          </p:style>
+        </p:cxnSp>
+        <p:sp>
+          <p:nvSpPr>
+            <p:cNvPr id="11" name="TextBox 10"/>
+            <p:cNvSpPr txBox="1"/>
+            <p:nvPr/>
+          </p:nvSpPr>
+          <p:spPr>
+            <a:xfrm rot="16200000">
+              <a:off x="1058459" y="1196198"/>
+              <a:ext cx="785090" cy="246221"/>
+            </a:xfrm>
+            <a:prstGeom prst="rect">
+              <a:avLst/>
+            </a:prstGeom>
+            <a:solidFill>
+              <a:srgbClr val="FFFFFF"/>
+            </a:solidFill>
+          </p:spPr>
+          <p:txBody>
+            <a:bodyPr wrap="square" rtlCol="0">
+              <a:spAutoFit/>
+            </a:bodyPr>
+            <a:lstStyle/>
+            <a:p>
+              <a:r>
+                <a:rPr lang="en-US" sz="1000" dirty="0" smtClean="0"/>
+                <a:t>3,111 SNPs</a:t>
+              </a:r>
+              <a:endParaRPr lang="en-US" sz="1000" dirty="0"/>
+            </a:p>
+          </p:txBody>
+        </p:sp>
+      </p:grpSp>
+      <p:grpSp>
+        <p:nvGrpSpPr>
+          <p:cNvPr id="13" name="Group 12"/>
+          <p:cNvGrpSpPr/>
+          <p:nvPr/>
+        </p:nvGrpSpPr>
+        <p:grpSpPr>
+          <a:xfrm>
+            <a:off x="342356" y="2302254"/>
+            <a:ext cx="945846" cy="3030198"/>
+            <a:chOff x="449451" y="2852854"/>
+            <a:chExt cx="945846" cy="3030198"/>
+          </a:xfrm>
+        </p:grpSpPr>
+        <p:sp>
+          <p:nvSpPr>
+            <p:cNvPr id="14" name="TextBox 13"/>
+            <p:cNvSpPr txBox="1"/>
+            <p:nvPr/>
+          </p:nvSpPr>
+          <p:spPr>
+            <a:xfrm rot="16200000">
+              <a:off x="-953232" y="4255537"/>
+              <a:ext cx="3030198" cy="224831"/>
+            </a:xfrm>
+            <a:prstGeom prst="rect">
+              <a:avLst/>
+            </a:prstGeom>
+            <a:noFill/>
+          </p:spPr>
+          <p:txBody>
+            <a:bodyPr wrap="square" rtlCol="0">
+              <a:spAutoFit/>
+            </a:bodyPr>
+            <a:lstStyle/>
+            <a:p>
+              <a:pPr algn="ctr"/>
+              <a:r>
+                <a:rPr lang="en-US" sz="1000" dirty="0" smtClean="0">
+                  <a:latin typeface="Calibri"/>
+                  <a:cs typeface="Calibri"/>
+                </a:rPr>
+                <a:t>% reads supporting reference base at each SNP locus</a:t>
+              </a:r>
+              <a:endParaRPr lang="en-US" sz="1000" dirty="0">
+                <a:latin typeface="Calibri"/>
+                <a:cs typeface="Calibri"/>
+              </a:endParaRPr>
+            </a:p>
+          </p:txBody>
+        </p:sp>
+        <p:sp>
+          <p:nvSpPr>
+            <p:cNvPr id="15" name="TextBox 14"/>
+            <p:cNvSpPr txBox="1"/>
+            <p:nvPr/>
+          </p:nvSpPr>
+          <p:spPr>
+            <a:xfrm>
+              <a:off x="917956" y="5449157"/>
+              <a:ext cx="253957" cy="246221"/>
+            </a:xfrm>
+            <a:prstGeom prst="rect">
+              <a:avLst/>
+            </a:prstGeom>
+            <a:noFill/>
+          </p:spPr>
+          <p:txBody>
+            <a:bodyPr wrap="square" rtlCol="0">
+              <a:spAutoFit/>
+            </a:bodyPr>
+            <a:lstStyle/>
+            <a:p>
+              <a:r>
+                <a:rPr lang="en-US" sz="1000" dirty="0" smtClean="0">
+                  <a:latin typeface="Calibri"/>
+                  <a:cs typeface="Calibri"/>
+                </a:rPr>
+                <a:t>0</a:t>
+              </a:r>
+              <a:endParaRPr lang="en-US" sz="1000" dirty="0">
+                <a:latin typeface="Calibri"/>
+                <a:cs typeface="Calibri"/>
+              </a:endParaRPr>
+            </a:p>
+          </p:txBody>
+        </p:sp>
+        <p:sp>
+          <p:nvSpPr>
+            <p:cNvPr id="16" name="TextBox 15"/>
+            <p:cNvSpPr txBox="1"/>
+            <p:nvPr/>
+          </p:nvSpPr>
+          <p:spPr>
+            <a:xfrm>
+              <a:off x="908760" y="2989862"/>
+              <a:ext cx="486537" cy="246221"/>
+            </a:xfrm>
+            <a:prstGeom prst="rect">
+              <a:avLst/>
+            </a:prstGeom>
+            <a:noFill/>
+          </p:spPr>
+          <p:txBody>
+            <a:bodyPr wrap="square" rtlCol="0">
+              <a:spAutoFit/>
+            </a:bodyPr>
+            <a:lstStyle/>
+            <a:p>
+              <a:r>
+                <a:rPr lang="en-US" sz="1000" dirty="0" smtClean="0">
+                  <a:latin typeface="Calibri"/>
+                  <a:cs typeface="Calibri"/>
+                </a:rPr>
+                <a:t>100</a:t>
+              </a:r>
+              <a:endParaRPr lang="en-US" sz="1000" dirty="0">
+                <a:latin typeface="Calibri"/>
+                <a:cs typeface="Calibri"/>
+              </a:endParaRPr>
+            </a:p>
+          </p:txBody>
+        </p:sp>
+        <p:sp>
+          <p:nvSpPr>
+            <p:cNvPr id="17" name="TextBox 16"/>
+            <p:cNvSpPr txBox="1"/>
+            <p:nvPr/>
+          </p:nvSpPr>
+          <p:spPr>
+            <a:xfrm>
+              <a:off x="917956" y="4146587"/>
+              <a:ext cx="370246" cy="246221"/>
+            </a:xfrm>
+            <a:prstGeom prst="rect">
+              <a:avLst/>
+            </a:prstGeom>
+            <a:noFill/>
+          </p:spPr>
+          <p:txBody>
+            <a:bodyPr wrap="square" rtlCol="0">
+              <a:spAutoFit/>
+            </a:bodyPr>
+            <a:lstStyle/>
+            <a:p>
+              <a:r>
+                <a:rPr lang="en-US" sz="1000" dirty="0" smtClean="0">
+                  <a:latin typeface="Calibri"/>
+                  <a:cs typeface="Calibri"/>
+                </a:rPr>
+                <a:t>50</a:t>
+              </a:r>
+              <a:endParaRPr lang="en-US" sz="1000" dirty="0">
+                <a:latin typeface="Calibri"/>
+                <a:cs typeface="Calibri"/>
+              </a:endParaRPr>
+            </a:p>
+          </p:txBody>
+        </p:sp>
+        <p:sp>
+          <p:nvSpPr>
+            <p:cNvPr id="18" name="TextBox 17"/>
+            <p:cNvSpPr txBox="1"/>
+            <p:nvPr/>
+          </p:nvSpPr>
+          <p:spPr>
+            <a:xfrm>
+              <a:off x="917956" y="4732987"/>
+              <a:ext cx="370246" cy="246221"/>
+            </a:xfrm>
+            <a:prstGeom prst="rect">
+              <a:avLst/>
+            </a:prstGeom>
+            <a:noFill/>
+          </p:spPr>
+          <p:txBody>
+            <a:bodyPr wrap="square" rtlCol="0">
+              <a:spAutoFit/>
+            </a:bodyPr>
+            <a:lstStyle/>
+            <a:p>
+              <a:r>
+                <a:rPr lang="en-US" sz="1000" dirty="0" smtClean="0">
+                  <a:latin typeface="Calibri"/>
+                  <a:cs typeface="Calibri"/>
+                </a:rPr>
+                <a:t>25</a:t>
+              </a:r>
+              <a:endParaRPr lang="en-US" sz="1000" dirty="0">
+                <a:latin typeface="Calibri"/>
+                <a:cs typeface="Calibri"/>
+              </a:endParaRPr>
+            </a:p>
+          </p:txBody>
+        </p:sp>
+        <p:sp>
+          <p:nvSpPr>
+            <p:cNvPr id="19" name="TextBox 18"/>
+            <p:cNvSpPr txBox="1"/>
+            <p:nvPr/>
+          </p:nvSpPr>
+          <p:spPr>
+            <a:xfrm>
+              <a:off x="917956" y="3564852"/>
+              <a:ext cx="370246" cy="246221"/>
+            </a:xfrm>
+            <a:prstGeom prst="rect">
+              <a:avLst/>
+            </a:prstGeom>
+            <a:noFill/>
+          </p:spPr>
+          <p:txBody>
+            <a:bodyPr wrap="square" rtlCol="0">
+              <a:spAutoFit/>
+            </a:bodyPr>
+            <a:lstStyle/>
+            <a:p>
+              <a:r>
+                <a:rPr lang="en-US" sz="1000" dirty="0" smtClean="0">
+                  <a:latin typeface="Calibri"/>
+                  <a:cs typeface="Calibri"/>
+                </a:rPr>
+                <a:t>75</a:t>
+              </a:r>
+              <a:endParaRPr lang="en-US" sz="1000" dirty="0">
+                <a:latin typeface="Calibri"/>
+                <a:cs typeface="Calibri"/>
+              </a:endParaRPr>
+            </a:p>
+          </p:txBody>
+        </p:sp>
+        <p:pic>
+          <p:nvPicPr>
+            <p:cNvPr id="20" name="Picture 19" descr="crop.heatscale.tiff"/>
+            <p:cNvPicPr>
+              <a:picLocks noChangeAspect="1"/>
+            </p:cNvPicPr>
+            <p:nvPr/>
+          </p:nvPicPr>
+          <p:blipFill>
+            <a:blip r:embed="rId4">
+              <a:extLst>
+                <a:ext uri="{28A0092B-C50C-407E-A947-70E740481C1C}">
+                  <a14:useLocalDpi xmlns:a14="http://schemas.microsoft.com/office/drawing/2010/main" val="0"/>
+                </a:ext>
+              </a:extLst>
+            </a:blip>
+            <a:stretch>
+              <a:fillRect/>
+            </a:stretch>
+          </p:blipFill>
+          <p:spPr>
+            <a:xfrm rot="16200000">
+              <a:off x="-419396" y="4293343"/>
+              <a:ext cx="2519239" cy="155465"/>
+            </a:xfrm>
+            <a:prstGeom prst="rect">
+              <a:avLst/>
+            </a:prstGeom>
+          </p:spPr>
+        </p:pic>
+        <p:cxnSp>
+          <p:nvCxnSpPr>
+            <p:cNvPr id="21" name="Straight Connector 20"/>
+            <p:cNvCxnSpPr/>
+            <p:nvPr/>
+          </p:nvCxnSpPr>
+          <p:spPr>
+            <a:xfrm>
+              <a:off x="762490" y="3722717"/>
+              <a:ext cx="155465" cy="0"/>
+            </a:xfrm>
+            <a:prstGeom prst="line">
+              <a:avLst/>
+            </a:prstGeom>
+            <a:ln w="3175" cmpd="sng">
+              <a:solidFill>
+                <a:srgbClr val="000000"/>
+              </a:solidFill>
+            </a:ln>
+            <a:effectLst/>
+          </p:spPr>
+          <p:style>
+            <a:lnRef idx="2">
+              <a:schemeClr val="accent1"/>
+            </a:lnRef>
+            <a:fillRef idx="0">
+              <a:schemeClr val="accent1"/>
+            </a:fillRef>
+            <a:effectRef idx="1">
+              <a:schemeClr val="accent1"/>
+            </a:effectRef>
+            <a:fontRef idx="minor">
+              <a:schemeClr val="tx1"/>
+            </a:fontRef>
+          </p:style>
+        </p:cxnSp>
+        <p:cxnSp>
+          <p:nvCxnSpPr>
+            <p:cNvPr id="22" name="Straight Connector 21"/>
+            <p:cNvCxnSpPr/>
+            <p:nvPr/>
+          </p:nvCxnSpPr>
+          <p:spPr>
+            <a:xfrm>
+              <a:off x="762490" y="4304452"/>
+              <a:ext cx="155465" cy="0"/>
+            </a:xfrm>
+            <a:prstGeom prst="line">
+              <a:avLst/>
+            </a:prstGeom>
+            <a:ln w="3175" cmpd="sng">
+              <a:solidFill>
+                <a:srgbClr val="000000"/>
+              </a:solidFill>
+            </a:ln>
+            <a:effectLst/>
+          </p:spPr>
+          <p:style>
+            <a:lnRef idx="2">
+              <a:schemeClr val="accent1"/>
+            </a:lnRef>
+            <a:fillRef idx="0">
+              <a:schemeClr val="accent1"/>
+            </a:fillRef>
+            <a:effectRef idx="1">
+              <a:schemeClr val="accent1"/>
+            </a:effectRef>
+            <a:fontRef idx="minor">
+              <a:schemeClr val="tx1"/>
+            </a:fontRef>
+          </p:style>
+        </p:cxnSp>
+        <p:cxnSp>
+          <p:nvCxnSpPr>
+            <p:cNvPr id="23" name="Straight Connector 22"/>
+            <p:cNvCxnSpPr/>
+            <p:nvPr/>
+          </p:nvCxnSpPr>
+          <p:spPr>
+            <a:xfrm>
+              <a:off x="762490" y="4890851"/>
+              <a:ext cx="155465" cy="0"/>
+            </a:xfrm>
+            <a:prstGeom prst="line">
+              <a:avLst/>
+            </a:prstGeom>
+            <a:ln w="3175" cmpd="sng">
+              <a:solidFill>
+                <a:srgbClr val="000000"/>
+              </a:solidFill>
+            </a:ln>
+            <a:effectLst/>
+          </p:spPr>
+          <p:style>
+            <a:lnRef idx="2">
+              <a:schemeClr val="accent1"/>
+            </a:lnRef>
+            <a:fillRef idx="0">
+              <a:schemeClr val="accent1"/>
+            </a:fillRef>
+            <a:effectRef idx="1">
+              <a:schemeClr val="accent1"/>
+            </a:effectRef>
+            <a:fontRef idx="minor">
+              <a:schemeClr val="tx1"/>
+            </a:fontRef>
+          </p:style>
+        </p:cxnSp>
+        <p:cxnSp>
+          <p:nvCxnSpPr>
+            <p:cNvPr id="24" name="Straight Connector 23"/>
+            <p:cNvCxnSpPr/>
+            <p:nvPr/>
+          </p:nvCxnSpPr>
+          <p:spPr>
+            <a:xfrm>
+              <a:off x="762490" y="3114396"/>
+              <a:ext cx="155465" cy="0"/>
+            </a:xfrm>
+            <a:prstGeom prst="line">
+              <a:avLst/>
+            </a:prstGeom>
+            <a:ln w="3175" cmpd="sng">
+              <a:solidFill>
+                <a:srgbClr val="000000"/>
+              </a:solidFill>
+            </a:ln>
+            <a:effectLst/>
+          </p:spPr>
+          <p:style>
+            <a:lnRef idx="2">
+              <a:schemeClr val="accent1"/>
+            </a:lnRef>
+            <a:fillRef idx="0">
+              <a:schemeClr val="accent1"/>
+            </a:fillRef>
+            <a:effectRef idx="1">
+              <a:schemeClr val="accent1"/>
+            </a:effectRef>
+            <a:fontRef idx="minor">
+              <a:schemeClr val="tx1"/>
+            </a:fontRef>
+          </p:style>
+        </p:cxnSp>
+        <p:cxnSp>
+          <p:nvCxnSpPr>
+            <p:cNvPr id="25" name="Straight Connector 24"/>
+            <p:cNvCxnSpPr/>
+            <p:nvPr/>
+          </p:nvCxnSpPr>
+          <p:spPr>
+            <a:xfrm>
+              <a:off x="763562" y="5630695"/>
+              <a:ext cx="155465" cy="0"/>
+            </a:xfrm>
+            <a:prstGeom prst="line">
+              <a:avLst/>
+            </a:prstGeom>
+            <a:ln w="3175" cmpd="sng">
+              <a:solidFill>
+                <a:srgbClr val="000000"/>
+              </a:solidFill>
+            </a:ln>
+            <a:effectLst/>
+          </p:spPr>
+          <p:style>
+            <a:lnRef idx="2">
+              <a:schemeClr val="accent1"/>
+            </a:lnRef>
+            <a:fillRef idx="0">
+              <a:schemeClr val="accent1"/>
+            </a:fillRef>
+            <a:effectRef idx="1">
+              <a:schemeClr val="accent1"/>
+            </a:effectRef>
+            <a:fontRef idx="minor">
+              <a:schemeClr val="tx1"/>
+            </a:fontRef>
+          </p:style>
+        </p:cxnSp>
+      </p:grpSp>
+    </p:spTree>
+    <p:extLst>
+      <p:ext uri="{BB962C8B-B14F-4D97-AF65-F5344CB8AC3E}">
+        <p14:creationId xmlns:p14="http://schemas.microsoft.com/office/powerpoint/2010/main" val="477887988"/>
+      </p:ext>
+    </p:extLst>
+  </p:cSld>
+  <p:clrMapOvr>
+    <a:masterClrMapping/>
+  </p:clrMapOvr>
+  <p:timing>
+    <p:tnLst>
+      <p:par>
+        <p:cTn xmlns:p14="http://schemas.microsoft.com/office/powerpoint/2010/main" id="1" dur="indefinite" restart="never" nodeType="tmRoot"/>
+      </p:par>
+    </p:tnLst>
+  </p:timing>
+</p:sld>
+</file>
+
+<file path=ppt/slides/slide8.xml><?xml version="1.0" encoding="utf-8"?>
+<p:sld xmlns:a="http://schemas.openxmlformats.org/drawingml/2006/main" xmlns:r="http://schemas.openxmlformats.org/officeDocument/2006/relationships" xmlns:p="http://schemas.openxmlformats.org/presentationml/2006/main">
+  <p:cSld>
+    <p:spTree>
+      <p:nvGrpSpPr>
+        <p:cNvPr id="1" name=""/>
+        <p:cNvGrpSpPr/>
+        <p:nvPr/>
+      </p:nvGrpSpPr>
+      <p:grpSpPr>
+        <a:xfrm>
+          <a:off x="0" y="0"/>
+          <a:ext cx="0" cy="0"/>
+          <a:chOff x="0" y="0"/>
+          <a:chExt cx="0" cy="0"/>
+        </a:xfrm>
+      </p:grpSpPr>
+      <p:sp>
+        <p:nvSpPr>
+          <p:cNvPr id="2" name="Title 1"/>
+          <p:cNvSpPr>
+            <a:spLocks noGrp="1"/>
+          </p:cNvSpPr>
+          <p:nvPr>
+            <p:ph type="title"/>
+          </p:nvPr>
+        </p:nvSpPr>
+        <p:spPr/>
+        <p:txBody>
+          <a:bodyPr>
+            <a:noAutofit/>
+          </a:bodyPr>
+          <a:lstStyle/>
+          <a:p>
+            <a:r>
+              <a:rPr lang="en-US" sz="3600" dirty="0" smtClean="0"/>
+              <a:t>Others Showed Evidence of Past </a:t>
+            </a:r>
+            <a:br>
+              <a:rPr lang="en-US" sz="3600" dirty="0" smtClean="0"/>
+            </a:br>
+            <a:r>
+              <a:rPr lang="en-US" sz="3600" dirty="0" smtClean="0"/>
+              <a:t>Gene-specific Sweeps</a:t>
+            </a:r>
+            <a:endParaRPr lang="en-US" sz="3600" dirty="0"/>
+          </a:p>
+        </p:txBody>
+      </p:sp>
+      <p:sp>
+        <p:nvSpPr>
+          <p:cNvPr id="3" name="Content Placeholder 2"/>
+          <p:cNvSpPr>
+            <a:spLocks noGrp="1"/>
+          </p:cNvSpPr>
+          <p:nvPr>
+            <p:ph sz="half" idx="1"/>
+          </p:nvPr>
+        </p:nvSpPr>
+        <p:spPr/>
+        <p:txBody>
+          <a:bodyPr/>
+          <a:lstStyle/>
+          <a:p>
+            <a:endParaRPr lang="en-US"/>
+          </a:p>
+        </p:txBody>
+      </p:sp>
+      <p:sp>
+        <p:nvSpPr>
+          <p:cNvPr id="4" name="Content Placeholder 3"/>
+          <p:cNvSpPr>
+            <a:spLocks noGrp="1"/>
+          </p:cNvSpPr>
+          <p:nvPr>
+            <p:ph sz="half" idx="2"/>
+          </p:nvPr>
+        </p:nvSpPr>
+        <p:spPr/>
+        <p:txBody>
+          <a:bodyPr/>
+          <a:lstStyle/>
+          <a:p>
+            <a:endParaRPr lang="en-US" dirty="0"/>
+          </a:p>
+        </p:txBody>
+      </p:sp>
+      <p:grpSp>
+        <p:nvGrpSpPr>
+          <p:cNvPr id="12" name="Group 11"/>
+          <p:cNvGrpSpPr/>
+          <p:nvPr/>
+        </p:nvGrpSpPr>
+        <p:grpSpPr>
+          <a:xfrm>
+            <a:off x="457200" y="1553961"/>
+            <a:ext cx="8103286" cy="4209949"/>
+            <a:chOff x="457200" y="1553962"/>
+            <a:chExt cx="5947276" cy="3089824"/>
+          </a:xfrm>
+        </p:grpSpPr>
+        <p:pic>
+          <p:nvPicPr>
+            <p:cNvPr id="7" name="Picture 6" descr="TH00111.circular.SNP.map.png"/>
+            <p:cNvPicPr>
+              <a:picLocks noChangeAspect="1"/>
+            </p:cNvPicPr>
+            <p:nvPr/>
+          </p:nvPicPr>
+          <p:blipFill rotWithShape="1">
+            <a:blip r:embed="rId2">
+              <a:extLst>
+                <a:ext uri="{28A0092B-C50C-407E-A947-70E740481C1C}">
+                  <a14:useLocalDpi xmlns:a14="http://schemas.microsoft.com/office/drawing/2010/main" val="0"/>
+                </a:ext>
+              </a:extLst>
+            </a:blip>
+            <a:srcRect l="26666" t="14445" r="26667" b="15555"/>
+            <a:stretch/>
+          </p:blipFill>
+          <p:spPr>
+            <a:xfrm>
+              <a:off x="457200" y="1698466"/>
+              <a:ext cx="2941200" cy="2941200"/>
+            </a:xfrm>
+            <a:prstGeom prst="rect">
+              <a:avLst/>
+            </a:prstGeom>
+          </p:spPr>
+        </p:pic>
+        <p:pic>
+          <p:nvPicPr>
+            <p:cNvPr id="8" name="Picture 7" descr="TH00238.circular.SNP.map.png"/>
+            <p:cNvPicPr>
+              <a:picLocks noChangeAspect="1"/>
+            </p:cNvPicPr>
+            <p:nvPr/>
+          </p:nvPicPr>
+          <p:blipFill rotWithShape="1">
+            <a:blip r:embed="rId3">
+              <a:extLst>
+                <a:ext uri="{28A0092B-C50C-407E-A947-70E740481C1C}">
+                  <a14:useLocalDpi xmlns:a14="http://schemas.microsoft.com/office/drawing/2010/main" val="0"/>
+                </a:ext>
+              </a:extLst>
+            </a:blip>
+            <a:srcRect l="26667" t="13611" r="26666" b="16389"/>
+            <a:stretch/>
+          </p:blipFill>
+          <p:spPr>
+            <a:xfrm>
+              <a:off x="3463276" y="1702586"/>
+              <a:ext cx="2941200" cy="2941200"/>
+            </a:xfrm>
+            <a:prstGeom prst="rect">
+              <a:avLst/>
+            </a:prstGeom>
+          </p:spPr>
+        </p:pic>
+        <p:sp>
+          <p:nvSpPr>
+            <p:cNvPr id="9" name="TextBox 8"/>
+            <p:cNvSpPr txBox="1"/>
+            <p:nvPr/>
+          </p:nvSpPr>
+          <p:spPr>
+            <a:xfrm>
+              <a:off x="635001" y="1559797"/>
+              <a:ext cx="1370387" cy="276999"/>
+            </a:xfrm>
+            <a:prstGeom prst="rect">
+              <a:avLst/>
+            </a:prstGeom>
+            <a:noFill/>
+          </p:spPr>
+          <p:txBody>
+            <a:bodyPr wrap="none" rtlCol="0">
+              <a:spAutoFit/>
+            </a:bodyPr>
+            <a:lstStyle/>
+            <a:p>
+              <a:r>
+                <a:rPr lang="en-US" sz="1200" dirty="0" smtClean="0"/>
+                <a:t>A) </a:t>
+              </a:r>
+              <a:r>
+                <a:rPr lang="en-US" sz="1200" i="1" dirty="0" smtClean="0"/>
+                <a:t>Chlorobium</a:t>
+              </a:r>
+              <a:r>
+                <a:rPr lang="en-US" sz="1200" dirty="0" smtClean="0"/>
+                <a:t>-111</a:t>
+              </a:r>
+              <a:endParaRPr lang="en-US" sz="1200" dirty="0"/>
+            </a:p>
+          </p:txBody>
+        </p:sp>
+        <p:sp>
+          <p:nvSpPr>
+            <p:cNvPr id="10" name="TextBox 9"/>
+            <p:cNvSpPr txBox="1"/>
+            <p:nvPr/>
+          </p:nvSpPr>
+          <p:spPr>
+            <a:xfrm>
+              <a:off x="3567894" y="1553962"/>
+              <a:ext cx="1698094" cy="276999"/>
+            </a:xfrm>
+            <a:prstGeom prst="rect">
+              <a:avLst/>
+            </a:prstGeom>
+            <a:noFill/>
+          </p:spPr>
+          <p:txBody>
+            <a:bodyPr wrap="none" rtlCol="0">
+              <a:spAutoFit/>
+            </a:bodyPr>
+            <a:lstStyle/>
+            <a:p>
+              <a:r>
+                <a:rPr lang="en-US" sz="1200" dirty="0"/>
+                <a:t>B</a:t>
+              </a:r>
+              <a:r>
+                <a:rPr lang="en-US" sz="1200" dirty="0" smtClean="0"/>
+                <a:t>) </a:t>
+              </a:r>
+              <a:r>
+                <a:rPr lang="en-US" sz="1200" i="1" dirty="0" smtClean="0"/>
+                <a:t>Polynucleobacter</a:t>
+              </a:r>
+              <a:r>
+                <a:rPr lang="en-US" sz="1200" dirty="0" smtClean="0"/>
+                <a:t>-238</a:t>
+              </a:r>
+              <a:endParaRPr lang="en-US" sz="1200" dirty="0"/>
+            </a:p>
+          </p:txBody>
+        </p:sp>
+      </p:grpSp>
+      <p:cxnSp>
+        <p:nvCxnSpPr>
+          <p:cNvPr id="11" name="Straight Arrow Connector 10"/>
+          <p:cNvCxnSpPr/>
+          <p:nvPr/>
+        </p:nvCxnSpPr>
+        <p:spPr>
+          <a:xfrm flipH="1">
+            <a:off x="7015451" y="1867343"/>
+            <a:ext cx="76200" cy="274839"/>
+          </a:xfrm>
+          <a:prstGeom prst="straightConnector1">
+            <a:avLst/>
+          </a:prstGeom>
+          <a:ln>
+            <a:solidFill>
+              <a:schemeClr val="tx1">
+                <a:lumMod val="95000"/>
+                <a:lumOff val="5000"/>
+              </a:schemeClr>
+            </a:solidFill>
+            <a:tailEnd type="arrow"/>
+          </a:ln>
+          <a:effectLst/>
+        </p:spPr>
+        <p:style>
+          <a:lnRef idx="2">
+            <a:schemeClr val="accent1"/>
+          </a:lnRef>
+          <a:fillRef idx="0">
+            <a:schemeClr val="accent1"/>
+          </a:fillRef>
+          <a:effectRef idx="1">
+            <a:schemeClr val="accent1"/>
+          </a:effectRef>
+          <a:fontRef idx="minor">
+            <a:schemeClr val="tx1"/>
+          </a:fontRef>
+        </p:style>
+      </p:cxnSp>
+    </p:spTree>
+    <p:extLst>
+      <p:ext uri="{BB962C8B-B14F-4D97-AF65-F5344CB8AC3E}">
+        <p14:creationId xmlns:p14="http://schemas.microsoft.com/office/powerpoint/2010/main" val="1288427866"/>
+      </p:ext>
+    </p:extLst>
+  </p:cSld>
+  <p:clrMapOvr>
+    <a:masterClrMapping/>
+  </p:clrMapOvr>
+  <p:timing>
+    <p:tnLst>
+      <p:par>
+        <p:cTn xmlns:p14="http://schemas.microsoft.com/office/powerpoint/2010/main" id="1" dur="indefinite" restart="never" nodeType="tmRoot"/>
+      </p:par>
+    </p:tnLst>
+  </p:timing>
+</p:sld>
+</file>
+
+<file path=ppt/slides/slide9.xml><?xml version="1.0" encoding="utf-8"?>
+<p:sld xmlns:a="http://schemas.openxmlformats.org/drawingml/2006/main" xmlns:r="http://schemas.openxmlformats.org/officeDocument/2006/relationships" xmlns:p="http://schemas.openxmlformats.org/presentationml/2006/main">
+  <p:cSld>
+    <p:spTree>
+      <p:nvGrpSpPr>
+        <p:cNvPr id="1" name=""/>
+        <p:cNvGrpSpPr/>
+        <p:nvPr/>
+      </p:nvGrpSpPr>
+      <p:grpSpPr>
+        <a:xfrm>
+          <a:off x="0" y="0"/>
+          <a:ext cx="0" cy="0"/>
+          <a:chOff x="0" y="0"/>
+          <a:chExt cx="0" cy="0"/>
+        </a:xfrm>
+      </p:grpSpPr>
+      <p:sp>
+        <p:nvSpPr>
+          <p:cNvPr id="2" name="Title 1"/>
+          <p:cNvSpPr>
+            <a:spLocks noGrp="1"/>
+          </p:cNvSpPr>
+          <p:nvPr>
+            <p:ph type="title"/>
+          </p:nvPr>
+        </p:nvSpPr>
+        <p:spPr/>
+        <p:txBody>
+          <a:bodyPr/>
+          <a:lstStyle/>
+          <a:p>
+            <a:r>
+              <a:rPr lang="en-US" dirty="0" smtClean="0"/>
+              <a:t>Conclusion</a:t>
+            </a:r>
+            <a:endParaRPr lang="en-US" dirty="0"/>
+          </a:p>
+        </p:txBody>
+      </p:sp>
+      <p:sp>
+        <p:nvSpPr>
+          <p:cNvPr id="3" name="Content Placeholder 2"/>
+          <p:cNvSpPr>
+            <a:spLocks noGrp="1"/>
+          </p:cNvSpPr>
+          <p:nvPr>
+            <p:ph idx="1"/>
+          </p:nvPr>
+        </p:nvSpPr>
+        <p:spPr/>
+        <p:txBody>
+          <a:bodyPr anchor="ctr"/>
+          <a:lstStyle/>
+          <a:p>
+            <a:pPr marL="0" indent="0" algn="ctr">
+              <a:buNone/>
+            </a:pPr>
+            <a:r>
+              <a:rPr lang="en-US" dirty="0"/>
+              <a:t>T</a:t>
+            </a:r>
+            <a:r>
+              <a:rPr lang="en-US" dirty="0" smtClean="0"/>
+              <a:t>hat diversity within co-occurring populations may be controlled by different mechanisms and explained by different evolutionary models</a:t>
+            </a:r>
+          </a:p>
+          <a:p>
+            <a:pPr marL="0" indent="0">
+              <a:buNone/>
+            </a:pPr>
+            <a:endParaRPr lang="en-US" dirty="0"/>
+          </a:p>
+        </p:txBody>
+      </p:sp>
+    </p:spTree>
+    <p:extLst>
+      <p:ext uri="{BB962C8B-B14F-4D97-AF65-F5344CB8AC3E}">
+        <p14:creationId xmlns:p14="http://schemas.microsoft.com/office/powerpoint/2010/main" val="193449578"/>
+      </p:ext>
+    </p:extLst>
+  </p:cSld>
+  <p:clrMapOvr>
+    <a:masterClrMapping/>
+  </p:clrMapOvr>
+  <p:timing>
+    <p:tnLst>
+      <p:par>
+        <p:cTn xmlns:p14="http://schemas.microsoft.com/office/powerpoint/2010/main" id="1" dur="indefinite" restart="never" nodeType="tmRoot"/>
+      </p:par>
+    </p:tnLst>
+  </p:timing>
 </p:sld>
 </file>
 
@@ -3464,4 +7585,324 @@
   </a:objectDefaults>
   <a:extraClrSchemeLst/>
 </a:theme>
+</file>
+
+<file path=ppt/theme/theme2.xml><?xml version="1.0" encoding="utf-8"?>
+<a:theme xmlns:a="http://schemas.openxmlformats.org/drawingml/2006/main" name="Office Theme">
+  <a:themeElements>
+    <a:clrScheme name="Office">
+      <a:dk1>
+        <a:sysClr val="windowText" lastClr="000000"/>
+      </a:dk1>
+      <a:lt1>
+        <a:sysClr val="window" lastClr="FFFFFF"/>
+      </a:lt1>
+      <a:dk2>
+        <a:srgbClr val="1F497D"/>
+      </a:dk2>
+      <a:lt2>
+        <a:srgbClr val="EEECE1"/>
+      </a:lt2>
+      <a:accent1>
+        <a:srgbClr val="4F81BD"/>
+      </a:accent1>
+      <a:accent2>
+        <a:srgbClr val="C0504D"/>
+      </a:accent2>
+      <a:accent3>
+        <a:srgbClr val="9BBB59"/>
+      </a:accent3>
+      <a:accent4>
+        <a:srgbClr val="8064A2"/>
+      </a:accent4>
+      <a:accent5>
+        <a:srgbClr val="4BACC6"/>
+      </a:accent5>
+      <a:accent6>
+        <a:srgbClr val="F79646"/>
+      </a:accent6>
+      <a:hlink>
+        <a:srgbClr val="0000FF"/>
+      </a:hlink>
+      <a:folHlink>
+        <a:srgbClr val="800080"/>
+      </a:folHlink>
+    </a:clrScheme>
+    <a:fontScheme name="Office">
+      <a:majorFont>
+        <a:latin typeface="Calibri"/>
+        <a:ea typeface=""/>
+        <a:cs typeface=""/>
+        <a:font script="Jpan" typeface="ＭＳ Ｐゴシック"/>
+        <a:font script="Hang" typeface="맑은 고딕"/>
+        <a:font script="Hans" typeface="宋体"/>
+        <a:font script="Hant" typeface="新細明體"/>
+        <a:font script="Arab" typeface="Times New Roman"/>
+        <a:font script="Hebr" typeface="Times New Roman"/>
+        <a:font script="Thai" typeface="Angsana New"/>
+        <a:font script="Ethi" typeface="Nyala"/>
+        <a:font script="Beng" typeface="Vrinda"/>
+        <a:font script="Gujr" typeface="Shruti"/>
+        <a:font script="Khmr" typeface="MoolBoran"/>
+        <a:font script="Knda" typeface="Tunga"/>
+        <a:font script="Guru" typeface="Raavi"/>
+        <a:font script="Cans" typeface="Euphemia"/>
+        <a:font script="Cher" typeface="Plantagenet Cherokee"/>
+        <a:font script="Yiii" typeface="Microsoft Yi Baiti"/>
+        <a:font script="Tibt" typeface="Microsoft Himalaya"/>
+        <a:font script="Thaa" typeface="MV Boli"/>
+        <a:font script="Deva" typeface="Mangal"/>
+        <a:font script="Telu" typeface="Gautami"/>
+        <a:font script="Taml" typeface="Latha"/>
+        <a:font script="Syrc" typeface="Estrangelo Edessa"/>
+        <a:font script="Orya" typeface="Kalinga"/>
+        <a:font script="Mlym" typeface="Kartika"/>
+        <a:font script="Laoo" typeface="DokChampa"/>
+        <a:font script="Sinh" typeface="Iskoola Pota"/>
+        <a:font script="Mong" typeface="Mongolian Baiti"/>
+        <a:font script="Viet" typeface="Times New Roman"/>
+        <a:font script="Uigh" typeface="Microsoft Uighur"/>
+        <a:font script="Geor" typeface="Sylfaen"/>
+      </a:majorFont>
+      <a:minorFont>
+        <a:latin typeface="Calibri"/>
+        <a:ea typeface=""/>
+        <a:cs typeface=""/>
+        <a:font script="Jpan" typeface="ＭＳ Ｐゴシック"/>
+        <a:font script="Hang" typeface="맑은 고딕"/>
+        <a:font script="Hans" typeface="宋体"/>
+        <a:font script="Hant" typeface="新細明體"/>
+        <a:font script="Arab" typeface="Arial"/>
+        <a:font script="Hebr" typeface="Arial"/>
+        <a:font script="Thai" typeface="Cordia New"/>
+        <a:font script="Ethi" typeface="Nyala"/>
+        <a:font script="Beng" typeface="Vrinda"/>
+        <a:font script="Gujr" typeface="Shruti"/>
+        <a:font script="Khmr" typeface="DaunPenh"/>
+        <a:font script="Knda" typeface="Tunga"/>
+        <a:font script="Guru" typeface="Raavi"/>
+        <a:font script="Cans" typeface="Euphemia"/>
+        <a:font script="Cher" typeface="Plantagenet Cherokee"/>
+        <a:font script="Yiii" typeface="Microsoft Yi Baiti"/>
+        <a:font script="Tibt" typeface="Microsoft Himalaya"/>
+        <a:font script="Thaa" typeface="MV Boli"/>
+        <a:font script="Deva" typeface="Mangal"/>
+        <a:font script="Telu" typeface="Gautami"/>
+        <a:font script="Taml" typeface="Latha"/>
+        <a:font script="Syrc" typeface="Estrangelo Edessa"/>
+        <a:font script="Orya" typeface="Kalinga"/>
+        <a:font script="Mlym" typeface="Kartika"/>
+        <a:font script="Laoo" typeface="DokChampa"/>
+        <a:font script="Sinh" typeface="Iskoola Pota"/>
+        <a:font script="Mong" typeface="Mongolian Baiti"/>
+        <a:font script="Viet" typeface="Arial"/>
+        <a:font script="Uigh" typeface="Microsoft Uighur"/>
+        <a:font script="Geor" typeface="Sylfaen"/>
+      </a:minorFont>
+    </a:fontScheme>
+    <a:fmtScheme name="Office">
+      <a:fillStyleLst>
+        <a:solidFill>
+          <a:schemeClr val="phClr"/>
+        </a:solidFill>
+        <a:gradFill rotWithShape="1">
+          <a:gsLst>
+            <a:gs pos="0">
+              <a:schemeClr val="phClr">
+                <a:tint val="50000"/>
+                <a:satMod val="300000"/>
+              </a:schemeClr>
+            </a:gs>
+            <a:gs pos="35000">
+              <a:schemeClr val="phClr">
+                <a:tint val="37000"/>
+                <a:satMod val="300000"/>
+              </a:schemeClr>
+            </a:gs>
+            <a:gs pos="100000">
+              <a:schemeClr val="phClr">
+                <a:tint val="15000"/>
+                <a:satMod val="350000"/>
+              </a:schemeClr>
+            </a:gs>
+          </a:gsLst>
+          <a:lin ang="16200000" scaled="1"/>
+        </a:gradFill>
+        <a:gradFill rotWithShape="1">
+          <a:gsLst>
+            <a:gs pos="0">
+              <a:schemeClr val="phClr">
+                <a:tint val="100000"/>
+                <a:shade val="100000"/>
+                <a:satMod val="130000"/>
+              </a:schemeClr>
+            </a:gs>
+            <a:gs pos="100000">
+              <a:schemeClr val="phClr">
+                <a:tint val="50000"/>
+                <a:shade val="100000"/>
+                <a:satMod val="350000"/>
+              </a:schemeClr>
+            </a:gs>
+          </a:gsLst>
+          <a:lin ang="16200000" scaled="0"/>
+        </a:gradFill>
+      </a:fillStyleLst>
+      <a:lnStyleLst>
+        <a:ln w="9525" cap="flat" cmpd="sng" algn="ctr">
+          <a:solidFill>
+            <a:schemeClr val="phClr">
+              <a:shade val="95000"/>
+              <a:satMod val="105000"/>
+            </a:schemeClr>
+          </a:solidFill>
+          <a:prstDash val="solid"/>
+        </a:ln>
+        <a:ln w="25400" cap="flat" cmpd="sng" algn="ctr">
+          <a:solidFill>
+            <a:schemeClr val="phClr"/>
+          </a:solidFill>
+          <a:prstDash val="solid"/>
+        </a:ln>
+        <a:ln w="38100" cap="flat" cmpd="sng" algn="ctr">
+          <a:solidFill>
+            <a:schemeClr val="phClr"/>
+          </a:solidFill>
+          <a:prstDash val="solid"/>
+        </a:ln>
+      </a:lnStyleLst>
+      <a:effectStyleLst>
+        <a:effectStyle>
+          <a:effectLst>
+            <a:outerShdw blurRad="40000" dist="20000" dir="5400000" rotWithShape="0">
+              <a:srgbClr val="000000">
+                <a:alpha val="38000"/>
+              </a:srgbClr>
+            </a:outerShdw>
+          </a:effectLst>
+        </a:effectStyle>
+        <a:effectStyle>
+          <a:effectLst>
+            <a:outerShdw blurRad="40000" dist="23000" dir="5400000" rotWithShape="0">
+              <a:srgbClr val="000000">
+                <a:alpha val="35000"/>
+              </a:srgbClr>
+            </a:outerShdw>
+          </a:effectLst>
+        </a:effectStyle>
+        <a:effectStyle>
+          <a:effectLst>
+            <a:outerShdw blurRad="40000" dist="23000" dir="5400000" rotWithShape="0">
+              <a:srgbClr val="000000">
+                <a:alpha val="35000"/>
+              </a:srgbClr>
+            </a:outerShdw>
+          </a:effectLst>
+          <a:scene3d>
+            <a:camera prst="orthographicFront">
+              <a:rot lat="0" lon="0" rev="0"/>
+            </a:camera>
+            <a:lightRig rig="threePt" dir="t">
+              <a:rot lat="0" lon="0" rev="1200000"/>
+            </a:lightRig>
+          </a:scene3d>
+          <a:sp3d>
+            <a:bevelT w="63500" h="25400"/>
+          </a:sp3d>
+        </a:effectStyle>
+      </a:effectStyleLst>
+      <a:bgFillStyleLst>
+        <a:solidFill>
+          <a:schemeClr val="phClr"/>
+        </a:solidFill>
+        <a:gradFill rotWithShape="1">
+          <a:gsLst>
+            <a:gs pos="0">
+              <a:schemeClr val="phClr">
+                <a:tint val="40000"/>
+                <a:satMod val="350000"/>
+              </a:schemeClr>
+            </a:gs>
+            <a:gs pos="40000">
+              <a:schemeClr val="phClr">
+                <a:tint val="45000"/>
+                <a:shade val="99000"/>
+                <a:satMod val="350000"/>
+              </a:schemeClr>
+            </a:gs>
+            <a:gs pos="100000">
+              <a:schemeClr val="phClr">
+                <a:shade val="20000"/>
+                <a:satMod val="255000"/>
+              </a:schemeClr>
+            </a:gs>
+          </a:gsLst>
+          <a:path path="circle">
+            <a:fillToRect l="50000" t="-80000" r="50000" b="180000"/>
+          </a:path>
+        </a:gradFill>
+        <a:gradFill rotWithShape="1">
+          <a:gsLst>
+            <a:gs pos="0">
+              <a:schemeClr val="phClr">
+                <a:tint val="80000"/>
+                <a:satMod val="300000"/>
+              </a:schemeClr>
+            </a:gs>
+            <a:gs pos="100000">
+              <a:schemeClr val="phClr">
+                <a:shade val="30000"/>
+                <a:satMod val="200000"/>
+              </a:schemeClr>
+            </a:gs>
+          </a:gsLst>
+          <a:path path="circle">
+            <a:fillToRect l="50000" t="50000" r="50000" b="50000"/>
+          </a:path>
+        </a:gradFill>
+      </a:bgFillStyleLst>
+    </a:fmtScheme>
+  </a:themeElements>
+  <a:objectDefaults>
+    <a:spDef>
+      <a:spPr/>
+      <a:bodyPr/>
+      <a:lstStyle/>
+      <a:style>
+        <a:lnRef idx="1">
+          <a:schemeClr val="accent1"/>
+        </a:lnRef>
+        <a:fillRef idx="3">
+          <a:schemeClr val="accent1"/>
+        </a:fillRef>
+        <a:effectRef idx="2">
+          <a:schemeClr val="accent1"/>
+        </a:effectRef>
+        <a:fontRef idx="minor">
+          <a:schemeClr val="lt1"/>
+        </a:fontRef>
+      </a:style>
+    </a:spDef>
+    <a:lnDef>
+      <a:spPr/>
+      <a:bodyPr/>
+      <a:lstStyle/>
+      <a:style>
+        <a:lnRef idx="2">
+          <a:schemeClr val="accent1"/>
+        </a:lnRef>
+        <a:fillRef idx="0">
+          <a:schemeClr val="accent1"/>
+        </a:fillRef>
+        <a:effectRef idx="1">
+          <a:schemeClr val="accent1"/>
+        </a:effectRef>
+        <a:fontRef idx="minor">
+          <a:schemeClr val="tx1"/>
+        </a:fontRef>
+      </a:style>
+    </a:lnDef>
+  </a:objectDefaults>
+  <a:extraClrSchemeLst/>
+</a:theme>
 </file>
</xml_diff>

<commit_message>
Updated presentation based on Trina's comments
</commit_message>
<xml_diff>
--- a/3YCM/3YCM_pres.pptx
+++ b/3YCM/3YCM_pres.pptx
@@ -5,30 +5,31 @@
     <p:sldMasterId id="2147483648" r:id="rId1"/>
   </p:sldMasterIdLst>
   <p:notesMasterIdLst>
-    <p:notesMasterId r:id="rId23"/>
+    <p:notesMasterId r:id="rId24"/>
   </p:notesMasterIdLst>
   <p:sldIdLst>
     <p:sldId id="256" r:id="rId2"/>
     <p:sldId id="265" r:id="rId3"/>
     <p:sldId id="257" r:id="rId4"/>
-    <p:sldId id="258" r:id="rId5"/>
-    <p:sldId id="259" r:id="rId6"/>
-    <p:sldId id="260" r:id="rId7"/>
-    <p:sldId id="261" r:id="rId8"/>
-    <p:sldId id="262" r:id="rId9"/>
-    <p:sldId id="264" r:id="rId10"/>
-    <p:sldId id="263" r:id="rId11"/>
-    <p:sldId id="266" r:id="rId12"/>
-    <p:sldId id="267" r:id="rId13"/>
-    <p:sldId id="269" r:id="rId14"/>
-    <p:sldId id="270" r:id="rId15"/>
-    <p:sldId id="271" r:id="rId16"/>
-    <p:sldId id="272" r:id="rId17"/>
-    <p:sldId id="273" r:id="rId18"/>
-    <p:sldId id="274" r:id="rId19"/>
-    <p:sldId id="276" r:id="rId20"/>
-    <p:sldId id="275" r:id="rId21"/>
-    <p:sldId id="277" r:id="rId22"/>
+    <p:sldId id="278" r:id="rId5"/>
+    <p:sldId id="258" r:id="rId6"/>
+    <p:sldId id="259" r:id="rId7"/>
+    <p:sldId id="260" r:id="rId8"/>
+    <p:sldId id="261" r:id="rId9"/>
+    <p:sldId id="262" r:id="rId10"/>
+    <p:sldId id="264" r:id="rId11"/>
+    <p:sldId id="263" r:id="rId12"/>
+    <p:sldId id="266" r:id="rId13"/>
+    <p:sldId id="267" r:id="rId14"/>
+    <p:sldId id="269" r:id="rId15"/>
+    <p:sldId id="270" r:id="rId16"/>
+    <p:sldId id="271" r:id="rId17"/>
+    <p:sldId id="272" r:id="rId18"/>
+    <p:sldId id="273" r:id="rId19"/>
+    <p:sldId id="274" r:id="rId20"/>
+    <p:sldId id="276" r:id="rId21"/>
+    <p:sldId id="275" r:id="rId22"/>
+    <p:sldId id="277" r:id="rId23"/>
   </p:sldIdLst>
   <p:sldSz cx="9144000" cy="6858000" type="screen4x3"/>
   <p:notesSz cx="6858000" cy="9144000"/>
@@ -566,7 +567,7 @@
           <a:p>
             <a:fld id="{C935E3E0-512B-774F-90A8-EB29BF88DABA}" type="slidenum">
               <a:rPr lang="en-US" smtClean="0"/>
-              <a:t>5</a:t>
+              <a:t>6</a:t>
             </a:fld>
             <a:endParaRPr lang="en-US"/>
           </a:p>
@@ -662,7 +663,7 @@
           <a:p>
             <a:fld id="{E24C21EA-28B2-0442-AFB4-706342F125BD}" type="slidenum">
               <a:rPr lang="en-US" smtClean="0"/>
-              <a:t>10</a:t>
+              <a:t>11</a:t>
             </a:fld>
             <a:endParaRPr lang="en-US"/>
           </a:p>
@@ -727,17 +728,11 @@
           <a:p>
             <a:r>
               <a:rPr lang="en-US" dirty="0" smtClean="0"/>
-              <a:t>L06 show the same pattern, since they are tracking</a:t>
+              <a:t>Considering</a:t>
             </a:r>
             <a:r>
               <a:rPr lang="en-US" baseline="0" dirty="0" smtClean="0"/>
-              <a:t> the same population, which is reassuring</a:t>
-            </a:r>
-          </a:p>
-          <a:p>
-            <a:r>
-              <a:rPr lang="en-US" baseline="0" dirty="0" smtClean="0"/>
-              <a:t>I14 and M14 are lower abundance (of our set)</a:t>
+              <a:t> using # of reads instead of relative recruitment on the X axis?  What do you think?</a:t>
             </a:r>
             <a:endParaRPr lang="en-US" dirty="0"/>
           </a:p>
@@ -769,7 +764,7 @@
     </p:spTree>
     <p:extLst>
       <p:ext uri="{BB962C8B-B14F-4D97-AF65-F5344CB8AC3E}">
-        <p14:creationId xmlns:p14="http://schemas.microsoft.com/office/powerpoint/2010/main" val="985152144"/>
+        <p14:creationId xmlns:p14="http://schemas.microsoft.com/office/powerpoint/2010/main" val="2843245409"/>
       </p:ext>
     </p:extLst>
   </p:cSld>
@@ -825,6 +820,202 @@
           <a:p>
             <a:r>
               <a:rPr lang="en-US" dirty="0" smtClean="0"/>
+              <a:t>L06 show the same pattern, since they are tracking</a:t>
+            </a:r>
+            <a:r>
+              <a:rPr lang="en-US" baseline="0" dirty="0" smtClean="0"/>
+              <a:t> the same population, which is reassuring</a:t>
+            </a:r>
+          </a:p>
+          <a:p>
+            <a:r>
+              <a:rPr lang="en-US" baseline="0" dirty="0" smtClean="0"/>
+              <a:t>I14 and M14 are lower abundance (of our set)</a:t>
+            </a:r>
+            <a:endParaRPr lang="en-US" dirty="0"/>
+          </a:p>
+        </p:txBody>
+      </p:sp>
+      <p:sp>
+        <p:nvSpPr>
+          <p:cNvPr id="4" name="Slide Number Placeholder 3"/>
+          <p:cNvSpPr>
+            <a:spLocks noGrp="1"/>
+          </p:cNvSpPr>
+          <p:nvPr>
+            <p:ph type="sldNum" sz="quarter" idx="10"/>
+          </p:nvPr>
+        </p:nvSpPr>
+        <p:spPr/>
+        <p:txBody>
+          <a:bodyPr/>
+          <a:lstStyle/>
+          <a:p>
+            <a:fld id="{E24C21EA-28B2-0442-AFB4-706342F125BD}" type="slidenum">
+              <a:rPr lang="en-US" smtClean="0"/>
+              <a:t>14</a:t>
+            </a:fld>
+            <a:endParaRPr lang="en-US"/>
+          </a:p>
+        </p:txBody>
+      </p:sp>
+    </p:spTree>
+    <p:extLst>
+      <p:ext uri="{BB962C8B-B14F-4D97-AF65-F5344CB8AC3E}">
+        <p14:creationId xmlns:p14="http://schemas.microsoft.com/office/powerpoint/2010/main" val="985152144"/>
+      </p:ext>
+    </p:extLst>
+  </p:cSld>
+  <p:clrMapOvr>
+    <a:masterClrMapping/>
+  </p:clrMapOvr>
+</p:notes>
+</file>
+
+<file path=ppt/notesSlides/notesSlide5.xml><?xml version="1.0" encoding="utf-8"?>
+<p:notes xmlns:a="http://schemas.openxmlformats.org/drawingml/2006/main" xmlns:r="http://schemas.openxmlformats.org/officeDocument/2006/relationships" xmlns:p="http://schemas.openxmlformats.org/presentationml/2006/main">
+  <p:cSld>
+    <p:spTree>
+      <p:nvGrpSpPr>
+        <p:cNvPr id="1" name=""/>
+        <p:cNvGrpSpPr/>
+        <p:nvPr/>
+      </p:nvGrpSpPr>
+      <p:grpSpPr>
+        <a:xfrm>
+          <a:off x="0" y="0"/>
+          <a:ext cx="0" cy="0"/>
+          <a:chOff x="0" y="0"/>
+          <a:chExt cx="0" cy="0"/>
+        </a:xfrm>
+      </p:grpSpPr>
+      <p:sp>
+        <p:nvSpPr>
+          <p:cNvPr id="2" name="Slide Image Placeholder 1"/>
+          <p:cNvSpPr>
+            <a:spLocks noGrp="1" noRot="1" noChangeAspect="1"/>
+          </p:cNvSpPr>
+          <p:nvPr>
+            <p:ph type="sldImg"/>
+          </p:nvPr>
+        </p:nvSpPr>
+        <p:spPr/>
+      </p:sp>
+      <p:sp>
+        <p:nvSpPr>
+          <p:cNvPr id="3" name="Notes Placeholder 2"/>
+          <p:cNvSpPr>
+            <a:spLocks noGrp="1"/>
+          </p:cNvSpPr>
+          <p:nvPr>
+            <p:ph type="body" idx="1"/>
+          </p:nvPr>
+        </p:nvSpPr>
+        <p:spPr/>
+        <p:txBody>
+          <a:bodyPr/>
+          <a:lstStyle/>
+          <a:p>
+            <a:r>
+              <a:rPr lang="en-US" dirty="0" smtClean="0"/>
+              <a:t>Mary</a:t>
+            </a:r>
+            <a:r>
+              <a:rPr lang="en-US" baseline="0" dirty="0" smtClean="0"/>
+              <a:t> Lake never mixes</a:t>
+            </a:r>
+          </a:p>
+          <a:p>
+            <a:r>
+              <a:rPr lang="en-US" baseline="0" dirty="0" smtClean="0"/>
+              <a:t>Bog too?</a:t>
+            </a:r>
+            <a:endParaRPr lang="en-US" dirty="0"/>
+          </a:p>
+        </p:txBody>
+      </p:sp>
+      <p:sp>
+        <p:nvSpPr>
+          <p:cNvPr id="4" name="Slide Number Placeholder 3"/>
+          <p:cNvSpPr>
+            <a:spLocks noGrp="1"/>
+          </p:cNvSpPr>
+          <p:nvPr>
+            <p:ph type="sldNum" sz="quarter" idx="10"/>
+          </p:nvPr>
+        </p:nvSpPr>
+        <p:spPr/>
+        <p:txBody>
+          <a:bodyPr/>
+          <a:lstStyle/>
+          <a:p>
+            <a:fld id="{E24C21EA-28B2-0442-AFB4-706342F125BD}" type="slidenum">
+              <a:rPr lang="en-US" smtClean="0"/>
+              <a:t>17</a:t>
+            </a:fld>
+            <a:endParaRPr lang="en-US"/>
+          </a:p>
+        </p:txBody>
+      </p:sp>
+    </p:spTree>
+    <p:extLst>
+      <p:ext uri="{BB962C8B-B14F-4D97-AF65-F5344CB8AC3E}">
+        <p14:creationId xmlns:p14="http://schemas.microsoft.com/office/powerpoint/2010/main" val="2502112913"/>
+      </p:ext>
+    </p:extLst>
+  </p:cSld>
+  <p:clrMapOvr>
+    <a:masterClrMapping/>
+  </p:clrMapOvr>
+</p:notes>
+</file>
+
+<file path=ppt/notesSlides/notesSlide6.xml><?xml version="1.0" encoding="utf-8"?>
+<p:notes xmlns:a="http://schemas.openxmlformats.org/drawingml/2006/main" xmlns:r="http://schemas.openxmlformats.org/officeDocument/2006/relationships" xmlns:p="http://schemas.openxmlformats.org/presentationml/2006/main">
+  <p:cSld>
+    <p:spTree>
+      <p:nvGrpSpPr>
+        <p:cNvPr id="1" name=""/>
+        <p:cNvGrpSpPr/>
+        <p:nvPr/>
+      </p:nvGrpSpPr>
+      <p:grpSpPr>
+        <a:xfrm>
+          <a:off x="0" y="0"/>
+          <a:ext cx="0" cy="0"/>
+          <a:chOff x="0" y="0"/>
+          <a:chExt cx="0" cy="0"/>
+        </a:xfrm>
+      </p:grpSpPr>
+      <p:sp>
+        <p:nvSpPr>
+          <p:cNvPr id="2" name="Slide Image Placeholder 1"/>
+          <p:cNvSpPr>
+            <a:spLocks noGrp="1" noRot="1" noChangeAspect="1"/>
+          </p:cNvSpPr>
+          <p:nvPr>
+            <p:ph type="sldImg"/>
+          </p:nvPr>
+        </p:nvSpPr>
+        <p:spPr/>
+      </p:sp>
+      <p:sp>
+        <p:nvSpPr>
+          <p:cNvPr id="3" name="Notes Placeholder 2"/>
+          <p:cNvSpPr>
+            <a:spLocks noGrp="1"/>
+          </p:cNvSpPr>
+          <p:nvPr>
+            <p:ph type="body" idx="1"/>
+          </p:nvPr>
+        </p:nvSpPr>
+        <p:spPr/>
+        <p:txBody>
+          <a:bodyPr/>
+          <a:lstStyle/>
+          <a:p>
+            <a:r>
+              <a:rPr lang="en-US" dirty="0" smtClean="0"/>
               <a:t>Very</a:t>
             </a:r>
             <a:r>
@@ -852,7 +1043,7 @@
           <a:p>
             <a:fld id="{E24C21EA-28B2-0442-AFB4-706342F125BD}" type="slidenum">
               <a:rPr lang="en-US" smtClean="0"/>
-              <a:t>18</a:t>
+              <a:t>19</a:t>
             </a:fld>
             <a:endParaRPr lang="en-US"/>
           </a:p>
@@ -4036,6 +4227,97 @@
         </p:nvSpPr>
         <p:spPr/>
         <p:txBody>
+          <a:bodyPr/>
+          <a:lstStyle/>
+          <a:p>
+            <a:r>
+              <a:rPr lang="en-US" dirty="0" smtClean="0"/>
+              <a:t>Conclusion</a:t>
+            </a:r>
+            <a:endParaRPr lang="en-US" dirty="0"/>
+          </a:p>
+        </p:txBody>
+      </p:sp>
+      <p:sp>
+        <p:nvSpPr>
+          <p:cNvPr id="3" name="Content Placeholder 2"/>
+          <p:cNvSpPr>
+            <a:spLocks noGrp="1"/>
+          </p:cNvSpPr>
+          <p:nvPr>
+            <p:ph idx="1"/>
+          </p:nvPr>
+        </p:nvSpPr>
+        <p:spPr/>
+        <p:txBody>
+          <a:bodyPr anchor="ctr"/>
+          <a:lstStyle/>
+          <a:p>
+            <a:pPr marL="0" indent="0" algn="ctr">
+              <a:buNone/>
+            </a:pPr>
+            <a:r>
+              <a:rPr lang="en-US" dirty="0" smtClean="0"/>
+              <a:t>Diversity within co-occurring populations may be controlled by different mechanisms and explained by different evolutionary models</a:t>
+            </a:r>
+          </a:p>
+          <a:p>
+            <a:pPr marL="0" indent="0">
+              <a:buNone/>
+            </a:pPr>
+            <a:endParaRPr lang="en-US" dirty="0"/>
+          </a:p>
+        </p:txBody>
+      </p:sp>
+    </p:spTree>
+    <p:extLst>
+      <p:ext uri="{BB962C8B-B14F-4D97-AF65-F5344CB8AC3E}">
+        <p14:creationId xmlns:p14="http://schemas.microsoft.com/office/powerpoint/2010/main" val="193449578"/>
+      </p:ext>
+    </p:extLst>
+  </p:cSld>
+  <p:clrMapOvr>
+    <a:masterClrMapping/>
+  </p:clrMapOvr>
+  <p:timing>
+    <p:tnLst>
+      <p:par>
+        <p:cTn xmlns:p14="http://schemas.microsoft.com/office/powerpoint/2010/main" id="1" dur="indefinite" restart="never" nodeType="tmRoot"/>
+      </p:par>
+    </p:tnLst>
+  </p:timing>
+</p:sld>
+</file>
+
+<file path=ppt/slides/slide11.xml><?xml version="1.0" encoding="utf-8"?>
+<p:sld xmlns:a="http://schemas.openxmlformats.org/drawingml/2006/main" xmlns:r="http://schemas.openxmlformats.org/officeDocument/2006/relationships" xmlns:p="http://schemas.openxmlformats.org/presentationml/2006/main">
+  <p:cSld>
+    <p:spTree>
+      <p:nvGrpSpPr>
+        <p:cNvPr id="1" name=""/>
+        <p:cNvGrpSpPr/>
+        <p:nvPr/>
+      </p:nvGrpSpPr>
+      <p:grpSpPr>
+        <a:xfrm>
+          <a:off x="0" y="0"/>
+          <a:ext cx="0" cy="0"/>
+          <a:chOff x="0" y="0"/>
+          <a:chExt cx="0" cy="0"/>
+        </a:xfrm>
+      </p:grpSpPr>
+      <p:sp>
+        <p:nvSpPr>
+          <p:cNvPr id="2" name="Title 1"/>
+          <p:cNvSpPr>
+            <a:spLocks noGrp="1"/>
+          </p:cNvSpPr>
+          <p:nvPr>
+            <p:ph type="title"/>
+          </p:nvPr>
+        </p:nvSpPr>
+        <p:spPr/>
+        <p:txBody>
           <a:bodyPr>
             <a:noAutofit/>
           </a:bodyPr>
@@ -4107,99 +4389,6 @@
 </p:sld>
 </file>
 
-<file path=ppt/slides/slide11.xml><?xml version="1.0" encoding="utf-8"?>
-<p:sld xmlns:a="http://schemas.openxmlformats.org/drawingml/2006/main" xmlns:r="http://schemas.openxmlformats.org/officeDocument/2006/relationships" xmlns:p="http://schemas.openxmlformats.org/presentationml/2006/main">
-  <p:cSld>
-    <p:spTree>
-      <p:nvGrpSpPr>
-        <p:cNvPr id="1" name=""/>
-        <p:cNvGrpSpPr/>
-        <p:nvPr/>
-      </p:nvGrpSpPr>
-      <p:grpSpPr>
-        <a:xfrm>
-          <a:off x="0" y="0"/>
-          <a:ext cx="0" cy="0"/>
-          <a:chOff x="0" y="0"/>
-          <a:chExt cx="0" cy="0"/>
-        </a:xfrm>
-      </p:grpSpPr>
-      <p:sp>
-        <p:nvSpPr>
-          <p:cNvPr id="2" name="Title 1"/>
-          <p:cNvSpPr>
-            <a:spLocks noGrp="1"/>
-          </p:cNvSpPr>
-          <p:nvPr>
-            <p:ph type="title"/>
-          </p:nvPr>
-        </p:nvSpPr>
-        <p:spPr/>
-        <p:txBody>
-          <a:bodyPr>
-            <a:normAutofit fontScale="90000"/>
-          </a:bodyPr>
-          <a:lstStyle/>
-          <a:p>
-            <a:r>
-              <a:rPr lang="en-US" dirty="0" smtClean="0"/>
-              <a:t>SEQ-DISC PLOTS FOR ACI SEP BY MENDOTA VS. OTHER</a:t>
-            </a:r>
-            <a:endParaRPr lang="en-US" dirty="0"/>
-          </a:p>
-        </p:txBody>
-      </p:sp>
-      <p:sp>
-        <p:nvSpPr>
-          <p:cNvPr id="3" name="Content Placeholder 2"/>
-          <p:cNvSpPr>
-            <a:spLocks noGrp="1"/>
-          </p:cNvSpPr>
-          <p:nvPr>
-            <p:ph sz="half" idx="1"/>
-          </p:nvPr>
-        </p:nvSpPr>
-        <p:spPr/>
-        <p:txBody>
-          <a:bodyPr/>
-          <a:lstStyle/>
-          <a:p>
-            <a:endParaRPr lang="en-US"/>
-          </a:p>
-        </p:txBody>
-      </p:sp>
-      <p:sp>
-        <p:nvSpPr>
-          <p:cNvPr id="4" name="Content Placeholder 3"/>
-          <p:cNvSpPr>
-            <a:spLocks noGrp="1"/>
-          </p:cNvSpPr>
-          <p:nvPr>
-            <p:ph sz="half" idx="2"/>
-          </p:nvPr>
-        </p:nvSpPr>
-        <p:spPr/>
-        <p:txBody>
-          <a:bodyPr/>
-          <a:lstStyle/>
-          <a:p>
-            <a:endParaRPr lang="en-US"/>
-          </a:p>
-        </p:txBody>
-      </p:sp>
-    </p:spTree>
-    <p:extLst>
-      <p:ext uri="{BB962C8B-B14F-4D97-AF65-F5344CB8AC3E}">
-        <p14:creationId xmlns:p14="http://schemas.microsoft.com/office/powerpoint/2010/main" val="1881036576"/>
-      </p:ext>
-    </p:extLst>
-  </p:cSld>
-  <p:clrMapOvr>
-    <a:masterClrMapping/>
-  </p:clrMapOvr>
-</p:sld>
-</file>
-
 <file path=ppt/slides/slide12.xml><?xml version="1.0" encoding="utf-8"?>
 <p:sld xmlns:a="http://schemas.openxmlformats.org/drawingml/2006/main" xmlns:r="http://schemas.openxmlformats.org/officeDocument/2006/relationships" xmlns:p="http://schemas.openxmlformats.org/presentationml/2006/main">
   <p:cSld>
@@ -4227,6 +4416,99 @@
             <p:ph type="title"/>
           </p:nvPr>
         </p:nvSpPr>
+        <p:spPr/>
+        <p:txBody>
+          <a:bodyPr>
+            <a:normAutofit fontScale="90000"/>
+          </a:bodyPr>
+          <a:lstStyle/>
+          <a:p>
+            <a:r>
+              <a:rPr lang="en-US" dirty="0" smtClean="0"/>
+              <a:t>SEQ-DISC PLOTS FOR ACI SEP BY MENDOTA VS. OTHER</a:t>
+            </a:r>
+            <a:endParaRPr lang="en-US" dirty="0"/>
+          </a:p>
+        </p:txBody>
+      </p:sp>
+      <p:sp>
+        <p:nvSpPr>
+          <p:cNvPr id="3" name="Content Placeholder 2"/>
+          <p:cNvSpPr>
+            <a:spLocks noGrp="1"/>
+          </p:cNvSpPr>
+          <p:nvPr>
+            <p:ph sz="half" idx="1"/>
+          </p:nvPr>
+        </p:nvSpPr>
+        <p:spPr/>
+        <p:txBody>
+          <a:bodyPr/>
+          <a:lstStyle/>
+          <a:p>
+            <a:endParaRPr lang="en-US"/>
+          </a:p>
+        </p:txBody>
+      </p:sp>
+      <p:sp>
+        <p:nvSpPr>
+          <p:cNvPr id="4" name="Content Placeholder 3"/>
+          <p:cNvSpPr>
+            <a:spLocks noGrp="1"/>
+          </p:cNvSpPr>
+          <p:nvPr>
+            <p:ph sz="half" idx="2"/>
+          </p:nvPr>
+        </p:nvSpPr>
+        <p:spPr/>
+        <p:txBody>
+          <a:bodyPr/>
+          <a:lstStyle/>
+          <a:p>
+            <a:endParaRPr lang="en-US"/>
+          </a:p>
+        </p:txBody>
+      </p:sp>
+    </p:spTree>
+    <p:extLst>
+      <p:ext uri="{BB962C8B-B14F-4D97-AF65-F5344CB8AC3E}">
+        <p14:creationId xmlns:p14="http://schemas.microsoft.com/office/powerpoint/2010/main" val="1881036576"/>
+      </p:ext>
+    </p:extLst>
+  </p:cSld>
+  <p:clrMapOvr>
+    <a:masterClrMapping/>
+  </p:clrMapOvr>
+</p:sld>
+</file>
+
+<file path=ppt/slides/slide13.xml><?xml version="1.0" encoding="utf-8"?>
+<p:sld xmlns:a="http://schemas.openxmlformats.org/drawingml/2006/main" xmlns:r="http://schemas.openxmlformats.org/officeDocument/2006/relationships" xmlns:p="http://schemas.openxmlformats.org/presentationml/2006/main">
+  <p:cSld>
+    <p:spTree>
+      <p:nvGrpSpPr>
+        <p:cNvPr id="1" name=""/>
+        <p:cNvGrpSpPr/>
+        <p:nvPr/>
+      </p:nvGrpSpPr>
+      <p:grpSpPr>
+        <a:xfrm>
+          <a:off x="0" y="0"/>
+          <a:ext cx="0" cy="0"/>
+          <a:chOff x="0" y="0"/>
+          <a:chExt cx="0" cy="0"/>
+        </a:xfrm>
+      </p:grpSpPr>
+      <p:sp>
+        <p:nvSpPr>
+          <p:cNvPr id="2" name="Title 1"/>
+          <p:cNvSpPr>
+            <a:spLocks noGrp="1"/>
+          </p:cNvSpPr>
+          <p:nvPr>
+            <p:ph type="title"/>
+          </p:nvPr>
+        </p:nvSpPr>
         <p:spPr>
           <a:xfrm>
             <a:off x="457200" y="212853"/>
@@ -4241,7 +4523,7 @@
           <a:p>
             <a:r>
               <a:rPr lang="en-US" dirty="0" smtClean="0"/>
-              <a:t>SAGs Only Recruit Reads from the Same Sequence-discrete population</a:t>
+              <a:t>SAGs Only Recruit Reads from the Same Sequence-discrete Population</a:t>
             </a:r>
             <a:endParaRPr lang="en-US" dirty="0"/>
           </a:p>
@@ -4294,7 +4576,7 @@
           <p:nvPr/>
         </p:nvPicPr>
         <p:blipFill>
-          <a:blip r:embed="rId2">
+          <a:blip r:embed="rId3">
             <a:extLst>
               <a:ext uri="{28A0092B-C50C-407E-A947-70E740481C1C}">
                 <a14:useLocalDpi xmlns:a14="http://schemas.microsoft.com/office/drawing/2010/main" val="0"/>
@@ -4335,7 +4617,7 @@
 </p:sld>
 </file>
 
-<file path=ppt/slides/slide13.xml><?xml version="1.0" encoding="utf-8"?>
+<file path=ppt/slides/slide14.xml><?xml version="1.0" encoding="utf-8"?>
 <p:sld xmlns:a="http://schemas.openxmlformats.org/drawingml/2006/main" xmlns:r="http://schemas.openxmlformats.org/officeDocument/2006/relationships" xmlns:p="http://schemas.openxmlformats.org/presentationml/2006/main">
   <p:cSld>
     <p:spTree>
@@ -4427,7 +4709,7 @@
 </p:sld>
 </file>
 
-<file path=ppt/slides/slide14.xml><?xml version="1.0" encoding="utf-8"?>
+<file path=ppt/slides/slide15.xml><?xml version="1.0" encoding="utf-8"?>
 <p:sld xmlns:a="http://schemas.openxmlformats.org/drawingml/2006/main" xmlns:r="http://schemas.openxmlformats.org/officeDocument/2006/relationships" xmlns:p="http://schemas.openxmlformats.org/presentationml/2006/main">
   <p:cSld>
     <p:spTree>
@@ -4728,120 +5010,6 @@
 </p:sld>
 </file>
 
-<file path=ppt/slides/slide15.xml><?xml version="1.0" encoding="utf-8"?>
-<p:sld xmlns:a="http://schemas.openxmlformats.org/drawingml/2006/main" xmlns:r="http://schemas.openxmlformats.org/officeDocument/2006/relationships" xmlns:p="http://schemas.openxmlformats.org/presentationml/2006/main">
-  <p:cSld>
-    <p:spTree>
-      <p:nvGrpSpPr>
-        <p:cNvPr id="1" name=""/>
-        <p:cNvGrpSpPr/>
-        <p:nvPr/>
-      </p:nvGrpSpPr>
-      <p:grpSpPr>
-        <a:xfrm>
-          <a:off x="0" y="0"/>
-          <a:ext cx="0" cy="0"/>
-          <a:chOff x="0" y="0"/>
-          <a:chExt cx="0" cy="0"/>
-        </a:xfrm>
-      </p:grpSpPr>
-      <p:sp>
-        <p:nvSpPr>
-          <p:cNvPr id="2" name="Title 1"/>
-          <p:cNvSpPr>
-            <a:spLocks noGrp="1"/>
-          </p:cNvSpPr>
-          <p:nvPr>
-            <p:ph type="title"/>
-          </p:nvPr>
-        </p:nvSpPr>
-        <p:spPr/>
-        <p:txBody>
-          <a:bodyPr/>
-          <a:lstStyle/>
-          <a:p>
-            <a:r>
-              <a:rPr lang="en-US" dirty="0" smtClean="0"/>
-              <a:t>Crystal Bog (CB) v. Trout Bog (TB)</a:t>
-            </a:r>
-            <a:endParaRPr lang="en-US" dirty="0"/>
-          </a:p>
-        </p:txBody>
-      </p:sp>
-      <p:sp>
-        <p:nvSpPr>
-          <p:cNvPr id="3" name="Content Placeholder 2"/>
-          <p:cNvSpPr>
-            <a:spLocks noGrp="1"/>
-          </p:cNvSpPr>
-          <p:nvPr>
-            <p:ph idx="1"/>
-          </p:nvPr>
-        </p:nvSpPr>
-        <p:spPr/>
-        <p:txBody>
-          <a:bodyPr>
-            <a:normAutofit lnSpcReduction="10000"/>
-          </a:bodyPr>
-          <a:lstStyle/>
-          <a:p>
-            <a:r>
-              <a:rPr lang="en-US" dirty="0" smtClean="0"/>
-              <a:t>Both dystrophic (high in DOC)</a:t>
-            </a:r>
-          </a:p>
-          <a:p>
-            <a:r>
-              <a:rPr lang="en-US" dirty="0" smtClean="0"/>
-              <a:t>Both seepage lakes?</a:t>
-            </a:r>
-          </a:p>
-          <a:p>
-            <a:r>
-              <a:rPr lang="en-US" dirty="0" smtClean="0"/>
-              <a:t>Different mixing regimes </a:t>
-            </a:r>
-          </a:p>
-          <a:p>
-            <a:r>
-              <a:rPr lang="en-US" dirty="0" smtClean="0"/>
-              <a:t>Share 45-60% of their top 20 clades based on 16S tags</a:t>
-            </a:r>
-            <a:endParaRPr lang="en-US" dirty="0" smtClean="0"/>
-          </a:p>
-          <a:p>
-            <a:r>
-              <a:rPr lang="en-US" dirty="0" smtClean="0"/>
-              <a:t>CB has a smaller surface area</a:t>
-            </a:r>
-          </a:p>
-          <a:p>
-            <a:r>
-              <a:rPr lang="en-US" dirty="0" smtClean="0"/>
-              <a:t>TB is deeper</a:t>
-            </a:r>
-          </a:p>
-          <a:p>
-            <a:r>
-              <a:rPr lang="en-US" dirty="0" smtClean="0"/>
-              <a:t>About 5 miles apart?</a:t>
-            </a:r>
-          </a:p>
-        </p:txBody>
-      </p:sp>
-    </p:spTree>
-    <p:extLst>
-      <p:ext uri="{BB962C8B-B14F-4D97-AF65-F5344CB8AC3E}">
-        <p14:creationId xmlns:p14="http://schemas.microsoft.com/office/powerpoint/2010/main" val="2692648431"/>
-      </p:ext>
-    </p:extLst>
-  </p:cSld>
-  <p:clrMapOvr>
-    <a:masterClrMapping/>
-  </p:clrMapOvr>
-</p:sld>
-</file>
-
 <file path=ppt/slides/slide16.xml><?xml version="1.0" encoding="utf-8"?>
 <p:sld xmlns:a="http://schemas.openxmlformats.org/drawingml/2006/main" xmlns:r="http://schemas.openxmlformats.org/officeDocument/2006/relationships" xmlns:p="http://schemas.openxmlformats.org/presentationml/2006/main">
   <p:cSld>
@@ -4876,7 +5044,7 @@
           <a:p>
             <a:r>
               <a:rPr lang="en-US" dirty="0" smtClean="0"/>
-              <a:t>Next Questions</a:t>
+              <a:t>Crystal Bog (CB) v. Trout Bog (TB)</a:t>
             </a:r>
             <a:endParaRPr lang="en-US" dirty="0"/>
           </a:p>
@@ -4894,34 +5062,60 @@
         </p:nvSpPr>
         <p:spPr/>
         <p:txBody>
-          <a:bodyPr/>
+          <a:bodyPr>
+            <a:normAutofit lnSpcReduction="10000"/>
+          </a:bodyPr>
           <a:lstStyle/>
           <a:p>
             <a:r>
               <a:rPr lang="en-US" dirty="0" smtClean="0"/>
-              <a:t>Do these two dystrophic lakes have similar populations in them?</a:t>
-            </a:r>
-          </a:p>
-          <a:p>
-            <a:pPr lvl="1"/>
+              <a:t>Both dystrophic (high in DOC)</a:t>
+            </a:r>
+          </a:p>
+          <a:p>
             <a:r>
               <a:rPr lang="en-US" dirty="0" smtClean="0"/>
-              <a:t>WHAT WOULD WE EXPECT FROM TAGS</a:t>
+              <a:t>Both seepage lakes</a:t>
             </a:r>
           </a:p>
           <a:p>
             <a:r>
               <a:rPr lang="en-US" dirty="0" smtClean="0"/>
-              <a:t>How similar are they based on ANI?</a:t>
-            </a:r>
-            <a:endParaRPr lang="en-US" dirty="0"/>
+              <a:t>Share 45-60% of their top 20 clades based on 16S tags</a:t>
+            </a:r>
+            <a:endParaRPr lang="en-US" dirty="0" smtClean="0"/>
+          </a:p>
+          <a:p>
+            <a:r>
+              <a:rPr lang="en-US" dirty="0" smtClean="0"/>
+              <a:t>Different mixing regimes </a:t>
+            </a:r>
+            <a:endParaRPr lang="en-US" dirty="0" smtClean="0"/>
+          </a:p>
+          <a:p>
+            <a:r>
+              <a:rPr lang="en-US" dirty="0" smtClean="0"/>
+              <a:t>CB has a smaller surface area</a:t>
+            </a:r>
+          </a:p>
+          <a:p>
+            <a:r>
+              <a:rPr lang="en-US" dirty="0" smtClean="0"/>
+              <a:t>TB is deeper</a:t>
+            </a:r>
+          </a:p>
+          <a:p>
+            <a:r>
+              <a:rPr lang="en-US" dirty="0" smtClean="0"/>
+              <a:t>About 5 miles apart</a:t>
+            </a:r>
           </a:p>
         </p:txBody>
       </p:sp>
     </p:spTree>
     <p:extLst>
       <p:ext uri="{BB962C8B-B14F-4D97-AF65-F5344CB8AC3E}">
-        <p14:creationId xmlns:p14="http://schemas.microsoft.com/office/powerpoint/2010/main" val="1996468262"/>
+        <p14:creationId xmlns:p14="http://schemas.microsoft.com/office/powerpoint/2010/main" val="2692648431"/>
       </p:ext>
     </p:extLst>
   </p:cSld>
@@ -4960,6 +5154,108 @@
         </p:nvSpPr>
         <p:spPr/>
         <p:txBody>
+          <a:bodyPr/>
+          <a:lstStyle/>
+          <a:p>
+            <a:r>
+              <a:rPr lang="en-US" dirty="0" smtClean="0"/>
+              <a:t>Next Questions</a:t>
+            </a:r>
+            <a:endParaRPr lang="en-US" dirty="0"/>
+          </a:p>
+        </p:txBody>
+      </p:sp>
+      <p:sp>
+        <p:nvSpPr>
+          <p:cNvPr id="3" name="Content Placeholder 2"/>
+          <p:cNvSpPr>
+            <a:spLocks noGrp="1"/>
+          </p:cNvSpPr>
+          <p:nvPr>
+            <p:ph idx="1"/>
+          </p:nvPr>
+        </p:nvSpPr>
+        <p:spPr/>
+        <p:txBody>
+          <a:bodyPr/>
+          <a:lstStyle/>
+          <a:p>
+            <a:r>
+              <a:rPr lang="en-US" dirty="0" smtClean="0"/>
+              <a:t>Do these two bogs have similar populations in them?</a:t>
+            </a:r>
+          </a:p>
+          <a:p>
+            <a:r>
+              <a:rPr lang="en-US" dirty="0" smtClean="0"/>
+              <a:t>How similar are they based on ANI?</a:t>
+            </a:r>
+          </a:p>
+          <a:p>
+            <a:pPr lvl="1"/>
+            <a:r>
+              <a:rPr lang="en-US" dirty="0" smtClean="0"/>
+              <a:t>ANI for reference GFMs to each other</a:t>
+            </a:r>
+          </a:p>
+          <a:p>
+            <a:pPr lvl="1"/>
+            <a:r>
+              <a:rPr lang="en-US" dirty="0" smtClean="0"/>
+              <a:t>ANI when mapping reads from same or different lake</a:t>
+            </a:r>
+          </a:p>
+          <a:p>
+            <a:r>
+              <a:rPr lang="en-US" dirty="0" smtClean="0"/>
+              <a:t>Might also be able to compare GFMs from Mary Lake </a:t>
+            </a:r>
+            <a:endParaRPr lang="en-US" dirty="0"/>
+          </a:p>
+        </p:txBody>
+      </p:sp>
+    </p:spTree>
+    <p:extLst>
+      <p:ext uri="{BB962C8B-B14F-4D97-AF65-F5344CB8AC3E}">
+        <p14:creationId xmlns:p14="http://schemas.microsoft.com/office/powerpoint/2010/main" val="1996468262"/>
+      </p:ext>
+    </p:extLst>
+  </p:cSld>
+  <p:clrMapOvr>
+    <a:masterClrMapping/>
+  </p:clrMapOvr>
+</p:sld>
+</file>
+
+<file path=ppt/slides/slide18.xml><?xml version="1.0" encoding="utf-8"?>
+<p:sld xmlns:a="http://schemas.openxmlformats.org/drawingml/2006/main" xmlns:r="http://schemas.openxmlformats.org/officeDocument/2006/relationships" xmlns:p="http://schemas.openxmlformats.org/presentationml/2006/main">
+  <p:cSld>
+    <p:spTree>
+      <p:nvGrpSpPr>
+        <p:cNvPr id="1" name=""/>
+        <p:cNvGrpSpPr/>
+        <p:nvPr/>
+      </p:nvGrpSpPr>
+      <p:grpSpPr>
+        <a:xfrm>
+          <a:off x="0" y="0"/>
+          <a:ext cx="0" cy="0"/>
+          <a:chOff x="0" y="0"/>
+          <a:chExt cx="0" cy="0"/>
+        </a:xfrm>
+      </p:grpSpPr>
+      <p:sp>
+        <p:nvSpPr>
+          <p:cNvPr id="2" name="Title 1"/>
+          <p:cNvSpPr>
+            <a:spLocks noGrp="1"/>
+          </p:cNvSpPr>
+          <p:nvPr>
+            <p:ph type="title"/>
+          </p:nvPr>
+        </p:nvSpPr>
+        <p:spPr/>
+        <p:txBody>
           <a:bodyPr>
             <a:normAutofit fontScale="90000"/>
           </a:bodyPr>
@@ -5023,7 +5319,7 @@
 </p:sld>
 </file>
 
-<file path=ppt/slides/slide18.xml><?xml version="1.0" encoding="utf-8"?>
+<file path=ppt/slides/slide19.xml><?xml version="1.0" encoding="utf-8"?>
 <p:sld xmlns:a="http://schemas.openxmlformats.org/drawingml/2006/main" xmlns:r="http://schemas.openxmlformats.org/officeDocument/2006/relationships" xmlns:p="http://schemas.openxmlformats.org/presentationml/2006/main">
   <p:cSld>
     <p:spTree>
@@ -5187,108 +5483,6 @@
 </p:sld>
 </file>
 
-<file path=ppt/slides/slide19.xml><?xml version="1.0" encoding="utf-8"?>
-<p:sld xmlns:a="http://schemas.openxmlformats.org/drawingml/2006/main" xmlns:r="http://schemas.openxmlformats.org/officeDocument/2006/relationships" xmlns:p="http://schemas.openxmlformats.org/presentationml/2006/main">
-  <p:cSld>
-    <p:spTree>
-      <p:nvGrpSpPr>
-        <p:cNvPr id="1" name=""/>
-        <p:cNvGrpSpPr/>
-        <p:nvPr/>
-      </p:nvGrpSpPr>
-      <p:grpSpPr>
-        <a:xfrm>
-          <a:off x="0" y="0"/>
-          <a:ext cx="0" cy="0"/>
-          <a:chOff x="0" y="0"/>
-          <a:chExt cx="0" cy="0"/>
-        </a:xfrm>
-      </p:grpSpPr>
-      <p:sp>
-        <p:nvSpPr>
-          <p:cNvPr id="2" name="Title 1"/>
-          <p:cNvSpPr>
-            <a:spLocks noGrp="1"/>
-          </p:cNvSpPr>
-          <p:nvPr>
-            <p:ph type="title"/>
-          </p:nvPr>
-        </p:nvSpPr>
-        <p:spPr/>
-        <p:txBody>
-          <a:bodyPr/>
-          <a:lstStyle/>
-          <a:p>
-            <a:r>
-              <a:rPr lang="en-US" dirty="0" smtClean="0"/>
-              <a:t>AAA028D10</a:t>
-            </a:r>
-            <a:endParaRPr lang="en-US" dirty="0"/>
-          </a:p>
-        </p:txBody>
-      </p:sp>
-      <p:sp>
-        <p:nvSpPr>
-          <p:cNvPr id="3" name="Content Placeholder 2"/>
-          <p:cNvSpPr>
-            <a:spLocks noGrp="1"/>
-          </p:cNvSpPr>
-          <p:nvPr>
-            <p:ph idx="1"/>
-          </p:nvPr>
-        </p:nvSpPr>
-        <p:spPr/>
-        <p:txBody>
-          <a:bodyPr/>
-          <a:lstStyle/>
-          <a:p>
-            <a:endParaRPr lang="en-US"/>
-          </a:p>
-        </p:txBody>
-      </p:sp>
-      <p:sp>
-        <p:nvSpPr>
-          <p:cNvPr id="11" name="TextBox 10"/>
-          <p:cNvSpPr txBox="1"/>
-          <p:nvPr/>
-        </p:nvSpPr>
-        <p:spPr>
-          <a:xfrm>
-            <a:off x="2334914" y="1901396"/>
-            <a:ext cx="3136909" cy="369332"/>
-          </a:xfrm>
-          <a:prstGeom prst="rect">
-            <a:avLst/>
-          </a:prstGeom>
-          <a:noFill/>
-        </p:spPr>
-        <p:txBody>
-          <a:bodyPr wrap="none" rtlCol="0">
-            <a:spAutoFit/>
-          </a:bodyPr>
-          <a:lstStyle/>
-          <a:p>
-            <a:r>
-              <a:rPr lang="en-US" dirty="0" smtClean="0"/>
-              <a:t>Alpha-LD12 (freshwater SAR11)</a:t>
-            </a:r>
-            <a:endParaRPr lang="en-US" dirty="0"/>
-          </a:p>
-        </p:txBody>
-      </p:sp>
-    </p:spTree>
-    <p:extLst>
-      <p:ext uri="{BB962C8B-B14F-4D97-AF65-F5344CB8AC3E}">
-        <p14:creationId xmlns:p14="http://schemas.microsoft.com/office/powerpoint/2010/main" val="2592691178"/>
-      </p:ext>
-    </p:extLst>
-  </p:cSld>
-  <p:clrMapOvr>
-    <a:masterClrMapping/>
-  </p:clrMapOvr>
-</p:sld>
-</file>
-
 <file path=ppt/slides/slide2.xml><?xml version="1.0" encoding="utf-8"?>
 <p:sld xmlns:a="http://schemas.openxmlformats.org/drawingml/2006/main" xmlns:r="http://schemas.openxmlformats.org/officeDocument/2006/relationships" xmlns:p="http://schemas.openxmlformats.org/presentationml/2006/main">
   <p:cSld>
@@ -5390,6 +5584,108 @@
         </p:nvSpPr>
         <p:spPr/>
         <p:txBody>
+          <a:bodyPr/>
+          <a:lstStyle/>
+          <a:p>
+            <a:r>
+              <a:rPr lang="en-US" dirty="0" smtClean="0"/>
+              <a:t>AAA028D10</a:t>
+            </a:r>
+            <a:endParaRPr lang="en-US" dirty="0"/>
+          </a:p>
+        </p:txBody>
+      </p:sp>
+      <p:sp>
+        <p:nvSpPr>
+          <p:cNvPr id="3" name="Content Placeholder 2"/>
+          <p:cNvSpPr>
+            <a:spLocks noGrp="1"/>
+          </p:cNvSpPr>
+          <p:nvPr>
+            <p:ph idx="1"/>
+          </p:nvPr>
+        </p:nvSpPr>
+        <p:spPr/>
+        <p:txBody>
+          <a:bodyPr/>
+          <a:lstStyle/>
+          <a:p>
+            <a:endParaRPr lang="en-US"/>
+          </a:p>
+        </p:txBody>
+      </p:sp>
+      <p:sp>
+        <p:nvSpPr>
+          <p:cNvPr id="11" name="TextBox 10"/>
+          <p:cNvSpPr txBox="1"/>
+          <p:nvPr/>
+        </p:nvSpPr>
+        <p:spPr>
+          <a:xfrm>
+            <a:off x="2334914" y="1901396"/>
+            <a:ext cx="3136909" cy="369332"/>
+          </a:xfrm>
+          <a:prstGeom prst="rect">
+            <a:avLst/>
+          </a:prstGeom>
+          <a:noFill/>
+        </p:spPr>
+        <p:txBody>
+          <a:bodyPr wrap="none" rtlCol="0">
+            <a:spAutoFit/>
+          </a:bodyPr>
+          <a:lstStyle/>
+          <a:p>
+            <a:r>
+              <a:rPr lang="en-US" dirty="0" smtClean="0"/>
+              <a:t>Alpha-LD12 (freshwater SAR11)</a:t>
+            </a:r>
+            <a:endParaRPr lang="en-US" dirty="0"/>
+          </a:p>
+        </p:txBody>
+      </p:sp>
+    </p:spTree>
+    <p:extLst>
+      <p:ext uri="{BB962C8B-B14F-4D97-AF65-F5344CB8AC3E}">
+        <p14:creationId xmlns:p14="http://schemas.microsoft.com/office/powerpoint/2010/main" val="2592691178"/>
+      </p:ext>
+    </p:extLst>
+  </p:cSld>
+  <p:clrMapOvr>
+    <a:masterClrMapping/>
+  </p:clrMapOvr>
+</p:sld>
+</file>
+
+<file path=ppt/slides/slide21.xml><?xml version="1.0" encoding="utf-8"?>
+<p:sld xmlns:a="http://schemas.openxmlformats.org/drawingml/2006/main" xmlns:r="http://schemas.openxmlformats.org/officeDocument/2006/relationships" xmlns:p="http://schemas.openxmlformats.org/presentationml/2006/main">
+  <p:cSld>
+    <p:spTree>
+      <p:nvGrpSpPr>
+        <p:cNvPr id="1" name=""/>
+        <p:cNvGrpSpPr/>
+        <p:nvPr/>
+      </p:nvGrpSpPr>
+      <p:grpSpPr>
+        <a:xfrm>
+          <a:off x="0" y="0"/>
+          <a:ext cx="0" cy="0"/>
+          <a:chOff x="0" y="0"/>
+          <a:chExt cx="0" cy="0"/>
+        </a:xfrm>
+      </p:grpSpPr>
+      <p:sp>
+        <p:nvSpPr>
+          <p:cNvPr id="2" name="Title 1"/>
+          <p:cNvSpPr>
+            <a:spLocks noGrp="1"/>
+          </p:cNvSpPr>
+          <p:nvPr>
+            <p:ph type="title"/>
+          </p:nvPr>
+        </p:nvSpPr>
+        <p:spPr/>
+        <p:txBody>
           <a:bodyPr>
             <a:normAutofit/>
           </a:bodyPr>
@@ -5604,7 +5900,7 @@
 </p:sld>
 </file>
 
-<file path=ppt/slides/slide21.xml><?xml version="1.0" encoding="utf-8"?>
+<file path=ppt/slides/slide22.xml><?xml version="1.0" encoding="utf-8"?>
 <p:sld xmlns:a="http://schemas.openxmlformats.org/drawingml/2006/main" xmlns:r="http://schemas.openxmlformats.org/officeDocument/2006/relationships" xmlns:p="http://schemas.openxmlformats.org/presentationml/2006/main">
   <p:cSld>
     <p:spTree>
@@ -5932,6 +6228,78 @@
         </p:nvSpPr>
         <p:spPr/>
         <p:txBody>
+          <a:bodyPr/>
+          <a:lstStyle/>
+          <a:p>
+            <a:r>
+              <a:rPr lang="en-US" dirty="0" smtClean="0"/>
+              <a:t>One L06 slide</a:t>
+            </a:r>
+            <a:endParaRPr lang="en-US" dirty="0"/>
+          </a:p>
+        </p:txBody>
+      </p:sp>
+      <p:sp>
+        <p:nvSpPr>
+          <p:cNvPr id="3" name="Content Placeholder 2"/>
+          <p:cNvSpPr>
+            <a:spLocks noGrp="1"/>
+          </p:cNvSpPr>
+          <p:nvPr>
+            <p:ph idx="1"/>
+          </p:nvPr>
+        </p:nvSpPr>
+        <p:spPr/>
+        <p:txBody>
+          <a:bodyPr/>
+          <a:lstStyle/>
+          <a:p>
+            <a:endParaRPr lang="en-US"/>
+          </a:p>
+        </p:txBody>
+      </p:sp>
+    </p:spTree>
+    <p:extLst>
+      <p:ext uri="{BB962C8B-B14F-4D97-AF65-F5344CB8AC3E}">
+        <p14:creationId xmlns:p14="http://schemas.microsoft.com/office/powerpoint/2010/main" val="1930819705"/>
+      </p:ext>
+    </p:extLst>
+  </p:cSld>
+  <p:clrMapOvr>
+    <a:masterClrMapping/>
+  </p:clrMapOvr>
+</p:sld>
+</file>
+
+<file path=ppt/slides/slide5.xml><?xml version="1.0" encoding="utf-8"?>
+<p:sld xmlns:a="http://schemas.openxmlformats.org/drawingml/2006/main" xmlns:r="http://schemas.openxmlformats.org/officeDocument/2006/relationships" xmlns:p="http://schemas.openxmlformats.org/presentationml/2006/main">
+  <p:cSld>
+    <p:spTree>
+      <p:nvGrpSpPr>
+        <p:cNvPr id="1" name=""/>
+        <p:cNvGrpSpPr/>
+        <p:nvPr/>
+      </p:nvGrpSpPr>
+      <p:grpSpPr>
+        <a:xfrm>
+          <a:off x="0" y="0"/>
+          <a:ext cx="0" cy="0"/>
+          <a:chOff x="0" y="0"/>
+          <a:chExt cx="0" cy="0"/>
+        </a:xfrm>
+      </p:grpSpPr>
+      <p:sp>
+        <p:nvSpPr>
+          <p:cNvPr id="2" name="Title 1"/>
+          <p:cNvSpPr>
+            <a:spLocks noGrp="1"/>
+          </p:cNvSpPr>
+          <p:nvPr>
+            <p:ph type="title"/>
+          </p:nvPr>
+        </p:nvSpPr>
+        <p:spPr/>
+        <p:txBody>
           <a:bodyPr>
             <a:noAutofit/>
           </a:bodyPr>
@@ -5939,7 +6307,7 @@
           <a:p>
             <a:r>
               <a:rPr lang="en-US" sz="3200" dirty="0" smtClean="0"/>
-              <a:t>All Genomes Assembled from Metagenomes Show Sequence-discrete Pattern</a:t>
+              <a:t>All 30 Genomes Assembled from Metagenomes Show Sequence-discrete Pattern</a:t>
             </a:r>
             <a:endParaRPr lang="en-US" sz="3200" dirty="0"/>
           </a:p>
@@ -5980,8 +6348,8 @@
         </p:blipFill>
         <p:spPr>
           <a:xfrm>
-            <a:off x="2257066" y="2134972"/>
-            <a:ext cx="4408965" cy="3650735"/>
+            <a:off x="2009931" y="1600200"/>
+            <a:ext cx="5275284" cy="4368069"/>
           </a:xfrm>
           <a:prstGeom prst="rect">
             <a:avLst/>
@@ -6008,7 +6376,7 @@
 </p:sld>
 </file>
 
-<file path=ppt/slides/slide5.xml><?xml version="1.0" encoding="utf-8"?>
+<file path=ppt/slides/slide6.xml><?xml version="1.0" encoding="utf-8"?>
 <p:sld xmlns:a="http://schemas.openxmlformats.org/drawingml/2006/main" xmlns:r="http://schemas.openxmlformats.org/officeDocument/2006/relationships" xmlns:p="http://schemas.openxmlformats.org/presentationml/2006/main">
   <p:cSld>
     <p:spTree>
@@ -6050,7 +6418,7 @@
         </p:blipFill>
         <p:spPr>
           <a:xfrm>
-            <a:off x="773406" y="-717975"/>
+            <a:off x="773406" y="-841545"/>
             <a:ext cx="7744060" cy="8678584"/>
           </a:xfrm>
         </p:spPr>
@@ -6067,7 +6435,7 @@
         </p:nvSpPr>
         <p:spPr>
           <a:xfrm>
-            <a:off x="457200" y="171663"/>
+            <a:off x="457200" y="-13692"/>
             <a:ext cx="8229600" cy="1143000"/>
           </a:xfrm>
         </p:spPr>
@@ -6093,7 +6461,7 @@
         </p:nvSpPr>
         <p:spPr>
           <a:xfrm>
-            <a:off x="1082440" y="6031886"/>
+            <a:off x="1082440" y="5990694"/>
             <a:ext cx="7261441" cy="430887"/>
           </a:xfrm>
           <a:prstGeom prst="rect">
@@ -6132,6 +6500,51 @@
               <a:t>.</a:t>
             </a:r>
             <a:endParaRPr lang="en-US" sz="1100" dirty="0" smtClean="0"/>
+          </a:p>
+        </p:txBody>
+      </p:sp>
+      <p:sp>
+        <p:nvSpPr>
+          <p:cNvPr id="3" name="Rectangle 2"/>
+          <p:cNvSpPr/>
+          <p:nvPr/>
+        </p:nvSpPr>
+        <p:spPr>
+          <a:xfrm>
+            <a:off x="1345514" y="4359186"/>
+            <a:ext cx="6494162" cy="1366108"/>
+          </a:xfrm>
+          <a:prstGeom prst="rect">
+            <a:avLst/>
+          </a:prstGeom>
+          <a:noFill/>
+          <a:ln>
+            <a:solidFill>
+              <a:schemeClr val="tx1"/>
+            </a:solidFill>
+          </a:ln>
+          <a:effectLst/>
+        </p:spPr>
+        <p:style>
+          <a:lnRef idx="1">
+            <a:schemeClr val="accent1"/>
+          </a:lnRef>
+          <a:fillRef idx="3">
+            <a:schemeClr val="accent1"/>
+          </a:fillRef>
+          <a:effectRef idx="2">
+            <a:schemeClr val="accent1"/>
+          </a:effectRef>
+          <a:fontRef idx="minor">
+            <a:schemeClr val="lt1"/>
+          </a:fontRef>
+        </p:style>
+        <p:txBody>
+          <a:bodyPr rtlCol="0" anchor="ctr"/>
+          <a:lstStyle/>
+          <a:p>
+            <a:pPr algn="ctr"/>
+            <a:endParaRPr lang="en-US"/>
           </a:p>
         </p:txBody>
       </p:sp>
@@ -6155,7 +6568,7 @@
 </p:sld>
 </file>
 
-<file path=ppt/slides/slide6.xml><?xml version="1.0" encoding="utf-8"?>
+<file path=ppt/slides/slide7.xml><?xml version="1.0" encoding="utf-8"?>
 <p:sld xmlns:a="http://schemas.openxmlformats.org/drawingml/2006/main" xmlns:r="http://schemas.openxmlformats.org/officeDocument/2006/relationships" xmlns:p="http://schemas.openxmlformats.org/presentationml/2006/main">
   <p:cSld>
     <p:spTree>
@@ -7177,7 +7590,7 @@
 </p:sld>
 </file>
 
-<file path=ppt/slides/slide7.xml><?xml version="1.0" encoding="utf-8"?>
+<file path=ppt/slides/slide8.xml><?xml version="1.0" encoding="utf-8"?>
 <p:sld xmlns:a="http://schemas.openxmlformats.org/drawingml/2006/main" xmlns:r="http://schemas.openxmlformats.org/officeDocument/2006/relationships" xmlns:p="http://schemas.openxmlformats.org/presentationml/2006/main">
   <p:cSld>
     <p:spTree>
@@ -7239,7 +7652,7 @@
           <a:bodyPr/>
           <a:lstStyle/>
           <a:p>
-            <a:endParaRPr lang="en-US"/>
+            <a:endParaRPr lang="en-US" dirty="0"/>
           </a:p>
         </p:txBody>
       </p:sp>
@@ -7393,7 +7806,7 @@
           <p:spPr>
             <a:xfrm>
               <a:off x="1584124" y="2042112"/>
-              <a:ext cx="2082621" cy="215444"/>
+              <a:ext cx="2093989" cy="188931"/>
             </a:xfrm>
             <a:prstGeom prst="rect">
               <a:avLst/>
@@ -7407,10 +7820,34 @@
             <a:lstStyle/>
             <a:p>
               <a:r>
-                <a:rPr lang="en-US" sz="800" dirty="0" smtClean="0"/>
-                <a:t>2005      2007     2008      2009     2012      2013</a:t>
+                <a:rPr lang="en-US" sz="1200" dirty="0" smtClean="0"/>
+                <a:t> 2005      </a:t>
               </a:r>
-              <a:endParaRPr lang="en-US" sz="800" dirty="0"/>
+              <a:r>
+                <a:rPr lang="en-US" sz="1200" dirty="0" smtClean="0"/>
+                <a:t>2007  </a:t>
+              </a:r>
+              <a:r>
+                <a:rPr lang="en-US" sz="1200" dirty="0" smtClean="0"/>
+                <a:t>    </a:t>
+              </a:r>
+              <a:r>
+                <a:rPr lang="en-US" sz="1200" dirty="0" smtClean="0"/>
+                <a:t>2008    </a:t>
+              </a:r>
+              <a:r>
+                <a:rPr lang="en-US" sz="1200" dirty="0" smtClean="0"/>
+                <a:t> </a:t>
+              </a:r>
+              <a:r>
+                <a:rPr lang="en-US" sz="1200" dirty="0" smtClean="0"/>
+                <a:t>2009     2012     </a:t>
+              </a:r>
+              <a:r>
+                <a:rPr lang="en-US" sz="1200" dirty="0" smtClean="0"/>
+                <a:t>2013</a:t>
+              </a:r>
+              <a:endParaRPr lang="en-US" sz="1200" dirty="0"/>
             </a:p>
           </p:txBody>
         </p:sp>
@@ -7947,7 +8384,7 @@
 </p:sld>
 </file>
 
-<file path=ppt/slides/slide8.xml><?xml version="1.0" encoding="utf-8"?>
+<file path=ppt/slides/slide9.xml><?xml version="1.0" encoding="utf-8"?>
 <p:sld xmlns:a="http://schemas.openxmlformats.org/drawingml/2006/main" xmlns:r="http://schemas.openxmlformats.org/officeDocument/2006/relationships" xmlns:p="http://schemas.openxmlformats.org/presentationml/2006/main">
   <p:cSld>
     <p:spTree>
@@ -8231,101 +8668,6 @@
     <p:extLst>
       <p:ext uri="{BB962C8B-B14F-4D97-AF65-F5344CB8AC3E}">
         <p14:creationId xmlns:p14="http://schemas.microsoft.com/office/powerpoint/2010/main" val="1288427866"/>
-      </p:ext>
-    </p:extLst>
-  </p:cSld>
-  <p:clrMapOvr>
-    <a:masterClrMapping/>
-  </p:clrMapOvr>
-  <p:timing>
-    <p:tnLst>
-      <p:par>
-        <p:cTn xmlns:p14="http://schemas.microsoft.com/office/powerpoint/2010/main" id="1" dur="indefinite" restart="never" nodeType="tmRoot"/>
-      </p:par>
-    </p:tnLst>
-  </p:timing>
-</p:sld>
-</file>
-
-<file path=ppt/slides/slide9.xml><?xml version="1.0" encoding="utf-8"?>
-<p:sld xmlns:a="http://schemas.openxmlformats.org/drawingml/2006/main" xmlns:r="http://schemas.openxmlformats.org/officeDocument/2006/relationships" xmlns:p="http://schemas.openxmlformats.org/presentationml/2006/main">
-  <p:cSld>
-    <p:spTree>
-      <p:nvGrpSpPr>
-        <p:cNvPr id="1" name=""/>
-        <p:cNvGrpSpPr/>
-        <p:nvPr/>
-      </p:nvGrpSpPr>
-      <p:grpSpPr>
-        <a:xfrm>
-          <a:off x="0" y="0"/>
-          <a:ext cx="0" cy="0"/>
-          <a:chOff x="0" y="0"/>
-          <a:chExt cx="0" cy="0"/>
-        </a:xfrm>
-      </p:grpSpPr>
-      <p:sp>
-        <p:nvSpPr>
-          <p:cNvPr id="2" name="Title 1"/>
-          <p:cNvSpPr>
-            <a:spLocks noGrp="1"/>
-          </p:cNvSpPr>
-          <p:nvPr>
-            <p:ph type="title"/>
-          </p:nvPr>
-        </p:nvSpPr>
-        <p:spPr/>
-        <p:txBody>
-          <a:bodyPr/>
-          <a:lstStyle/>
-          <a:p>
-            <a:r>
-              <a:rPr lang="en-US" dirty="0" smtClean="0"/>
-              <a:t>Conclusion</a:t>
-            </a:r>
-            <a:endParaRPr lang="en-US" dirty="0"/>
-          </a:p>
-        </p:txBody>
-      </p:sp>
-      <p:sp>
-        <p:nvSpPr>
-          <p:cNvPr id="3" name="Content Placeholder 2"/>
-          <p:cNvSpPr>
-            <a:spLocks noGrp="1"/>
-          </p:cNvSpPr>
-          <p:nvPr>
-            <p:ph idx="1"/>
-          </p:nvPr>
-        </p:nvSpPr>
-        <p:spPr/>
-        <p:txBody>
-          <a:bodyPr anchor="ctr"/>
-          <a:lstStyle/>
-          <a:p>
-            <a:pPr marL="0" indent="0" algn="ctr">
-              <a:buNone/>
-            </a:pPr>
-            <a:r>
-              <a:rPr lang="en-US" dirty="0"/>
-              <a:t>T</a:t>
-            </a:r>
-            <a:r>
-              <a:rPr lang="en-US" dirty="0" smtClean="0"/>
-              <a:t>hat diversity within co-occurring populations may be controlled by different mechanisms and explained by different evolutionary models</a:t>
-            </a:r>
-          </a:p>
-          <a:p>
-            <a:pPr marL="0" indent="0">
-              <a:buNone/>
-            </a:pPr>
-            <a:endParaRPr lang="en-US" dirty="0"/>
-          </a:p>
-        </p:txBody>
-      </p:sp>
-    </p:spTree>
-    <p:extLst>
-      <p:ext uri="{BB962C8B-B14F-4D97-AF65-F5344CB8AC3E}">
-        <p14:creationId xmlns:p14="http://schemas.microsoft.com/office/powerpoint/2010/main" val="193449578"/>
       </p:ext>
     </p:extLst>
   </p:cSld>

</xml_diff>